<commit_message>
SSM parameter store, and SecretsManager
</commit_message>
<xml_diff>
--- a/doc/diagram.pptx
+++ b/doc/diagram.pptx
@@ -6,6 +6,7 @@
   </p:sldMasterIdLst>
   <p:sldIdLst>
     <p:sldId id="257" r:id="rId2"/>
+    <p:sldId id="258" r:id="rId3"/>
   </p:sldIdLst>
   <p:sldSz cx="12192000" cy="6858000"/>
   <p:notesSz cx="6858000" cy="9144000"/>
@@ -259,7 +260,7 @@
           <a:p>
             <a:fld id="{2BECA929-49EE-B647-832F-567E3A3FDFBE}" type="datetimeFigureOut">
               <a:rPr lang="en-US" smtClean="0"/>
-              <a:t>3/24/19</a:t>
+              <a:t>3/27/19</a:t>
             </a:fld>
             <a:endParaRPr lang="en-US"/>
           </a:p>
@@ -457,7 +458,7 @@
           <a:p>
             <a:fld id="{2BECA929-49EE-B647-832F-567E3A3FDFBE}" type="datetimeFigureOut">
               <a:rPr lang="en-US" smtClean="0"/>
-              <a:t>3/24/19</a:t>
+              <a:t>3/27/19</a:t>
             </a:fld>
             <a:endParaRPr lang="en-US"/>
           </a:p>
@@ -665,7 +666,7 @@
           <a:p>
             <a:fld id="{2BECA929-49EE-B647-832F-567E3A3FDFBE}" type="datetimeFigureOut">
               <a:rPr lang="en-US" smtClean="0"/>
-              <a:t>3/24/19</a:t>
+              <a:t>3/27/19</a:t>
             </a:fld>
             <a:endParaRPr lang="en-US"/>
           </a:p>
@@ -863,7 +864,7 @@
           <a:p>
             <a:fld id="{2BECA929-49EE-B647-832F-567E3A3FDFBE}" type="datetimeFigureOut">
               <a:rPr lang="en-US" smtClean="0"/>
-              <a:t>3/24/19</a:t>
+              <a:t>3/27/19</a:t>
             </a:fld>
             <a:endParaRPr lang="en-US"/>
           </a:p>
@@ -1138,7 +1139,7 @@
           <a:p>
             <a:fld id="{2BECA929-49EE-B647-832F-567E3A3FDFBE}" type="datetimeFigureOut">
               <a:rPr lang="en-US" smtClean="0"/>
-              <a:t>3/24/19</a:t>
+              <a:t>3/27/19</a:t>
             </a:fld>
             <a:endParaRPr lang="en-US"/>
           </a:p>
@@ -1403,7 +1404,7 @@
           <a:p>
             <a:fld id="{2BECA929-49EE-B647-832F-567E3A3FDFBE}" type="datetimeFigureOut">
               <a:rPr lang="en-US" smtClean="0"/>
-              <a:t>3/24/19</a:t>
+              <a:t>3/27/19</a:t>
             </a:fld>
             <a:endParaRPr lang="en-US"/>
           </a:p>
@@ -1815,7 +1816,7 @@
           <a:p>
             <a:fld id="{2BECA929-49EE-B647-832F-567E3A3FDFBE}" type="datetimeFigureOut">
               <a:rPr lang="en-US" smtClean="0"/>
-              <a:t>3/24/19</a:t>
+              <a:t>3/27/19</a:t>
             </a:fld>
             <a:endParaRPr lang="en-US"/>
           </a:p>
@@ -1956,7 +1957,7 @@
           <a:p>
             <a:fld id="{2BECA929-49EE-B647-832F-567E3A3FDFBE}" type="datetimeFigureOut">
               <a:rPr lang="en-US" smtClean="0"/>
-              <a:t>3/24/19</a:t>
+              <a:t>3/27/19</a:t>
             </a:fld>
             <a:endParaRPr lang="en-US"/>
           </a:p>
@@ -2069,7 +2070,7 @@
           <a:p>
             <a:fld id="{2BECA929-49EE-B647-832F-567E3A3FDFBE}" type="datetimeFigureOut">
               <a:rPr lang="en-US" smtClean="0"/>
-              <a:t>3/24/19</a:t>
+              <a:t>3/27/19</a:t>
             </a:fld>
             <a:endParaRPr lang="en-US"/>
           </a:p>
@@ -2380,7 +2381,7 @@
           <a:p>
             <a:fld id="{2BECA929-49EE-B647-832F-567E3A3FDFBE}" type="datetimeFigureOut">
               <a:rPr lang="en-US" smtClean="0"/>
-              <a:t>3/24/19</a:t>
+              <a:t>3/27/19</a:t>
             </a:fld>
             <a:endParaRPr lang="en-US"/>
           </a:p>
@@ -2668,7 +2669,7 @@
           <a:p>
             <a:fld id="{2BECA929-49EE-B647-832F-567E3A3FDFBE}" type="datetimeFigureOut">
               <a:rPr lang="en-US" smtClean="0"/>
-              <a:t>3/24/19</a:t>
+              <a:t>3/27/19</a:t>
             </a:fld>
             <a:endParaRPr lang="en-US"/>
           </a:p>
@@ -2909,7 +2910,7 @@
           <a:p>
             <a:fld id="{2BECA929-49EE-B647-832F-567E3A3FDFBE}" type="datetimeFigureOut">
               <a:rPr lang="en-US" smtClean="0"/>
-              <a:t>3/24/19</a:t>
+              <a:t>3/27/19</a:t>
             </a:fld>
             <a:endParaRPr lang="en-US"/>
           </a:p>
@@ -3498,7 +3499,7 @@
         </p:blipFill>
         <p:spPr>
           <a:xfrm>
-            <a:off x="2568155" y="3809534"/>
+            <a:off x="2568155" y="1379665"/>
             <a:ext cx="719088" cy="1030693"/>
           </a:xfrm>
           <a:prstGeom prst="rect">
@@ -3570,7 +3571,7 @@
         </p:blipFill>
         <p:spPr>
           <a:xfrm>
-            <a:off x="2568155" y="786943"/>
+            <a:off x="2566956" y="3701048"/>
             <a:ext cx="762000" cy="952500"/>
           </a:xfrm>
           <a:prstGeom prst="rect">
@@ -3910,15 +3911,15 @@
           </p:cNvPr>
           <p:cNvCxnSpPr>
             <a:cxnSpLocks/>
-            <a:stCxn id="14" idx="2"/>
-            <a:endCxn id="11" idx="0"/>
+            <a:stCxn id="14" idx="0"/>
+            <a:endCxn id="11" idx="2"/>
           </p:cNvCxnSpPr>
           <p:nvPr/>
         </p:nvCxnSpPr>
         <p:spPr>
-          <a:xfrm>
-            <a:off x="2949155" y="1739443"/>
-            <a:ext cx="0" cy="659558"/>
+          <a:xfrm flipV="1">
+            <a:off x="2947956" y="3491201"/>
+            <a:ext cx="1199" cy="209847"/>
           </a:xfrm>
           <a:prstGeom prst="line">
             <a:avLst/>
@@ -3993,8 +3994,8 @@
         </p:nvSpPr>
         <p:spPr>
           <a:xfrm>
-            <a:off x="2413309" y="340242"/>
-            <a:ext cx="1071690" cy="3150959"/>
+            <a:off x="2425909" y="340242"/>
+            <a:ext cx="1059089" cy="4497230"/>
           </a:xfrm>
           <a:prstGeom prst="rect">
             <a:avLst/>
@@ -4056,14 +4057,14 @@
           <p:cNvCxnSpPr>
             <a:cxnSpLocks/>
             <a:stCxn id="12" idx="1"/>
-            <a:endCxn id="17" idx="2"/>
+            <a:endCxn id="17" idx="0"/>
           </p:cNvCxnSpPr>
           <p:nvPr/>
         </p:nvCxnSpPr>
         <p:spPr>
-          <a:xfrm rot="10800000">
-            <a:off x="1558445" y="3384961"/>
-            <a:ext cx="1009710" cy="939921"/>
+          <a:xfrm rot="10800000" flipV="1">
+            <a:off x="1558445" y="1895012"/>
+            <a:ext cx="1009710" cy="631438"/>
           </a:xfrm>
           <a:prstGeom prst="bentConnector2">
             <a:avLst/>
@@ -4338,10 +4339,2289 @@
           </a:p>
         </p:txBody>
       </p:sp>
+      <p:sp>
+        <p:nvSpPr>
+          <p:cNvPr id="2" name="TextBox 1">
+            <a:extLst>
+              <a:ext uri="{FF2B5EF4-FFF2-40B4-BE49-F238E27FC236}">
+                <a16:creationId xmlns:a16="http://schemas.microsoft.com/office/drawing/2014/main" id="{E7FBEA5F-E52F-A34D-8142-840A6750ED85}"/>
+              </a:ext>
+            </a:extLst>
+          </p:cNvPr>
+          <p:cNvSpPr txBox="1"/>
+          <p:nvPr/>
+        </p:nvSpPr>
+        <p:spPr>
+          <a:xfrm>
+            <a:off x="1340407" y="6225760"/>
+            <a:ext cx="1294585" cy="369332"/>
+          </a:xfrm>
+          <a:prstGeom prst="rect">
+            <a:avLst/>
+          </a:prstGeom>
+          <a:noFill/>
+        </p:spPr>
+        <p:txBody>
+          <a:bodyPr wrap="none" rtlCol="0">
+            <a:spAutoFit/>
+          </a:bodyPr>
+          <a:lstStyle/>
+          <a:p>
+            <a:r>
+              <a:rPr lang="en-US" dirty="0"/>
+              <a:t>Distribution</a:t>
+            </a:r>
+          </a:p>
+        </p:txBody>
+      </p:sp>
+      <p:sp>
+        <p:nvSpPr>
+          <p:cNvPr id="3" name="Oval 2">
+            <a:extLst>
+              <a:ext uri="{FF2B5EF4-FFF2-40B4-BE49-F238E27FC236}">
+                <a16:creationId xmlns:a16="http://schemas.microsoft.com/office/drawing/2014/main" id="{0B28F176-BFEB-D842-8545-6E9ECCF0FB2C}"/>
+              </a:ext>
+            </a:extLst>
+          </p:cNvPr>
+          <p:cNvSpPr/>
+          <p:nvPr/>
+        </p:nvSpPr>
+        <p:spPr>
+          <a:xfrm>
+            <a:off x="5005636" y="211951"/>
+            <a:ext cx="276693" cy="293560"/>
+          </a:xfrm>
+          <a:prstGeom prst="ellipse">
+            <a:avLst/>
+          </a:prstGeom>
+          <a:solidFill>
+            <a:srgbClr val="FFFF00"/>
+          </a:solidFill>
+          <a:ln>
+            <a:solidFill>
+              <a:schemeClr val="tx1"/>
+            </a:solidFill>
+          </a:ln>
+        </p:spPr>
+        <p:style>
+          <a:lnRef idx="2">
+            <a:schemeClr val="accent1">
+              <a:shade val="50000"/>
+            </a:schemeClr>
+          </a:lnRef>
+          <a:fillRef idx="1">
+            <a:schemeClr val="accent1"/>
+          </a:fillRef>
+          <a:effectRef idx="0">
+            <a:schemeClr val="accent1"/>
+          </a:effectRef>
+          <a:fontRef idx="minor">
+            <a:schemeClr val="lt1"/>
+          </a:fontRef>
+        </p:style>
+        <p:txBody>
+          <a:bodyPr rtlCol="0" anchor="ctr"/>
+          <a:lstStyle/>
+          <a:p>
+            <a:pPr algn="ctr"/>
+            <a:r>
+              <a:rPr lang="en-US" sz="1200" dirty="0">
+                <a:solidFill>
+                  <a:schemeClr val="tx1"/>
+                </a:solidFill>
+              </a:rPr>
+              <a:t>1</a:t>
+            </a:r>
+          </a:p>
+        </p:txBody>
+      </p:sp>
+      <p:sp>
+        <p:nvSpPr>
+          <p:cNvPr id="28" name="Oval 27">
+            <a:extLst>
+              <a:ext uri="{FF2B5EF4-FFF2-40B4-BE49-F238E27FC236}">
+                <a16:creationId xmlns:a16="http://schemas.microsoft.com/office/drawing/2014/main" id="{3664BCE1-7E23-D642-9C75-485305C18757}"/>
+              </a:ext>
+            </a:extLst>
+          </p:cNvPr>
+          <p:cNvSpPr/>
+          <p:nvPr/>
+        </p:nvSpPr>
+        <p:spPr>
+          <a:xfrm>
+            <a:off x="6698660" y="1965026"/>
+            <a:ext cx="276693" cy="293560"/>
+          </a:xfrm>
+          <a:prstGeom prst="ellipse">
+            <a:avLst/>
+          </a:prstGeom>
+          <a:solidFill>
+            <a:srgbClr val="FFFF00"/>
+          </a:solidFill>
+          <a:ln>
+            <a:solidFill>
+              <a:schemeClr val="tx1"/>
+            </a:solidFill>
+          </a:ln>
+        </p:spPr>
+        <p:style>
+          <a:lnRef idx="2">
+            <a:schemeClr val="accent1">
+              <a:shade val="50000"/>
+            </a:schemeClr>
+          </a:lnRef>
+          <a:fillRef idx="1">
+            <a:schemeClr val="accent1"/>
+          </a:fillRef>
+          <a:effectRef idx="0">
+            <a:schemeClr val="accent1"/>
+          </a:effectRef>
+          <a:fontRef idx="minor">
+            <a:schemeClr val="lt1"/>
+          </a:fontRef>
+        </p:style>
+        <p:txBody>
+          <a:bodyPr rtlCol="0" anchor="ctr"/>
+          <a:lstStyle/>
+          <a:p>
+            <a:pPr algn="ctr"/>
+            <a:r>
+              <a:rPr lang="en-US" sz="1200" dirty="0">
+                <a:solidFill>
+                  <a:schemeClr val="tx1"/>
+                </a:solidFill>
+              </a:rPr>
+              <a:t>2</a:t>
+            </a:r>
+          </a:p>
+        </p:txBody>
+      </p:sp>
+      <p:sp>
+        <p:nvSpPr>
+          <p:cNvPr id="31" name="Oval 30">
+            <a:extLst>
+              <a:ext uri="{FF2B5EF4-FFF2-40B4-BE49-F238E27FC236}">
+                <a16:creationId xmlns:a16="http://schemas.microsoft.com/office/drawing/2014/main" id="{04A0F5D1-F0DD-1541-B18B-789A6CD06419}"/>
+              </a:ext>
+            </a:extLst>
+          </p:cNvPr>
+          <p:cNvSpPr/>
+          <p:nvPr/>
+        </p:nvSpPr>
+        <p:spPr>
+          <a:xfrm>
+            <a:off x="3328956" y="211951"/>
+            <a:ext cx="276693" cy="293560"/>
+          </a:xfrm>
+          <a:prstGeom prst="ellipse">
+            <a:avLst/>
+          </a:prstGeom>
+          <a:solidFill>
+            <a:srgbClr val="FFFF00"/>
+          </a:solidFill>
+          <a:ln>
+            <a:solidFill>
+              <a:schemeClr val="tx1"/>
+            </a:solidFill>
+          </a:ln>
+        </p:spPr>
+        <p:style>
+          <a:lnRef idx="2">
+            <a:schemeClr val="accent1">
+              <a:shade val="50000"/>
+            </a:schemeClr>
+          </a:lnRef>
+          <a:fillRef idx="1">
+            <a:schemeClr val="accent1"/>
+          </a:fillRef>
+          <a:effectRef idx="0">
+            <a:schemeClr val="accent1"/>
+          </a:effectRef>
+          <a:fontRef idx="minor">
+            <a:schemeClr val="lt1"/>
+          </a:fontRef>
+        </p:style>
+        <p:txBody>
+          <a:bodyPr rtlCol="0" anchor="ctr"/>
+          <a:lstStyle/>
+          <a:p>
+            <a:pPr algn="ctr"/>
+            <a:r>
+              <a:rPr lang="en-US" sz="1200" dirty="0">
+                <a:solidFill>
+                  <a:schemeClr val="tx1"/>
+                </a:solidFill>
+              </a:rPr>
+              <a:t>3</a:t>
+            </a:r>
+          </a:p>
+        </p:txBody>
+      </p:sp>
+      <p:sp>
+        <p:nvSpPr>
+          <p:cNvPr id="34" name="Rectangle 33">
+            <a:extLst>
+              <a:ext uri="{FF2B5EF4-FFF2-40B4-BE49-F238E27FC236}">
+                <a16:creationId xmlns:a16="http://schemas.microsoft.com/office/drawing/2014/main" id="{A285D32F-E7A1-9E45-8BC1-6B7557EFAC75}"/>
+              </a:ext>
+            </a:extLst>
+          </p:cNvPr>
+          <p:cNvSpPr/>
+          <p:nvPr/>
+        </p:nvSpPr>
+        <p:spPr>
+          <a:xfrm>
+            <a:off x="2425909" y="5241712"/>
+            <a:ext cx="4397516" cy="842249"/>
+          </a:xfrm>
+          <a:prstGeom prst="rect">
+            <a:avLst/>
+          </a:prstGeom>
+          <a:noFill/>
+          <a:ln w="12700">
+            <a:solidFill>
+              <a:srgbClr val="879196"/>
+            </a:solidFill>
+            <a:prstDash val="dash"/>
+          </a:ln>
+        </p:spPr>
+        <p:style>
+          <a:lnRef idx="2">
+            <a:schemeClr val="accent1">
+              <a:shade val="50000"/>
+            </a:schemeClr>
+          </a:lnRef>
+          <a:fillRef idx="1">
+            <a:schemeClr val="accent1"/>
+          </a:fillRef>
+          <a:effectRef idx="0">
+            <a:schemeClr val="accent1"/>
+          </a:effectRef>
+          <a:fontRef idx="minor">
+            <a:schemeClr val="lt1"/>
+          </a:fontRef>
+        </p:style>
+        <p:txBody>
+          <a:bodyPr rot="0" spcFirstLastPara="0" vertOverflow="overflow" horzOverflow="overflow" vert="horz" wrap="square" lIns="91440" tIns="45720" rIns="91440" bIns="45720" numCol="1" spcCol="0" rtlCol="0" fromWordArt="0" anchor="t" anchorCtr="0" forceAA="0" compatLnSpc="1">
+            <a:prstTxWarp prst="textNoShape">
+              <a:avLst/>
+            </a:prstTxWarp>
+            <a:noAutofit/>
+          </a:bodyPr>
+          <a:lstStyle/>
+          <a:p>
+            <a:pPr algn="ctr"/>
+            <a:r>
+              <a:rPr lang="en-US" sz="1000" dirty="0">
+                <a:solidFill>
+                  <a:schemeClr val="tx1"/>
+                </a:solidFill>
+              </a:rPr>
+              <a:t>Pipeline Stack</a:t>
+            </a:r>
+          </a:p>
+        </p:txBody>
+      </p:sp>
     </p:spTree>
     <p:extLst>
       <p:ext uri="{BB962C8B-B14F-4D97-AF65-F5344CB8AC3E}">
         <p14:creationId xmlns:p14="http://schemas.microsoft.com/office/powerpoint/2010/main" val="697916922"/>
+      </p:ext>
+    </p:extLst>
+  </p:cSld>
+  <p:clrMapOvr>
+    <a:masterClrMapping/>
+  </p:clrMapOvr>
+</p:sld>
+</file>
+
+<file path=ppt/slides/slide2.xml><?xml version="1.0" encoding="utf-8"?>
+<p:sld xmlns:a="http://schemas.openxmlformats.org/drawingml/2006/main" xmlns:r="http://schemas.openxmlformats.org/officeDocument/2006/relationships" xmlns:p="http://schemas.openxmlformats.org/presentationml/2006/main">
+  <p:cSld>
+    <p:spTree>
+      <p:nvGrpSpPr>
+        <p:cNvPr id="1" name=""/>
+        <p:cNvGrpSpPr/>
+        <p:nvPr/>
+      </p:nvGrpSpPr>
+      <p:grpSpPr>
+        <a:xfrm>
+          <a:off x="0" y="0"/>
+          <a:ext cx="0" cy="0"/>
+          <a:chOff x="0" y="0"/>
+          <a:chExt cx="0" cy="0"/>
+        </a:xfrm>
+      </p:grpSpPr>
+      <p:sp>
+        <p:nvSpPr>
+          <p:cNvPr id="16" name="Rectangle 15">
+            <a:extLst>
+              <a:ext uri="{FF2B5EF4-FFF2-40B4-BE49-F238E27FC236}">
+                <a16:creationId xmlns:a16="http://schemas.microsoft.com/office/drawing/2014/main" id="{939FDB78-F157-C64C-9C67-3B82039A02E9}"/>
+              </a:ext>
+            </a:extLst>
+          </p:cNvPr>
+          <p:cNvSpPr/>
+          <p:nvPr/>
+        </p:nvSpPr>
+        <p:spPr>
+          <a:xfrm>
+            <a:off x="5185993" y="2068054"/>
+            <a:ext cx="3142350" cy="1180476"/>
+          </a:xfrm>
+          <a:prstGeom prst="rect">
+            <a:avLst/>
+          </a:prstGeom>
+          <a:noFill/>
+          <a:ln w="12700">
+            <a:solidFill>
+              <a:srgbClr val="879196"/>
+            </a:solidFill>
+            <a:prstDash val="dash"/>
+          </a:ln>
+        </p:spPr>
+        <p:style>
+          <a:lnRef idx="2">
+            <a:schemeClr val="accent1">
+              <a:shade val="50000"/>
+            </a:schemeClr>
+          </a:lnRef>
+          <a:fillRef idx="1">
+            <a:schemeClr val="accent1"/>
+          </a:fillRef>
+          <a:effectRef idx="0">
+            <a:schemeClr val="accent1"/>
+          </a:effectRef>
+          <a:fontRef idx="minor">
+            <a:schemeClr val="lt1"/>
+          </a:fontRef>
+        </p:style>
+        <p:txBody>
+          <a:bodyPr rot="0" spcFirstLastPara="0" vertOverflow="overflow" horzOverflow="overflow" vert="horz" wrap="square" lIns="91440" tIns="45720" rIns="91440" bIns="45720" numCol="1" spcCol="0" rtlCol="0" fromWordArt="0" anchor="t" anchorCtr="0" forceAA="0" compatLnSpc="1">
+            <a:prstTxWarp prst="textNoShape">
+              <a:avLst/>
+            </a:prstTxWarp>
+            <a:noAutofit/>
+          </a:bodyPr>
+          <a:lstStyle/>
+          <a:p>
+            <a:pPr algn="ctr"/>
+            <a:r>
+              <a:rPr lang="en-US" sz="1000" dirty="0">
+                <a:solidFill>
+                  <a:schemeClr val="tx1"/>
+                </a:solidFill>
+              </a:rPr>
+              <a:t>Multilanguage Bot Stack</a:t>
+            </a:r>
+          </a:p>
+        </p:txBody>
+      </p:sp>
+      <p:cxnSp>
+        <p:nvCxnSpPr>
+          <p:cNvPr id="20" name="Straight Connector 19">
+            <a:extLst>
+              <a:ext uri="{FF2B5EF4-FFF2-40B4-BE49-F238E27FC236}">
+                <a16:creationId xmlns:a16="http://schemas.microsoft.com/office/drawing/2014/main" id="{0D80BD15-1DA5-6B4D-898C-CB7D1944303B}"/>
+              </a:ext>
+            </a:extLst>
+          </p:cNvPr>
+          <p:cNvCxnSpPr>
+            <a:cxnSpLocks/>
+            <a:stCxn id="85" idx="3"/>
+            <a:endCxn id="84" idx="1"/>
+          </p:cNvCxnSpPr>
+          <p:nvPr/>
+        </p:nvCxnSpPr>
+        <p:spPr>
+          <a:xfrm flipV="1">
+            <a:off x="6272200" y="2666581"/>
+            <a:ext cx="931129" cy="8582"/>
+          </a:xfrm>
+          <a:prstGeom prst="line">
+            <a:avLst/>
+          </a:prstGeom>
+        </p:spPr>
+        <p:style>
+          <a:lnRef idx="1">
+            <a:schemeClr val="accent1"/>
+          </a:lnRef>
+          <a:fillRef idx="0">
+            <a:schemeClr val="accent1"/>
+          </a:fillRef>
+          <a:effectRef idx="0">
+            <a:schemeClr val="accent1"/>
+          </a:effectRef>
+          <a:fontRef idx="minor">
+            <a:schemeClr val="tx1"/>
+          </a:fontRef>
+        </p:style>
+      </p:cxnSp>
+      <p:cxnSp>
+        <p:nvCxnSpPr>
+          <p:cNvPr id="23" name="Straight Connector 22">
+            <a:extLst>
+              <a:ext uri="{FF2B5EF4-FFF2-40B4-BE49-F238E27FC236}">
+                <a16:creationId xmlns:a16="http://schemas.microsoft.com/office/drawing/2014/main" id="{1EE80D5C-FFA5-C244-B56C-E12127B557B1}"/>
+              </a:ext>
+            </a:extLst>
+          </p:cNvPr>
+          <p:cNvCxnSpPr>
+            <a:cxnSpLocks/>
+            <a:stCxn id="78" idx="2"/>
+            <a:endCxn id="85" idx="0"/>
+          </p:cNvCxnSpPr>
+          <p:nvPr/>
+        </p:nvCxnSpPr>
+        <p:spPr>
+          <a:xfrm>
+            <a:off x="5914127" y="1878166"/>
+            <a:ext cx="2473" cy="441397"/>
+          </a:xfrm>
+          <a:prstGeom prst="line">
+            <a:avLst/>
+          </a:prstGeom>
+        </p:spPr>
+        <p:style>
+          <a:lnRef idx="1">
+            <a:schemeClr val="accent1"/>
+          </a:lnRef>
+          <a:fillRef idx="0">
+            <a:schemeClr val="accent1"/>
+          </a:fillRef>
+          <a:effectRef idx="0">
+            <a:schemeClr val="accent1"/>
+          </a:effectRef>
+          <a:fontRef idx="minor">
+            <a:schemeClr val="tx1"/>
+          </a:fontRef>
+        </p:style>
+      </p:cxnSp>
+      <p:cxnSp>
+        <p:nvCxnSpPr>
+          <p:cNvPr id="30" name="Straight Connector 29">
+            <a:extLst>
+              <a:ext uri="{FF2B5EF4-FFF2-40B4-BE49-F238E27FC236}">
+                <a16:creationId xmlns:a16="http://schemas.microsoft.com/office/drawing/2014/main" id="{2D2E7735-3CB8-B244-8A5A-3F5E4CA4F57A}"/>
+              </a:ext>
+            </a:extLst>
+          </p:cNvPr>
+          <p:cNvCxnSpPr>
+            <a:cxnSpLocks/>
+            <a:stCxn id="65" idx="0"/>
+            <a:endCxn id="66" idx="2"/>
+          </p:cNvCxnSpPr>
+          <p:nvPr/>
+        </p:nvCxnSpPr>
+        <p:spPr>
+          <a:xfrm flipH="1" flipV="1">
+            <a:off x="4405100" y="3024136"/>
+            <a:ext cx="7995" cy="262422"/>
+          </a:xfrm>
+          <a:prstGeom prst="line">
+            <a:avLst/>
+          </a:prstGeom>
+        </p:spPr>
+        <p:style>
+          <a:lnRef idx="1">
+            <a:schemeClr val="accent1"/>
+          </a:lnRef>
+          <a:fillRef idx="0">
+            <a:schemeClr val="accent1"/>
+          </a:fillRef>
+          <a:effectRef idx="0">
+            <a:schemeClr val="accent1"/>
+          </a:effectRef>
+          <a:fontRef idx="minor">
+            <a:schemeClr val="tx1"/>
+          </a:fontRef>
+        </p:style>
+      </p:cxnSp>
+      <p:cxnSp>
+        <p:nvCxnSpPr>
+          <p:cNvPr id="33" name="Straight Connector 32">
+            <a:extLst>
+              <a:ext uri="{FF2B5EF4-FFF2-40B4-BE49-F238E27FC236}">
+                <a16:creationId xmlns:a16="http://schemas.microsoft.com/office/drawing/2014/main" id="{C9DA066C-CBEF-7F4B-B980-9E6AB48A9FD1}"/>
+              </a:ext>
+            </a:extLst>
+          </p:cNvPr>
+          <p:cNvCxnSpPr>
+            <a:cxnSpLocks/>
+            <a:stCxn id="128" idx="1"/>
+            <a:endCxn id="66" idx="1"/>
+          </p:cNvCxnSpPr>
+          <p:nvPr/>
+        </p:nvCxnSpPr>
+        <p:spPr>
+          <a:xfrm flipV="1">
+            <a:off x="3336825" y="2668536"/>
+            <a:ext cx="712675" cy="6627"/>
+          </a:xfrm>
+          <a:prstGeom prst="line">
+            <a:avLst/>
+          </a:prstGeom>
+        </p:spPr>
+        <p:style>
+          <a:lnRef idx="1">
+            <a:schemeClr val="accent1"/>
+          </a:lnRef>
+          <a:fillRef idx="0">
+            <a:schemeClr val="accent1"/>
+          </a:fillRef>
+          <a:effectRef idx="0">
+            <a:schemeClr val="accent1"/>
+          </a:effectRef>
+          <a:fontRef idx="minor">
+            <a:schemeClr val="tx1"/>
+          </a:fontRef>
+        </p:style>
+      </p:cxnSp>
+      <p:sp>
+        <p:nvSpPr>
+          <p:cNvPr id="39" name="Rectangle 38">
+            <a:extLst>
+              <a:ext uri="{FF2B5EF4-FFF2-40B4-BE49-F238E27FC236}">
+                <a16:creationId xmlns:a16="http://schemas.microsoft.com/office/drawing/2014/main" id="{A221E010-1155-1240-B4BB-758AFB9AD819}"/>
+              </a:ext>
+            </a:extLst>
+          </p:cNvPr>
+          <p:cNvSpPr/>
+          <p:nvPr/>
+        </p:nvSpPr>
+        <p:spPr>
+          <a:xfrm>
+            <a:off x="3900748" y="812190"/>
+            <a:ext cx="1059089" cy="3288765"/>
+          </a:xfrm>
+          <a:prstGeom prst="rect">
+            <a:avLst/>
+          </a:prstGeom>
+          <a:noFill/>
+          <a:ln w="12700">
+            <a:solidFill>
+              <a:srgbClr val="879196"/>
+            </a:solidFill>
+            <a:prstDash val="dash"/>
+          </a:ln>
+        </p:spPr>
+        <p:style>
+          <a:lnRef idx="2">
+            <a:schemeClr val="accent1">
+              <a:shade val="50000"/>
+            </a:schemeClr>
+          </a:lnRef>
+          <a:fillRef idx="1">
+            <a:schemeClr val="accent1"/>
+          </a:fillRef>
+          <a:effectRef idx="0">
+            <a:schemeClr val="accent1"/>
+          </a:effectRef>
+          <a:fontRef idx="minor">
+            <a:schemeClr val="lt1"/>
+          </a:fontRef>
+        </p:style>
+        <p:txBody>
+          <a:bodyPr rot="0" spcFirstLastPara="0" vertOverflow="overflow" horzOverflow="overflow" vert="horz" wrap="square" lIns="91440" tIns="45720" rIns="91440" bIns="45720" numCol="1" spcCol="0" rtlCol="0" fromWordArt="0" anchor="t" anchorCtr="0" forceAA="0" compatLnSpc="1">
+            <a:prstTxWarp prst="textNoShape">
+              <a:avLst/>
+            </a:prstTxWarp>
+            <a:noAutofit/>
+          </a:bodyPr>
+          <a:lstStyle/>
+          <a:p>
+            <a:pPr algn="ctr"/>
+            <a:r>
+              <a:rPr lang="en-US" sz="1000" dirty="0">
+                <a:solidFill>
+                  <a:schemeClr val="tx1"/>
+                </a:solidFill>
+              </a:rPr>
+              <a:t>Edge Stack</a:t>
+            </a:r>
+          </a:p>
+        </p:txBody>
+      </p:sp>
+      <p:cxnSp>
+        <p:nvCxnSpPr>
+          <p:cNvPr id="49" name="Elbow Connector 48">
+            <a:extLst>
+              <a:ext uri="{FF2B5EF4-FFF2-40B4-BE49-F238E27FC236}">
+                <a16:creationId xmlns:a16="http://schemas.microsoft.com/office/drawing/2014/main" id="{D348109D-0466-F24B-8230-5F86DFAF84E7}"/>
+              </a:ext>
+            </a:extLst>
+          </p:cNvPr>
+          <p:cNvCxnSpPr>
+            <a:cxnSpLocks/>
+            <a:stCxn id="76" idx="1"/>
+            <a:endCxn id="128" idx="0"/>
+          </p:cNvCxnSpPr>
+          <p:nvPr/>
+        </p:nvCxnSpPr>
+        <p:spPr>
+          <a:xfrm rot="10800000" flipV="1">
+            <a:off x="3095032" y="1586241"/>
+            <a:ext cx="964584" cy="853971"/>
+          </a:xfrm>
+          <a:prstGeom prst="bentConnector2">
+            <a:avLst/>
+          </a:prstGeom>
+        </p:spPr>
+        <p:style>
+          <a:lnRef idx="1">
+            <a:schemeClr val="accent1"/>
+          </a:lnRef>
+          <a:fillRef idx="0">
+            <a:schemeClr val="accent1"/>
+          </a:fillRef>
+          <a:effectRef idx="0">
+            <a:schemeClr val="accent1"/>
+          </a:effectRef>
+          <a:fontRef idx="minor">
+            <a:schemeClr val="tx1"/>
+          </a:fontRef>
+        </p:style>
+      </p:cxnSp>
+      <p:sp>
+        <p:nvSpPr>
+          <p:cNvPr id="29" name="Rectangle 28">
+            <a:extLst>
+              <a:ext uri="{FF2B5EF4-FFF2-40B4-BE49-F238E27FC236}">
+                <a16:creationId xmlns:a16="http://schemas.microsoft.com/office/drawing/2014/main" id="{E064EA00-794F-AF4B-90E3-47998A1E35ED}"/>
+              </a:ext>
+            </a:extLst>
+          </p:cNvPr>
+          <p:cNvSpPr/>
+          <p:nvPr/>
+        </p:nvSpPr>
+        <p:spPr>
+          <a:xfrm>
+            <a:off x="5185993" y="812191"/>
+            <a:ext cx="1456269" cy="1136847"/>
+          </a:xfrm>
+          <a:prstGeom prst="rect">
+            <a:avLst/>
+          </a:prstGeom>
+          <a:noFill/>
+          <a:ln w="12700">
+            <a:solidFill>
+              <a:srgbClr val="879196"/>
+            </a:solidFill>
+            <a:prstDash val="dash"/>
+          </a:ln>
+        </p:spPr>
+        <p:style>
+          <a:lnRef idx="2">
+            <a:schemeClr val="accent1">
+              <a:shade val="50000"/>
+            </a:schemeClr>
+          </a:lnRef>
+          <a:fillRef idx="1">
+            <a:schemeClr val="accent1"/>
+          </a:fillRef>
+          <a:effectRef idx="0">
+            <a:schemeClr val="accent1"/>
+          </a:effectRef>
+          <a:fontRef idx="minor">
+            <a:schemeClr val="lt1"/>
+          </a:fontRef>
+        </p:style>
+        <p:txBody>
+          <a:bodyPr rot="0" spcFirstLastPara="0" vertOverflow="overflow" horzOverflow="overflow" vert="horz" wrap="square" lIns="91440" tIns="45720" rIns="91440" bIns="45720" numCol="1" spcCol="0" rtlCol="0" fromWordArt="0" anchor="t" anchorCtr="0" forceAA="0" compatLnSpc="1">
+            <a:prstTxWarp prst="textNoShape">
+              <a:avLst/>
+            </a:prstTxWarp>
+            <a:noAutofit/>
+          </a:bodyPr>
+          <a:lstStyle/>
+          <a:p>
+            <a:pPr algn="ctr"/>
+            <a:r>
+              <a:rPr lang="en-US" sz="1000" dirty="0">
+                <a:solidFill>
+                  <a:schemeClr val="tx1"/>
+                </a:solidFill>
+              </a:rPr>
+              <a:t>Identity Stack</a:t>
+            </a:r>
+          </a:p>
+        </p:txBody>
+      </p:sp>
+      <p:cxnSp>
+        <p:nvCxnSpPr>
+          <p:cNvPr id="32" name="Elbow Connector 31">
+            <a:extLst>
+              <a:ext uri="{FF2B5EF4-FFF2-40B4-BE49-F238E27FC236}">
+                <a16:creationId xmlns:a16="http://schemas.microsoft.com/office/drawing/2014/main" id="{14E9A652-295A-C742-A112-91106FAAFD65}"/>
+              </a:ext>
+            </a:extLst>
+          </p:cNvPr>
+          <p:cNvCxnSpPr>
+            <a:cxnSpLocks/>
+            <a:stCxn id="40" idx="2"/>
+            <a:endCxn id="84" idx="0"/>
+          </p:cNvCxnSpPr>
+          <p:nvPr/>
+        </p:nvCxnSpPr>
+        <p:spPr>
+          <a:xfrm rot="5400000">
+            <a:off x="7308905" y="2060957"/>
+            <a:ext cx="500048" cy="12700"/>
+          </a:xfrm>
+          <a:prstGeom prst="bentConnector3">
+            <a:avLst>
+              <a:gd name="adj1" fmla="val 50000"/>
+            </a:avLst>
+          </a:prstGeom>
+        </p:spPr>
+        <p:style>
+          <a:lnRef idx="1">
+            <a:schemeClr val="accent1"/>
+          </a:lnRef>
+          <a:fillRef idx="0">
+            <a:schemeClr val="accent1"/>
+          </a:fillRef>
+          <a:effectRef idx="0">
+            <a:schemeClr val="accent1"/>
+          </a:effectRef>
+          <a:fontRef idx="minor">
+            <a:schemeClr val="tx1"/>
+          </a:fontRef>
+        </p:style>
+      </p:cxnSp>
+      <p:cxnSp>
+        <p:nvCxnSpPr>
+          <p:cNvPr id="36" name="Elbow Connector 35">
+            <a:extLst>
+              <a:ext uri="{FF2B5EF4-FFF2-40B4-BE49-F238E27FC236}">
+                <a16:creationId xmlns:a16="http://schemas.microsoft.com/office/drawing/2014/main" id="{791BF6B9-5FF8-594A-BD2A-3A1E440CCD09}"/>
+              </a:ext>
+            </a:extLst>
+          </p:cNvPr>
+          <p:cNvCxnSpPr>
+            <a:cxnSpLocks/>
+            <a:stCxn id="37" idx="1"/>
+            <a:endCxn id="84" idx="3"/>
+          </p:cNvCxnSpPr>
+          <p:nvPr/>
+        </p:nvCxnSpPr>
+        <p:spPr>
+          <a:xfrm rot="10800000">
+            <a:off x="7914530" y="2666581"/>
+            <a:ext cx="795929" cy="3934"/>
+          </a:xfrm>
+          <a:prstGeom prst="bentConnector3">
+            <a:avLst>
+              <a:gd name="adj1" fmla="val 50000"/>
+            </a:avLst>
+          </a:prstGeom>
+        </p:spPr>
+        <p:style>
+          <a:lnRef idx="1">
+            <a:schemeClr val="accent1"/>
+          </a:lnRef>
+          <a:fillRef idx="0">
+            <a:schemeClr val="accent1"/>
+          </a:fillRef>
+          <a:effectRef idx="0">
+            <a:schemeClr val="accent1"/>
+          </a:effectRef>
+          <a:fontRef idx="minor">
+            <a:schemeClr val="tx1"/>
+          </a:fontRef>
+        </p:style>
+      </p:cxnSp>
+      <p:sp>
+        <p:nvSpPr>
+          <p:cNvPr id="2" name="TextBox 1">
+            <a:extLst>
+              <a:ext uri="{FF2B5EF4-FFF2-40B4-BE49-F238E27FC236}">
+                <a16:creationId xmlns:a16="http://schemas.microsoft.com/office/drawing/2014/main" id="{E7FBEA5F-E52F-A34D-8142-840A6750ED85}"/>
+              </a:ext>
+            </a:extLst>
+          </p:cNvPr>
+          <p:cNvSpPr txBox="1"/>
+          <p:nvPr/>
+        </p:nvSpPr>
+        <p:spPr>
+          <a:xfrm>
+            <a:off x="3134932" y="4509698"/>
+            <a:ext cx="977062" cy="461665"/>
+          </a:xfrm>
+          <a:prstGeom prst="rect">
+            <a:avLst/>
+          </a:prstGeom>
+          <a:noFill/>
+        </p:spPr>
+        <p:txBody>
+          <a:bodyPr wrap="none" rtlCol="0">
+            <a:spAutoFit/>
+          </a:bodyPr>
+          <a:lstStyle/>
+          <a:p>
+            <a:r>
+              <a:rPr lang="en-US" sz="1200" dirty="0"/>
+              <a:t>Source repo:</a:t>
+            </a:r>
+          </a:p>
+          <a:p>
+            <a:r>
+              <a:rPr lang="en-US" sz="1200" dirty="0"/>
+              <a:t>Github</a:t>
+            </a:r>
+          </a:p>
+        </p:txBody>
+      </p:sp>
+      <p:sp>
+        <p:nvSpPr>
+          <p:cNvPr id="3" name="Oval 2">
+            <a:extLst>
+              <a:ext uri="{FF2B5EF4-FFF2-40B4-BE49-F238E27FC236}">
+                <a16:creationId xmlns:a16="http://schemas.microsoft.com/office/drawing/2014/main" id="{0B28F176-BFEB-D842-8545-6E9ECCF0FB2C}"/>
+              </a:ext>
+            </a:extLst>
+          </p:cNvPr>
+          <p:cNvSpPr/>
+          <p:nvPr/>
+        </p:nvSpPr>
+        <p:spPr>
+          <a:xfrm>
+            <a:off x="6480475" y="683899"/>
+            <a:ext cx="276693" cy="293560"/>
+          </a:xfrm>
+          <a:prstGeom prst="ellipse">
+            <a:avLst/>
+          </a:prstGeom>
+          <a:solidFill>
+            <a:srgbClr val="FFFF00"/>
+          </a:solidFill>
+          <a:ln>
+            <a:solidFill>
+              <a:schemeClr val="tx1"/>
+            </a:solidFill>
+          </a:ln>
+        </p:spPr>
+        <p:style>
+          <a:lnRef idx="2">
+            <a:schemeClr val="accent1">
+              <a:shade val="50000"/>
+            </a:schemeClr>
+          </a:lnRef>
+          <a:fillRef idx="1">
+            <a:schemeClr val="accent1"/>
+          </a:fillRef>
+          <a:effectRef idx="0">
+            <a:schemeClr val="accent1"/>
+          </a:effectRef>
+          <a:fontRef idx="minor">
+            <a:schemeClr val="lt1"/>
+          </a:fontRef>
+        </p:style>
+        <p:txBody>
+          <a:bodyPr rtlCol="0" anchor="ctr"/>
+          <a:lstStyle/>
+          <a:p>
+            <a:pPr algn="ctr"/>
+            <a:r>
+              <a:rPr lang="en-US" sz="1200" dirty="0">
+                <a:solidFill>
+                  <a:schemeClr val="tx1"/>
+                </a:solidFill>
+              </a:rPr>
+              <a:t>1</a:t>
+            </a:r>
+          </a:p>
+        </p:txBody>
+      </p:sp>
+      <p:sp>
+        <p:nvSpPr>
+          <p:cNvPr id="28" name="Oval 27">
+            <a:extLst>
+              <a:ext uri="{FF2B5EF4-FFF2-40B4-BE49-F238E27FC236}">
+                <a16:creationId xmlns:a16="http://schemas.microsoft.com/office/drawing/2014/main" id="{3664BCE1-7E23-D642-9C75-485305C18757}"/>
+              </a:ext>
+            </a:extLst>
+          </p:cNvPr>
+          <p:cNvSpPr/>
+          <p:nvPr/>
+        </p:nvSpPr>
+        <p:spPr>
+          <a:xfrm>
+            <a:off x="8173499" y="1921363"/>
+            <a:ext cx="276693" cy="293560"/>
+          </a:xfrm>
+          <a:prstGeom prst="ellipse">
+            <a:avLst/>
+          </a:prstGeom>
+          <a:solidFill>
+            <a:srgbClr val="FFFF00"/>
+          </a:solidFill>
+          <a:ln>
+            <a:solidFill>
+              <a:schemeClr val="tx1"/>
+            </a:solidFill>
+          </a:ln>
+        </p:spPr>
+        <p:style>
+          <a:lnRef idx="2">
+            <a:schemeClr val="accent1">
+              <a:shade val="50000"/>
+            </a:schemeClr>
+          </a:lnRef>
+          <a:fillRef idx="1">
+            <a:schemeClr val="accent1"/>
+          </a:fillRef>
+          <a:effectRef idx="0">
+            <a:schemeClr val="accent1"/>
+          </a:effectRef>
+          <a:fontRef idx="minor">
+            <a:schemeClr val="lt1"/>
+          </a:fontRef>
+        </p:style>
+        <p:txBody>
+          <a:bodyPr rtlCol="0" anchor="ctr"/>
+          <a:lstStyle/>
+          <a:p>
+            <a:pPr algn="ctr"/>
+            <a:r>
+              <a:rPr lang="en-US" sz="1200" dirty="0">
+                <a:solidFill>
+                  <a:schemeClr val="tx1"/>
+                </a:solidFill>
+              </a:rPr>
+              <a:t>2</a:t>
+            </a:r>
+          </a:p>
+        </p:txBody>
+      </p:sp>
+      <p:sp>
+        <p:nvSpPr>
+          <p:cNvPr id="31" name="Oval 30">
+            <a:extLst>
+              <a:ext uri="{FF2B5EF4-FFF2-40B4-BE49-F238E27FC236}">
+                <a16:creationId xmlns:a16="http://schemas.microsoft.com/office/drawing/2014/main" id="{04A0F5D1-F0DD-1541-B18B-789A6CD06419}"/>
+              </a:ext>
+            </a:extLst>
+          </p:cNvPr>
+          <p:cNvSpPr/>
+          <p:nvPr/>
+        </p:nvSpPr>
+        <p:spPr>
+          <a:xfrm>
+            <a:off x="4803795" y="683899"/>
+            <a:ext cx="276693" cy="293560"/>
+          </a:xfrm>
+          <a:prstGeom prst="ellipse">
+            <a:avLst/>
+          </a:prstGeom>
+          <a:solidFill>
+            <a:srgbClr val="FFFF00"/>
+          </a:solidFill>
+          <a:ln>
+            <a:solidFill>
+              <a:schemeClr val="tx1"/>
+            </a:solidFill>
+          </a:ln>
+        </p:spPr>
+        <p:style>
+          <a:lnRef idx="2">
+            <a:schemeClr val="accent1">
+              <a:shade val="50000"/>
+            </a:schemeClr>
+          </a:lnRef>
+          <a:fillRef idx="1">
+            <a:schemeClr val="accent1"/>
+          </a:fillRef>
+          <a:effectRef idx="0">
+            <a:schemeClr val="accent1"/>
+          </a:effectRef>
+          <a:fontRef idx="minor">
+            <a:schemeClr val="lt1"/>
+          </a:fontRef>
+        </p:style>
+        <p:txBody>
+          <a:bodyPr rtlCol="0" anchor="ctr"/>
+          <a:lstStyle/>
+          <a:p>
+            <a:pPr algn="ctr"/>
+            <a:r>
+              <a:rPr lang="en-US" sz="1200" dirty="0">
+                <a:solidFill>
+                  <a:schemeClr val="tx1"/>
+                </a:solidFill>
+              </a:rPr>
+              <a:t>3</a:t>
+            </a:r>
+          </a:p>
+        </p:txBody>
+      </p:sp>
+      <p:sp>
+        <p:nvSpPr>
+          <p:cNvPr id="34" name="Rectangle 33">
+            <a:extLst>
+              <a:ext uri="{FF2B5EF4-FFF2-40B4-BE49-F238E27FC236}">
+                <a16:creationId xmlns:a16="http://schemas.microsoft.com/office/drawing/2014/main" id="{A285D32F-E7A1-9E45-8BC1-6B7557EFAC75}"/>
+              </a:ext>
+            </a:extLst>
+          </p:cNvPr>
+          <p:cNvSpPr/>
+          <p:nvPr/>
+        </p:nvSpPr>
+        <p:spPr>
+          <a:xfrm>
+            <a:off x="5185993" y="4216634"/>
+            <a:ext cx="2194890" cy="901015"/>
+          </a:xfrm>
+          <a:prstGeom prst="rect">
+            <a:avLst/>
+          </a:prstGeom>
+          <a:noFill/>
+          <a:ln w="12700">
+            <a:solidFill>
+              <a:srgbClr val="879196"/>
+            </a:solidFill>
+            <a:prstDash val="dash"/>
+          </a:ln>
+        </p:spPr>
+        <p:style>
+          <a:lnRef idx="2">
+            <a:schemeClr val="accent1">
+              <a:shade val="50000"/>
+            </a:schemeClr>
+          </a:lnRef>
+          <a:fillRef idx="1">
+            <a:schemeClr val="accent1"/>
+          </a:fillRef>
+          <a:effectRef idx="0">
+            <a:schemeClr val="accent1"/>
+          </a:effectRef>
+          <a:fontRef idx="minor">
+            <a:schemeClr val="lt1"/>
+          </a:fontRef>
+        </p:style>
+        <p:txBody>
+          <a:bodyPr rot="0" spcFirstLastPara="0" vertOverflow="overflow" horzOverflow="overflow" vert="horz" wrap="square" lIns="91440" tIns="45720" rIns="91440" bIns="45720" numCol="1" spcCol="0" rtlCol="0" fromWordArt="0" anchor="t" anchorCtr="0" forceAA="0" compatLnSpc="1">
+            <a:prstTxWarp prst="textNoShape">
+              <a:avLst/>
+            </a:prstTxWarp>
+            <a:noAutofit/>
+          </a:bodyPr>
+          <a:lstStyle/>
+          <a:p>
+            <a:pPr algn="r"/>
+            <a:r>
+              <a:rPr lang="en-US" sz="1000" dirty="0">
+                <a:solidFill>
+                  <a:schemeClr val="tx1"/>
+                </a:solidFill>
+              </a:rPr>
+              <a:t>Pipeline </a:t>
+            </a:r>
+          </a:p>
+          <a:p>
+            <a:pPr algn="r"/>
+            <a:r>
+              <a:rPr lang="en-US" sz="1000" dirty="0">
+                <a:solidFill>
+                  <a:schemeClr val="tx1"/>
+                </a:solidFill>
+              </a:rPr>
+              <a:t>Stack</a:t>
+            </a:r>
+          </a:p>
+        </p:txBody>
+      </p:sp>
+      <p:sp>
+        <p:nvSpPr>
+          <p:cNvPr id="35" name="TextBox 34">
+            <a:extLst>
+              <a:ext uri="{FF2B5EF4-FFF2-40B4-BE49-F238E27FC236}">
+                <a16:creationId xmlns:a16="http://schemas.microsoft.com/office/drawing/2014/main" id="{7E0730CC-58C4-8548-9786-0CB86674CA0E}"/>
+              </a:ext>
+            </a:extLst>
+          </p:cNvPr>
+          <p:cNvSpPr txBox="1"/>
+          <p:nvPr/>
+        </p:nvSpPr>
+        <p:spPr>
+          <a:xfrm>
+            <a:off x="9414929" y="2444330"/>
+            <a:ext cx="1372887" cy="461665"/>
+          </a:xfrm>
+          <a:prstGeom prst="rect">
+            <a:avLst/>
+          </a:prstGeom>
+          <a:noFill/>
+        </p:spPr>
+        <p:txBody>
+          <a:bodyPr wrap="square" rtlCol="0">
+            <a:spAutoFit/>
+          </a:bodyPr>
+          <a:lstStyle/>
+          <a:p>
+            <a:pPr algn="ctr"/>
+            <a:r>
+              <a:rPr lang="en-US" sz="1200" dirty="0"/>
+              <a:t>Order Flowers Bot:</a:t>
+            </a:r>
+          </a:p>
+          <a:p>
+            <a:pPr algn="ctr"/>
+            <a:r>
+              <a:rPr lang="en-US" sz="1200" dirty="0"/>
+              <a:t> Amazon Lex</a:t>
+            </a:r>
+          </a:p>
+        </p:txBody>
+      </p:sp>
+      <p:pic>
+        <p:nvPicPr>
+          <p:cNvPr id="37" name="Graphic 36">
+            <a:extLst>
+              <a:ext uri="{FF2B5EF4-FFF2-40B4-BE49-F238E27FC236}">
+                <a16:creationId xmlns:a16="http://schemas.microsoft.com/office/drawing/2014/main" id="{34D14EE3-2832-7E4F-A6B0-A29542724564}"/>
+              </a:ext>
+            </a:extLst>
+          </p:cNvPr>
+          <p:cNvPicPr>
+            <a:picLocks noChangeAspect="1"/>
+          </p:cNvPicPr>
+          <p:nvPr/>
+        </p:nvPicPr>
+        <p:blipFill>
+          <a:blip r:embed="rId2">
+            <a:extLst>
+              <a:ext uri="{96DAC541-7B7A-43D3-8B79-37D633B846F1}">
+                <asvg:svgBlip xmlns:asvg="http://schemas.microsoft.com/office/drawing/2016/SVG/main" r:embed="rId3"/>
+              </a:ext>
+            </a:extLst>
+          </a:blip>
+          <a:stretch>
+            <a:fillRect/>
+          </a:stretch>
+        </p:blipFill>
+        <p:spPr>
+          <a:xfrm>
+            <a:off x="8710458" y="2314915"/>
+            <a:ext cx="711200" cy="711200"/>
+          </a:xfrm>
+          <a:prstGeom prst="rect">
+            <a:avLst/>
+          </a:prstGeom>
+        </p:spPr>
+      </p:pic>
+      <p:sp>
+        <p:nvSpPr>
+          <p:cNvPr id="38" name="TextBox 37">
+            <a:extLst>
+              <a:ext uri="{FF2B5EF4-FFF2-40B4-BE49-F238E27FC236}">
+                <a16:creationId xmlns:a16="http://schemas.microsoft.com/office/drawing/2014/main" id="{4A1D4F8C-CE3E-094C-9E35-4296DFB299B0}"/>
+              </a:ext>
+            </a:extLst>
+          </p:cNvPr>
+          <p:cNvSpPr txBox="1"/>
+          <p:nvPr/>
+        </p:nvSpPr>
+        <p:spPr>
+          <a:xfrm>
+            <a:off x="7867604" y="1189606"/>
+            <a:ext cx="1547325" cy="461665"/>
+          </a:xfrm>
+          <a:prstGeom prst="rect">
+            <a:avLst/>
+          </a:prstGeom>
+          <a:noFill/>
+        </p:spPr>
+        <p:txBody>
+          <a:bodyPr wrap="square" rtlCol="0">
+            <a:spAutoFit/>
+          </a:bodyPr>
+          <a:lstStyle/>
+          <a:p>
+            <a:pPr algn="ctr"/>
+            <a:r>
+              <a:rPr lang="en-US" sz="1200" dirty="0"/>
+              <a:t>Side-Processor: </a:t>
+            </a:r>
+          </a:p>
+          <a:p>
+            <a:pPr algn="ctr"/>
+            <a:r>
+              <a:rPr lang="en-US" sz="1200" dirty="0"/>
+              <a:t>Amazon Translate</a:t>
+            </a:r>
+          </a:p>
+        </p:txBody>
+      </p:sp>
+      <p:pic>
+        <p:nvPicPr>
+          <p:cNvPr id="40" name="Graphic 39">
+            <a:extLst>
+              <a:ext uri="{FF2B5EF4-FFF2-40B4-BE49-F238E27FC236}">
+                <a16:creationId xmlns:a16="http://schemas.microsoft.com/office/drawing/2014/main" id="{3AD7C85A-3BF3-E444-88CD-45217787FA24}"/>
+              </a:ext>
+            </a:extLst>
+          </p:cNvPr>
+          <p:cNvPicPr>
+            <a:picLocks noChangeAspect="1"/>
+          </p:cNvPicPr>
+          <p:nvPr/>
+        </p:nvPicPr>
+        <p:blipFill>
+          <a:blip r:embed="rId4">
+            <a:extLst>
+              <a:ext uri="{96DAC541-7B7A-43D3-8B79-37D633B846F1}">
+                <asvg:svgBlip xmlns:asvg="http://schemas.microsoft.com/office/drawing/2016/SVG/main" r:embed="rId5"/>
+              </a:ext>
+            </a:extLst>
+          </a:blip>
+          <a:stretch>
+            <a:fillRect/>
+          </a:stretch>
+        </p:blipFill>
+        <p:spPr>
+          <a:xfrm>
+            <a:off x="7203329" y="1099733"/>
+            <a:ext cx="711200" cy="711200"/>
+          </a:xfrm>
+          <a:prstGeom prst="rect">
+            <a:avLst/>
+          </a:prstGeom>
+        </p:spPr>
+      </p:pic>
+      <p:pic>
+        <p:nvPicPr>
+          <p:cNvPr id="41" name="Graphic 40">
+            <a:extLst>
+              <a:ext uri="{FF2B5EF4-FFF2-40B4-BE49-F238E27FC236}">
+                <a16:creationId xmlns:a16="http://schemas.microsoft.com/office/drawing/2014/main" id="{185AE6FB-7B95-5041-BE83-C83D983919BC}"/>
+              </a:ext>
+            </a:extLst>
+          </p:cNvPr>
+          <p:cNvPicPr>
+            <a:picLocks noChangeAspect="1"/>
+          </p:cNvPicPr>
+          <p:nvPr/>
+        </p:nvPicPr>
+        <p:blipFill>
+          <a:blip r:embed="rId6">
+            <a:extLst>
+              <a:ext uri="{96DAC541-7B7A-43D3-8B79-37D633B846F1}">
+                <asvg:svgBlip xmlns:asvg="http://schemas.microsoft.com/office/drawing/2016/SVG/main" r:embed="rId7"/>
+              </a:ext>
+            </a:extLst>
+          </a:blip>
+          <a:stretch>
+            <a:fillRect/>
+          </a:stretch>
+        </p:blipFill>
+        <p:spPr>
+          <a:xfrm>
+            <a:off x="5550794" y="4317310"/>
+            <a:ext cx="712979" cy="712979"/>
+          </a:xfrm>
+          <a:prstGeom prst="rect">
+            <a:avLst/>
+          </a:prstGeom>
+        </p:spPr>
+      </p:pic>
+      <p:sp>
+        <p:nvSpPr>
+          <p:cNvPr id="42" name="TextBox 41">
+            <a:extLst>
+              <a:ext uri="{FF2B5EF4-FFF2-40B4-BE49-F238E27FC236}">
+                <a16:creationId xmlns:a16="http://schemas.microsoft.com/office/drawing/2014/main" id="{83C78666-88C5-CB4E-A0AF-3C8E87B9AA56}"/>
+              </a:ext>
+            </a:extLst>
+          </p:cNvPr>
+          <p:cNvSpPr txBox="1"/>
+          <p:nvPr/>
+        </p:nvSpPr>
+        <p:spPr>
+          <a:xfrm>
+            <a:off x="6128755" y="4792765"/>
+            <a:ext cx="1372887" cy="276999"/>
+          </a:xfrm>
+          <a:prstGeom prst="rect">
+            <a:avLst/>
+          </a:prstGeom>
+          <a:noFill/>
+        </p:spPr>
+        <p:txBody>
+          <a:bodyPr wrap="square" rtlCol="0">
+            <a:spAutoFit/>
+          </a:bodyPr>
+          <a:lstStyle/>
+          <a:p>
+            <a:pPr algn="ctr"/>
+            <a:r>
+              <a:rPr lang="en-US" sz="1200" dirty="0"/>
+              <a:t>CodePipeline</a:t>
+            </a:r>
+          </a:p>
+        </p:txBody>
+      </p:sp>
+      <p:pic>
+        <p:nvPicPr>
+          <p:cNvPr id="8" name="Picture 7">
+            <a:extLst>
+              <a:ext uri="{FF2B5EF4-FFF2-40B4-BE49-F238E27FC236}">
+                <a16:creationId xmlns:a16="http://schemas.microsoft.com/office/drawing/2014/main" id="{93CFE4D0-9800-334C-ADE0-BD8B715122BC}"/>
+              </a:ext>
+            </a:extLst>
+          </p:cNvPr>
+          <p:cNvPicPr>
+            <a:picLocks noChangeAspect="1"/>
+          </p:cNvPicPr>
+          <p:nvPr/>
+        </p:nvPicPr>
+        <p:blipFill>
+          <a:blip r:embed="rId8"/>
+          <a:stretch>
+            <a:fillRect/>
+          </a:stretch>
+        </p:blipFill>
+        <p:spPr>
+          <a:xfrm>
+            <a:off x="4049125" y="4250358"/>
+            <a:ext cx="833565" cy="833565"/>
+          </a:xfrm>
+          <a:prstGeom prst="rect">
+            <a:avLst/>
+          </a:prstGeom>
+        </p:spPr>
+      </p:pic>
+      <p:cxnSp>
+        <p:nvCxnSpPr>
+          <p:cNvPr id="44" name="Elbow Connector 43">
+            <a:extLst>
+              <a:ext uri="{FF2B5EF4-FFF2-40B4-BE49-F238E27FC236}">
+                <a16:creationId xmlns:a16="http://schemas.microsoft.com/office/drawing/2014/main" id="{92FFCEB7-9510-5145-97F6-09FBD780021F}"/>
+              </a:ext>
+            </a:extLst>
+          </p:cNvPr>
+          <p:cNvCxnSpPr>
+            <a:cxnSpLocks/>
+            <a:stCxn id="66" idx="3"/>
+            <a:endCxn id="85" idx="1"/>
+          </p:cNvCxnSpPr>
+          <p:nvPr/>
+        </p:nvCxnSpPr>
+        <p:spPr>
+          <a:xfrm>
+            <a:off x="4760700" y="2668536"/>
+            <a:ext cx="800300" cy="6627"/>
+          </a:xfrm>
+          <a:prstGeom prst="bentConnector3">
+            <a:avLst>
+              <a:gd name="adj1" fmla="val 50000"/>
+            </a:avLst>
+          </a:prstGeom>
+        </p:spPr>
+        <p:style>
+          <a:lnRef idx="1">
+            <a:schemeClr val="accent1"/>
+          </a:lnRef>
+          <a:fillRef idx="0">
+            <a:schemeClr val="accent1"/>
+          </a:fillRef>
+          <a:effectRef idx="0">
+            <a:schemeClr val="accent1"/>
+          </a:effectRef>
+          <a:fontRef idx="minor">
+            <a:schemeClr val="tx1"/>
+          </a:fontRef>
+        </p:style>
+      </p:cxnSp>
+      <p:cxnSp>
+        <p:nvCxnSpPr>
+          <p:cNvPr id="51" name="Elbow Connector 50">
+            <a:extLst>
+              <a:ext uri="{FF2B5EF4-FFF2-40B4-BE49-F238E27FC236}">
+                <a16:creationId xmlns:a16="http://schemas.microsoft.com/office/drawing/2014/main" id="{5600E802-A826-3D4C-B181-CAF77B25EA8F}"/>
+              </a:ext>
+            </a:extLst>
+          </p:cNvPr>
+          <p:cNvCxnSpPr>
+            <a:cxnSpLocks/>
+            <a:stCxn id="41" idx="0"/>
+            <a:endCxn id="65" idx="3"/>
+          </p:cNvCxnSpPr>
+          <p:nvPr/>
+        </p:nvCxnSpPr>
+        <p:spPr>
+          <a:xfrm rot="16200000" flipV="1">
+            <a:off x="4992419" y="3402445"/>
+            <a:ext cx="683147" cy="1146584"/>
+          </a:xfrm>
+          <a:prstGeom prst="bentConnector2">
+            <a:avLst/>
+          </a:prstGeom>
+          <a:ln>
+            <a:solidFill>
+              <a:srgbClr val="7030A0"/>
+            </a:solidFill>
+            <a:tailEnd type="triangle"/>
+          </a:ln>
+        </p:spPr>
+        <p:style>
+          <a:lnRef idx="1">
+            <a:schemeClr val="accent1"/>
+          </a:lnRef>
+          <a:fillRef idx="0">
+            <a:schemeClr val="accent1"/>
+          </a:fillRef>
+          <a:effectRef idx="0">
+            <a:schemeClr val="accent1"/>
+          </a:effectRef>
+          <a:fontRef idx="minor">
+            <a:schemeClr val="tx1"/>
+          </a:fontRef>
+        </p:style>
+      </p:cxnSp>
+      <p:cxnSp>
+        <p:nvCxnSpPr>
+          <p:cNvPr id="55" name="Elbow Connector 54">
+            <a:extLst>
+              <a:ext uri="{FF2B5EF4-FFF2-40B4-BE49-F238E27FC236}">
+                <a16:creationId xmlns:a16="http://schemas.microsoft.com/office/drawing/2014/main" id="{25B90644-52E5-3A43-AAC9-DB811F5158FC}"/>
+              </a:ext>
+            </a:extLst>
+          </p:cNvPr>
+          <p:cNvCxnSpPr>
+            <a:cxnSpLocks/>
+            <a:stCxn id="41" idx="3"/>
+            <a:endCxn id="16" idx="2"/>
+          </p:cNvCxnSpPr>
+          <p:nvPr/>
+        </p:nvCxnSpPr>
+        <p:spPr>
+          <a:xfrm flipV="1">
+            <a:off x="6263773" y="3248530"/>
+            <a:ext cx="493395" cy="1425270"/>
+          </a:xfrm>
+          <a:prstGeom prst="bentConnector2">
+            <a:avLst/>
+          </a:prstGeom>
+          <a:ln>
+            <a:solidFill>
+              <a:srgbClr val="7030A0"/>
+            </a:solidFill>
+            <a:tailEnd type="triangle"/>
+          </a:ln>
+        </p:spPr>
+        <p:style>
+          <a:lnRef idx="1">
+            <a:schemeClr val="accent1"/>
+          </a:lnRef>
+          <a:fillRef idx="0">
+            <a:schemeClr val="accent1"/>
+          </a:fillRef>
+          <a:effectRef idx="0">
+            <a:schemeClr val="accent1"/>
+          </a:effectRef>
+          <a:fontRef idx="minor">
+            <a:schemeClr val="tx1"/>
+          </a:fontRef>
+        </p:style>
+      </p:cxnSp>
+      <p:cxnSp>
+        <p:nvCxnSpPr>
+          <p:cNvPr id="61" name="Elbow Connector 60">
+            <a:extLst>
+              <a:ext uri="{FF2B5EF4-FFF2-40B4-BE49-F238E27FC236}">
+                <a16:creationId xmlns:a16="http://schemas.microsoft.com/office/drawing/2014/main" id="{7650FA1A-AF8F-9646-8F17-E2189C81EC07}"/>
+              </a:ext>
+            </a:extLst>
+          </p:cNvPr>
+          <p:cNvCxnSpPr>
+            <a:cxnSpLocks/>
+            <a:stCxn id="8" idx="3"/>
+            <a:endCxn id="41" idx="1"/>
+          </p:cNvCxnSpPr>
+          <p:nvPr/>
+        </p:nvCxnSpPr>
+        <p:spPr>
+          <a:xfrm>
+            <a:off x="4882690" y="4667141"/>
+            <a:ext cx="668104" cy="6659"/>
+          </a:xfrm>
+          <a:prstGeom prst="bentConnector3">
+            <a:avLst>
+              <a:gd name="adj1" fmla="val 50000"/>
+            </a:avLst>
+          </a:prstGeom>
+          <a:ln>
+            <a:solidFill>
+              <a:srgbClr val="7030A0"/>
+            </a:solidFill>
+            <a:tailEnd type="triangle"/>
+          </a:ln>
+        </p:spPr>
+        <p:style>
+          <a:lnRef idx="1">
+            <a:schemeClr val="accent1"/>
+          </a:lnRef>
+          <a:fillRef idx="0">
+            <a:schemeClr val="accent1"/>
+          </a:fillRef>
+          <a:effectRef idx="0">
+            <a:schemeClr val="accent1"/>
+          </a:effectRef>
+          <a:fontRef idx="minor">
+            <a:schemeClr val="tx1"/>
+          </a:fontRef>
+        </p:style>
+      </p:cxnSp>
+      <p:pic>
+        <p:nvPicPr>
+          <p:cNvPr id="65" name="Graphic 64">
+            <a:extLst>
+              <a:ext uri="{FF2B5EF4-FFF2-40B4-BE49-F238E27FC236}">
+                <a16:creationId xmlns:a16="http://schemas.microsoft.com/office/drawing/2014/main" id="{95A04EFC-6495-634C-9578-149AE7A2627F}"/>
+              </a:ext>
+            </a:extLst>
+          </p:cNvPr>
+          <p:cNvPicPr>
+            <a:picLocks noChangeAspect="1"/>
+          </p:cNvPicPr>
+          <p:nvPr/>
+        </p:nvPicPr>
+        <p:blipFill>
+          <a:blip r:embed="rId9">
+            <a:extLst>
+              <a:ext uri="{96DAC541-7B7A-43D3-8B79-37D633B846F1}">
+                <asvg:svgBlip xmlns:asvg="http://schemas.microsoft.com/office/drawing/2016/SVG/main" r:embed="rId10"/>
+              </a:ext>
+            </a:extLst>
+          </a:blip>
+          <a:stretch>
+            <a:fillRect/>
+          </a:stretch>
+        </p:blipFill>
+        <p:spPr>
+          <a:xfrm>
+            <a:off x="4065490" y="3286558"/>
+            <a:ext cx="695210" cy="695210"/>
+          </a:xfrm>
+          <a:prstGeom prst="rect">
+            <a:avLst/>
+          </a:prstGeom>
+        </p:spPr>
+      </p:pic>
+      <p:pic>
+        <p:nvPicPr>
+          <p:cNvPr id="66" name="Graphic 65">
+            <a:extLst>
+              <a:ext uri="{FF2B5EF4-FFF2-40B4-BE49-F238E27FC236}">
+                <a16:creationId xmlns:a16="http://schemas.microsoft.com/office/drawing/2014/main" id="{63B5BE2E-EE8F-4C4B-8E37-52508DA45F01}"/>
+              </a:ext>
+            </a:extLst>
+          </p:cNvPr>
+          <p:cNvPicPr>
+            <a:picLocks noChangeAspect="1"/>
+          </p:cNvPicPr>
+          <p:nvPr/>
+        </p:nvPicPr>
+        <p:blipFill>
+          <a:blip r:embed="rId11">
+            <a:extLst>
+              <a:ext uri="{96DAC541-7B7A-43D3-8B79-37D633B846F1}">
+                <asvg:svgBlip xmlns:asvg="http://schemas.microsoft.com/office/drawing/2016/SVG/main" r:embed="rId12"/>
+              </a:ext>
+            </a:extLst>
+          </a:blip>
+          <a:stretch>
+            <a:fillRect/>
+          </a:stretch>
+        </p:blipFill>
+        <p:spPr>
+          <a:xfrm>
+            <a:off x="4049500" y="2312936"/>
+            <a:ext cx="711200" cy="711200"/>
+          </a:xfrm>
+          <a:prstGeom prst="rect">
+            <a:avLst/>
+          </a:prstGeom>
+        </p:spPr>
+      </p:pic>
+      <p:pic>
+        <p:nvPicPr>
+          <p:cNvPr id="76" name="Graphic 75">
+            <a:extLst>
+              <a:ext uri="{FF2B5EF4-FFF2-40B4-BE49-F238E27FC236}">
+                <a16:creationId xmlns:a16="http://schemas.microsoft.com/office/drawing/2014/main" id="{33622E83-3954-204B-A0E6-276D981E1428}"/>
+              </a:ext>
+            </a:extLst>
+          </p:cNvPr>
+          <p:cNvPicPr>
+            <a:picLocks noChangeAspect="1"/>
+          </p:cNvPicPr>
+          <p:nvPr/>
+        </p:nvPicPr>
+        <p:blipFill>
+          <a:blip r:embed="rId13">
+            <a:extLst>
+              <a:ext uri="{96DAC541-7B7A-43D3-8B79-37D633B846F1}">
+                <asvg:svgBlip xmlns:asvg="http://schemas.microsoft.com/office/drawing/2016/SVG/main" r:embed="rId14"/>
+              </a:ext>
+            </a:extLst>
+          </a:blip>
+          <a:stretch>
+            <a:fillRect/>
+          </a:stretch>
+        </p:blipFill>
+        <p:spPr>
+          <a:xfrm>
+            <a:off x="4059616" y="1230642"/>
+            <a:ext cx="711200" cy="711200"/>
+          </a:xfrm>
+          <a:prstGeom prst="rect">
+            <a:avLst/>
+          </a:prstGeom>
+        </p:spPr>
+      </p:pic>
+      <p:pic>
+        <p:nvPicPr>
+          <p:cNvPr id="78" name="Graphic 77">
+            <a:extLst>
+              <a:ext uri="{FF2B5EF4-FFF2-40B4-BE49-F238E27FC236}">
+                <a16:creationId xmlns:a16="http://schemas.microsoft.com/office/drawing/2014/main" id="{6606E9C3-91AB-2340-BAD3-350A4BE01804}"/>
+              </a:ext>
+            </a:extLst>
+          </p:cNvPr>
+          <p:cNvPicPr>
+            <a:picLocks noChangeAspect="1"/>
+          </p:cNvPicPr>
+          <p:nvPr/>
+        </p:nvPicPr>
+        <p:blipFill>
+          <a:blip r:embed="rId15">
+            <a:extLst>
+              <a:ext uri="{96DAC541-7B7A-43D3-8B79-37D633B846F1}">
+                <asvg:svgBlip xmlns:asvg="http://schemas.microsoft.com/office/drawing/2016/SVG/main" r:embed="rId16"/>
+              </a:ext>
+            </a:extLst>
+          </a:blip>
+          <a:stretch>
+            <a:fillRect/>
+          </a:stretch>
+        </p:blipFill>
+        <p:spPr>
+          <a:xfrm>
+            <a:off x="5558527" y="1166966"/>
+            <a:ext cx="711200" cy="711200"/>
+          </a:xfrm>
+          <a:prstGeom prst="rect">
+            <a:avLst/>
+          </a:prstGeom>
+        </p:spPr>
+      </p:pic>
+      <p:pic>
+        <p:nvPicPr>
+          <p:cNvPr id="84" name="Graphic 83">
+            <a:extLst>
+              <a:ext uri="{FF2B5EF4-FFF2-40B4-BE49-F238E27FC236}">
+                <a16:creationId xmlns:a16="http://schemas.microsoft.com/office/drawing/2014/main" id="{C5F73DB6-5F7C-3F44-881D-2FB522345563}"/>
+              </a:ext>
+            </a:extLst>
+          </p:cNvPr>
+          <p:cNvPicPr>
+            <a:picLocks noChangeAspect="1"/>
+          </p:cNvPicPr>
+          <p:nvPr/>
+        </p:nvPicPr>
+        <p:blipFill>
+          <a:blip r:embed="rId17">
+            <a:extLst>
+              <a:ext uri="{96DAC541-7B7A-43D3-8B79-37D633B846F1}">
+                <asvg:svgBlip xmlns:asvg="http://schemas.microsoft.com/office/drawing/2016/SVG/main" r:embed="rId18"/>
+              </a:ext>
+            </a:extLst>
+          </a:blip>
+          <a:stretch>
+            <a:fillRect/>
+          </a:stretch>
+        </p:blipFill>
+        <p:spPr>
+          <a:xfrm>
+            <a:off x="7203329" y="2310981"/>
+            <a:ext cx="711200" cy="711200"/>
+          </a:xfrm>
+          <a:prstGeom prst="rect">
+            <a:avLst/>
+          </a:prstGeom>
+        </p:spPr>
+      </p:pic>
+      <p:pic>
+        <p:nvPicPr>
+          <p:cNvPr id="85" name="Graphic 84">
+            <a:extLst>
+              <a:ext uri="{FF2B5EF4-FFF2-40B4-BE49-F238E27FC236}">
+                <a16:creationId xmlns:a16="http://schemas.microsoft.com/office/drawing/2014/main" id="{4F9845CA-975F-2045-B437-2283F9D9C337}"/>
+              </a:ext>
+            </a:extLst>
+          </p:cNvPr>
+          <p:cNvPicPr>
+            <a:picLocks noChangeAspect="1"/>
+          </p:cNvPicPr>
+          <p:nvPr/>
+        </p:nvPicPr>
+        <p:blipFill>
+          <a:blip r:embed="rId19">
+            <a:extLst>
+              <a:ext uri="{96DAC541-7B7A-43D3-8B79-37D633B846F1}">
+                <asvg:svgBlip xmlns:asvg="http://schemas.microsoft.com/office/drawing/2016/SVG/main" r:embed="rId20"/>
+              </a:ext>
+            </a:extLst>
+          </a:blip>
+          <a:stretch>
+            <a:fillRect/>
+          </a:stretch>
+        </p:blipFill>
+        <p:spPr>
+          <a:xfrm>
+            <a:off x="5561000" y="2319563"/>
+            <a:ext cx="711200" cy="711200"/>
+          </a:xfrm>
+          <a:prstGeom prst="rect">
+            <a:avLst/>
+          </a:prstGeom>
+        </p:spPr>
+      </p:pic>
+      <p:sp>
+        <p:nvSpPr>
+          <p:cNvPr id="100" name="Oval 99">
+            <a:extLst>
+              <a:ext uri="{FF2B5EF4-FFF2-40B4-BE49-F238E27FC236}">
+                <a16:creationId xmlns:a16="http://schemas.microsoft.com/office/drawing/2014/main" id="{CD0923B5-2719-8344-98FD-746F08FD1383}"/>
+              </a:ext>
+            </a:extLst>
+          </p:cNvPr>
+          <p:cNvSpPr/>
+          <p:nvPr/>
+        </p:nvSpPr>
+        <p:spPr>
+          <a:xfrm>
+            <a:off x="7248608" y="3997923"/>
+            <a:ext cx="276693" cy="293560"/>
+          </a:xfrm>
+          <a:prstGeom prst="ellipse">
+            <a:avLst/>
+          </a:prstGeom>
+          <a:solidFill>
+            <a:srgbClr val="FFFF00"/>
+          </a:solidFill>
+          <a:ln>
+            <a:solidFill>
+              <a:schemeClr val="tx1"/>
+            </a:solidFill>
+          </a:ln>
+        </p:spPr>
+        <p:style>
+          <a:lnRef idx="2">
+            <a:schemeClr val="accent1">
+              <a:shade val="50000"/>
+            </a:schemeClr>
+          </a:lnRef>
+          <a:fillRef idx="1">
+            <a:schemeClr val="accent1"/>
+          </a:fillRef>
+          <a:effectRef idx="0">
+            <a:schemeClr val="accent1"/>
+          </a:effectRef>
+          <a:fontRef idx="minor">
+            <a:schemeClr val="lt1"/>
+          </a:fontRef>
+        </p:style>
+        <p:txBody>
+          <a:bodyPr rtlCol="0" anchor="ctr"/>
+          <a:lstStyle/>
+          <a:p>
+            <a:pPr algn="ctr"/>
+            <a:r>
+              <a:rPr lang="en-US" sz="1200" dirty="0">
+                <a:solidFill>
+                  <a:schemeClr val="tx1"/>
+                </a:solidFill>
+              </a:rPr>
+              <a:t>4</a:t>
+            </a:r>
+          </a:p>
+        </p:txBody>
+      </p:sp>
+      <p:sp>
+        <p:nvSpPr>
+          <p:cNvPr id="107" name="TextBox 106">
+            <a:extLst>
+              <a:ext uri="{FF2B5EF4-FFF2-40B4-BE49-F238E27FC236}">
+                <a16:creationId xmlns:a16="http://schemas.microsoft.com/office/drawing/2014/main" id="{09AB3470-69DB-2741-BFAF-6D61F0396607}"/>
+              </a:ext>
+            </a:extLst>
+          </p:cNvPr>
+          <p:cNvSpPr txBox="1"/>
+          <p:nvPr/>
+        </p:nvSpPr>
+        <p:spPr>
+          <a:xfrm>
+            <a:off x="5053513" y="3670068"/>
+            <a:ext cx="860430" cy="430887"/>
+          </a:xfrm>
+          <a:prstGeom prst="rect">
+            <a:avLst/>
+          </a:prstGeom>
+          <a:noFill/>
+        </p:spPr>
+        <p:txBody>
+          <a:bodyPr wrap="square" rtlCol="0">
+            <a:spAutoFit/>
+          </a:bodyPr>
+          <a:lstStyle/>
+          <a:p>
+            <a:pPr algn="ctr"/>
+            <a:r>
+              <a:rPr lang="en-US" sz="1100" dirty="0"/>
+              <a:t>Deploy website</a:t>
+            </a:r>
+          </a:p>
+        </p:txBody>
+      </p:sp>
+      <p:sp>
+        <p:nvSpPr>
+          <p:cNvPr id="108" name="TextBox 107">
+            <a:extLst>
+              <a:ext uri="{FF2B5EF4-FFF2-40B4-BE49-F238E27FC236}">
+                <a16:creationId xmlns:a16="http://schemas.microsoft.com/office/drawing/2014/main" id="{AF687F40-9C12-6049-86AC-6ECFCB84D7A9}"/>
+              </a:ext>
+            </a:extLst>
+          </p:cNvPr>
+          <p:cNvSpPr txBox="1"/>
+          <p:nvPr/>
+        </p:nvSpPr>
+        <p:spPr>
+          <a:xfrm>
+            <a:off x="5898550" y="3911409"/>
+            <a:ext cx="860430" cy="261610"/>
+          </a:xfrm>
+          <a:prstGeom prst="rect">
+            <a:avLst/>
+          </a:prstGeom>
+          <a:noFill/>
+        </p:spPr>
+        <p:txBody>
+          <a:bodyPr wrap="square" rtlCol="0">
+            <a:spAutoFit/>
+          </a:bodyPr>
+          <a:lstStyle/>
+          <a:p>
+            <a:pPr algn="ctr"/>
+            <a:r>
+              <a:rPr lang="en-US" sz="1100" dirty="0"/>
+              <a:t>Deploy API</a:t>
+            </a:r>
+          </a:p>
+        </p:txBody>
+      </p:sp>
+      <p:sp>
+        <p:nvSpPr>
+          <p:cNvPr id="109" name="TextBox 108">
+            <a:extLst>
+              <a:ext uri="{FF2B5EF4-FFF2-40B4-BE49-F238E27FC236}">
+                <a16:creationId xmlns:a16="http://schemas.microsoft.com/office/drawing/2014/main" id="{1C228791-AD71-9742-BFE1-C9D639D28DFD}"/>
+              </a:ext>
+            </a:extLst>
+          </p:cNvPr>
+          <p:cNvSpPr txBox="1"/>
+          <p:nvPr/>
+        </p:nvSpPr>
+        <p:spPr>
+          <a:xfrm>
+            <a:off x="2634594" y="3029985"/>
+            <a:ext cx="1081065" cy="461665"/>
+          </a:xfrm>
+          <a:prstGeom prst="rect">
+            <a:avLst/>
+          </a:prstGeom>
+          <a:noFill/>
+        </p:spPr>
+        <p:txBody>
+          <a:bodyPr wrap="none" rtlCol="0">
+            <a:spAutoFit/>
+          </a:bodyPr>
+          <a:lstStyle/>
+          <a:p>
+            <a:r>
+              <a:rPr lang="en-US" sz="1200" dirty="0"/>
+              <a:t>Multilanguage</a:t>
+            </a:r>
+          </a:p>
+          <a:p>
+            <a:r>
+              <a:rPr lang="en-US" sz="1200" dirty="0"/>
+              <a:t>Users</a:t>
+            </a:r>
+          </a:p>
+        </p:txBody>
+      </p:sp>
+      <p:pic>
+        <p:nvPicPr>
+          <p:cNvPr id="126" name="Graphic 125">
+            <a:extLst>
+              <a:ext uri="{FF2B5EF4-FFF2-40B4-BE49-F238E27FC236}">
+                <a16:creationId xmlns:a16="http://schemas.microsoft.com/office/drawing/2014/main" id="{F0F4E78F-9B5C-044D-8F8B-24233E51007D}"/>
+              </a:ext>
+            </a:extLst>
+          </p:cNvPr>
+          <p:cNvPicPr>
+            <a:picLocks noChangeAspect="1"/>
+          </p:cNvPicPr>
+          <p:nvPr/>
+        </p:nvPicPr>
+        <p:blipFill>
+          <a:blip r:embed="rId21">
+            <a:extLst>
+              <a:ext uri="{96DAC541-7B7A-43D3-8B79-37D633B846F1}">
+                <asvg:svgBlip xmlns:asvg="http://schemas.microsoft.com/office/drawing/2016/SVG/main" r:embed="rId22"/>
+              </a:ext>
+            </a:extLst>
+          </a:blip>
+          <a:stretch>
+            <a:fillRect/>
+          </a:stretch>
+        </p:blipFill>
+        <p:spPr>
+          <a:xfrm flipH="1">
+            <a:off x="5645169" y="5366802"/>
+            <a:ext cx="483586" cy="469900"/>
+          </a:xfrm>
+          <a:prstGeom prst="rect">
+            <a:avLst/>
+          </a:prstGeom>
+        </p:spPr>
+      </p:pic>
+      <p:sp>
+        <p:nvSpPr>
+          <p:cNvPr id="127" name="TextBox 126">
+            <a:extLst>
+              <a:ext uri="{FF2B5EF4-FFF2-40B4-BE49-F238E27FC236}">
+                <a16:creationId xmlns:a16="http://schemas.microsoft.com/office/drawing/2014/main" id="{DAC9E563-A2EC-B240-A022-A40592CC32C3}"/>
+              </a:ext>
+            </a:extLst>
+          </p:cNvPr>
+          <p:cNvSpPr txBox="1"/>
+          <p:nvPr/>
+        </p:nvSpPr>
+        <p:spPr>
+          <a:xfrm>
+            <a:off x="5140944" y="5890336"/>
+            <a:ext cx="1506552" cy="307777"/>
+          </a:xfrm>
+          <a:prstGeom prst="rect">
+            <a:avLst/>
+          </a:prstGeom>
+          <a:noFill/>
+        </p:spPr>
+        <p:txBody>
+          <a:bodyPr wrap="square" rtlCol="0">
+            <a:spAutoFit/>
+          </a:bodyPr>
+          <a:lstStyle/>
+          <a:p>
+            <a:pPr algn="ctr"/>
+            <a:r>
+              <a:rPr lang="en-US" sz="1400" dirty="0"/>
+              <a:t>Engineering</a:t>
+            </a:r>
+          </a:p>
+        </p:txBody>
+      </p:sp>
+      <p:pic>
+        <p:nvPicPr>
+          <p:cNvPr id="128" name="Graphic 127">
+            <a:extLst>
+              <a:ext uri="{FF2B5EF4-FFF2-40B4-BE49-F238E27FC236}">
+                <a16:creationId xmlns:a16="http://schemas.microsoft.com/office/drawing/2014/main" id="{EEAC0093-32DC-7746-B320-D2EBB684DCDF}"/>
+              </a:ext>
+            </a:extLst>
+          </p:cNvPr>
+          <p:cNvPicPr>
+            <a:picLocks noChangeAspect="1"/>
+          </p:cNvPicPr>
+          <p:nvPr/>
+        </p:nvPicPr>
+        <p:blipFill>
+          <a:blip r:embed="rId21">
+            <a:extLst>
+              <a:ext uri="{96DAC541-7B7A-43D3-8B79-37D633B846F1}">
+                <asvg:svgBlip xmlns:asvg="http://schemas.microsoft.com/office/drawing/2016/SVG/main" r:embed="rId22"/>
+              </a:ext>
+            </a:extLst>
+          </a:blip>
+          <a:stretch>
+            <a:fillRect/>
+          </a:stretch>
+        </p:blipFill>
+        <p:spPr>
+          <a:xfrm flipH="1">
+            <a:off x="2853239" y="2440213"/>
+            <a:ext cx="483586" cy="469900"/>
+          </a:xfrm>
+          <a:prstGeom prst="rect">
+            <a:avLst/>
+          </a:prstGeom>
+        </p:spPr>
+      </p:pic>
+      <p:cxnSp>
+        <p:nvCxnSpPr>
+          <p:cNvPr id="131" name="Elbow Connector 130">
+            <a:extLst>
+              <a:ext uri="{FF2B5EF4-FFF2-40B4-BE49-F238E27FC236}">
+                <a16:creationId xmlns:a16="http://schemas.microsoft.com/office/drawing/2014/main" id="{40AD9675-FF34-7844-97D6-0CD0DD2EED53}"/>
+              </a:ext>
+            </a:extLst>
+          </p:cNvPr>
+          <p:cNvCxnSpPr>
+            <a:cxnSpLocks/>
+            <a:stCxn id="126" idx="3"/>
+            <a:endCxn id="8" idx="2"/>
+          </p:cNvCxnSpPr>
+          <p:nvPr/>
+        </p:nvCxnSpPr>
+        <p:spPr>
+          <a:xfrm rot="10800000">
+            <a:off x="4465909" y="5083924"/>
+            <a:ext cx="1179261" cy="517829"/>
+          </a:xfrm>
+          <a:prstGeom prst="bentConnector2">
+            <a:avLst/>
+          </a:prstGeom>
+          <a:ln>
+            <a:solidFill>
+              <a:srgbClr val="7030A0"/>
+            </a:solidFill>
+            <a:tailEnd type="triangle"/>
+          </a:ln>
+        </p:spPr>
+        <p:style>
+          <a:lnRef idx="1">
+            <a:schemeClr val="accent1"/>
+          </a:lnRef>
+          <a:fillRef idx="0">
+            <a:schemeClr val="accent1"/>
+          </a:fillRef>
+          <a:effectRef idx="0">
+            <a:schemeClr val="accent1"/>
+          </a:effectRef>
+          <a:fontRef idx="minor">
+            <a:schemeClr val="tx1"/>
+          </a:fontRef>
+        </p:style>
+      </p:cxnSp>
+      <p:sp>
+        <p:nvSpPr>
+          <p:cNvPr id="135" name="TextBox 134">
+            <a:extLst>
+              <a:ext uri="{FF2B5EF4-FFF2-40B4-BE49-F238E27FC236}">
+                <a16:creationId xmlns:a16="http://schemas.microsoft.com/office/drawing/2014/main" id="{65CBA172-77DE-C143-A46B-EA88A22C1EE1}"/>
+              </a:ext>
+            </a:extLst>
+          </p:cNvPr>
+          <p:cNvSpPr txBox="1"/>
+          <p:nvPr/>
+        </p:nvSpPr>
+        <p:spPr>
+          <a:xfrm>
+            <a:off x="4433074" y="5653532"/>
+            <a:ext cx="526763" cy="276999"/>
+          </a:xfrm>
+          <a:prstGeom prst="rect">
+            <a:avLst/>
+          </a:prstGeom>
+          <a:noFill/>
+        </p:spPr>
+        <p:txBody>
+          <a:bodyPr wrap="square" rtlCol="0">
+            <a:spAutoFit/>
+          </a:bodyPr>
+          <a:lstStyle/>
+          <a:p>
+            <a:pPr algn="ctr"/>
+            <a:r>
+              <a:rPr lang="en-US" sz="1200" dirty="0"/>
+              <a:t>code</a:t>
+            </a:r>
+          </a:p>
+        </p:txBody>
+      </p:sp>
+      <p:pic>
+        <p:nvPicPr>
+          <p:cNvPr id="136" name="Graphic 135">
+            <a:extLst>
+              <a:ext uri="{FF2B5EF4-FFF2-40B4-BE49-F238E27FC236}">
+                <a16:creationId xmlns:a16="http://schemas.microsoft.com/office/drawing/2014/main" id="{A6DF87B7-C9BB-FC49-8C2F-8A4F6FFCFFAC}"/>
+              </a:ext>
+            </a:extLst>
+          </p:cNvPr>
+          <p:cNvPicPr>
+            <a:picLocks noChangeAspect="1"/>
+          </p:cNvPicPr>
+          <p:nvPr/>
+        </p:nvPicPr>
+        <p:blipFill>
+          <a:blip r:embed="rId23">
+            <a:extLst>
+              <a:ext uri="{96DAC541-7B7A-43D3-8B79-37D633B846F1}">
+                <asvg:svgBlip xmlns:asvg="http://schemas.microsoft.com/office/drawing/2016/SVG/main" r:embed="rId24"/>
+              </a:ext>
+            </a:extLst>
+          </a:blip>
+          <a:stretch>
+            <a:fillRect/>
+          </a:stretch>
+        </p:blipFill>
+        <p:spPr>
+          <a:xfrm>
+            <a:off x="7822521" y="4359671"/>
+            <a:ext cx="614940" cy="614940"/>
+          </a:xfrm>
+          <a:prstGeom prst="rect">
+            <a:avLst/>
+          </a:prstGeom>
+        </p:spPr>
+      </p:pic>
+      <p:cxnSp>
+        <p:nvCxnSpPr>
+          <p:cNvPr id="138" name="Elbow Connector 137">
+            <a:extLst>
+              <a:ext uri="{FF2B5EF4-FFF2-40B4-BE49-F238E27FC236}">
+                <a16:creationId xmlns:a16="http://schemas.microsoft.com/office/drawing/2014/main" id="{A3F731DD-0E19-F54B-B98C-32BF4D2A3419}"/>
+              </a:ext>
+            </a:extLst>
+          </p:cNvPr>
+          <p:cNvCxnSpPr>
+            <a:cxnSpLocks/>
+            <a:endCxn id="136" idx="0"/>
+          </p:cNvCxnSpPr>
+          <p:nvPr/>
+        </p:nvCxnSpPr>
+        <p:spPr>
+          <a:xfrm rot="16200000" flipH="1">
+            <a:off x="7555435" y="3785115"/>
+            <a:ext cx="1029184" cy="119927"/>
+          </a:xfrm>
+          <a:prstGeom prst="bentConnector3">
+            <a:avLst>
+              <a:gd name="adj1" fmla="val 50000"/>
+            </a:avLst>
+          </a:prstGeom>
+          <a:ln>
+            <a:solidFill>
+              <a:srgbClr val="7030A0"/>
+            </a:solidFill>
+            <a:tailEnd type="triangle"/>
+          </a:ln>
+        </p:spPr>
+        <p:style>
+          <a:lnRef idx="1">
+            <a:schemeClr val="accent1"/>
+          </a:lnRef>
+          <a:fillRef idx="0">
+            <a:schemeClr val="accent1"/>
+          </a:fillRef>
+          <a:effectRef idx="0">
+            <a:schemeClr val="accent1"/>
+          </a:effectRef>
+          <a:fontRef idx="minor">
+            <a:schemeClr val="tx1"/>
+          </a:fontRef>
+        </p:style>
+      </p:cxnSp>
+      <p:cxnSp>
+        <p:nvCxnSpPr>
+          <p:cNvPr id="151" name="Elbow Connector 150">
+            <a:extLst>
+              <a:ext uri="{FF2B5EF4-FFF2-40B4-BE49-F238E27FC236}">
+                <a16:creationId xmlns:a16="http://schemas.microsoft.com/office/drawing/2014/main" id="{D5A23ACA-D820-7C48-B791-859297762815}"/>
+              </a:ext>
+            </a:extLst>
+          </p:cNvPr>
+          <p:cNvCxnSpPr>
+            <a:cxnSpLocks/>
+            <a:stCxn id="136" idx="2"/>
+            <a:endCxn id="126" idx="1"/>
+          </p:cNvCxnSpPr>
+          <p:nvPr/>
+        </p:nvCxnSpPr>
+        <p:spPr>
+          <a:xfrm rot="5400000">
+            <a:off x="6815803" y="4287563"/>
+            <a:ext cx="627141" cy="2001236"/>
+          </a:xfrm>
+          <a:prstGeom prst="bentConnector2">
+            <a:avLst/>
+          </a:prstGeom>
+          <a:ln>
+            <a:solidFill>
+              <a:srgbClr val="7030A0"/>
+            </a:solidFill>
+            <a:tailEnd type="triangle"/>
+          </a:ln>
+        </p:spPr>
+        <p:style>
+          <a:lnRef idx="1">
+            <a:schemeClr val="accent1"/>
+          </a:lnRef>
+          <a:fillRef idx="0">
+            <a:schemeClr val="accent1"/>
+          </a:fillRef>
+          <a:effectRef idx="0">
+            <a:schemeClr val="accent1"/>
+          </a:effectRef>
+          <a:fontRef idx="minor">
+            <a:schemeClr val="tx1"/>
+          </a:fontRef>
+        </p:style>
+      </p:cxnSp>
+      <p:sp>
+        <p:nvSpPr>
+          <p:cNvPr id="154" name="TextBox 153">
+            <a:extLst>
+              <a:ext uri="{FF2B5EF4-FFF2-40B4-BE49-F238E27FC236}">
+                <a16:creationId xmlns:a16="http://schemas.microsoft.com/office/drawing/2014/main" id="{5E608ECE-5A17-AA4D-AF61-7333DB6C0DD3}"/>
+              </a:ext>
+            </a:extLst>
+          </p:cNvPr>
+          <p:cNvSpPr txBox="1"/>
+          <p:nvPr/>
+        </p:nvSpPr>
+        <p:spPr>
+          <a:xfrm>
+            <a:off x="7203329" y="5634581"/>
+            <a:ext cx="970170" cy="276999"/>
+          </a:xfrm>
+          <a:prstGeom prst="rect">
+            <a:avLst/>
+          </a:prstGeom>
+          <a:noFill/>
+        </p:spPr>
+        <p:txBody>
+          <a:bodyPr wrap="square" rtlCol="0">
+            <a:spAutoFit/>
+          </a:bodyPr>
+          <a:lstStyle/>
+          <a:p>
+            <a:pPr algn="ctr"/>
+            <a:r>
+              <a:rPr lang="en-US" sz="1200" dirty="0"/>
+              <a:t>metrics</a:t>
+            </a:r>
+          </a:p>
+        </p:txBody>
+      </p:sp>
+    </p:spTree>
+    <p:extLst>
+      <p:ext uri="{BB962C8B-B14F-4D97-AF65-F5344CB8AC3E}">
+        <p14:creationId xmlns:p14="http://schemas.microsoft.com/office/powerpoint/2010/main" val="2992787076"/>
       </p:ext>
     </p:extLst>
   </p:cSld>

</xml_diff>

<commit_message>
Buildspec website js config substitution from SSM parameter store, and SecretsManager
</commit_message>
<xml_diff>
--- a/doc/diagram.pptx
+++ b/doc/diagram.pptx
@@ -6,6 +6,7 @@
   </p:sldMasterIdLst>
   <p:sldIdLst>
     <p:sldId id="257" r:id="rId2"/>
+    <p:sldId id="258" r:id="rId3"/>
   </p:sldIdLst>
   <p:sldSz cx="12192000" cy="6858000"/>
   <p:notesSz cx="6858000" cy="9144000"/>
@@ -259,7 +260,7 @@
           <a:p>
             <a:fld id="{2BECA929-49EE-B647-832F-567E3A3FDFBE}" type="datetimeFigureOut">
               <a:rPr lang="en-US" smtClean="0"/>
-              <a:t>3/24/19</a:t>
+              <a:t>3/27/19</a:t>
             </a:fld>
             <a:endParaRPr lang="en-US"/>
           </a:p>
@@ -457,7 +458,7 @@
           <a:p>
             <a:fld id="{2BECA929-49EE-B647-832F-567E3A3FDFBE}" type="datetimeFigureOut">
               <a:rPr lang="en-US" smtClean="0"/>
-              <a:t>3/24/19</a:t>
+              <a:t>3/27/19</a:t>
             </a:fld>
             <a:endParaRPr lang="en-US"/>
           </a:p>
@@ -665,7 +666,7 @@
           <a:p>
             <a:fld id="{2BECA929-49EE-B647-832F-567E3A3FDFBE}" type="datetimeFigureOut">
               <a:rPr lang="en-US" smtClean="0"/>
-              <a:t>3/24/19</a:t>
+              <a:t>3/27/19</a:t>
             </a:fld>
             <a:endParaRPr lang="en-US"/>
           </a:p>
@@ -863,7 +864,7 @@
           <a:p>
             <a:fld id="{2BECA929-49EE-B647-832F-567E3A3FDFBE}" type="datetimeFigureOut">
               <a:rPr lang="en-US" smtClean="0"/>
-              <a:t>3/24/19</a:t>
+              <a:t>3/27/19</a:t>
             </a:fld>
             <a:endParaRPr lang="en-US"/>
           </a:p>
@@ -1138,7 +1139,7 @@
           <a:p>
             <a:fld id="{2BECA929-49EE-B647-832F-567E3A3FDFBE}" type="datetimeFigureOut">
               <a:rPr lang="en-US" smtClean="0"/>
-              <a:t>3/24/19</a:t>
+              <a:t>3/27/19</a:t>
             </a:fld>
             <a:endParaRPr lang="en-US"/>
           </a:p>
@@ -1403,7 +1404,7 @@
           <a:p>
             <a:fld id="{2BECA929-49EE-B647-832F-567E3A3FDFBE}" type="datetimeFigureOut">
               <a:rPr lang="en-US" smtClean="0"/>
-              <a:t>3/24/19</a:t>
+              <a:t>3/27/19</a:t>
             </a:fld>
             <a:endParaRPr lang="en-US"/>
           </a:p>
@@ -1815,7 +1816,7 @@
           <a:p>
             <a:fld id="{2BECA929-49EE-B647-832F-567E3A3FDFBE}" type="datetimeFigureOut">
               <a:rPr lang="en-US" smtClean="0"/>
-              <a:t>3/24/19</a:t>
+              <a:t>3/27/19</a:t>
             </a:fld>
             <a:endParaRPr lang="en-US"/>
           </a:p>
@@ -1956,7 +1957,7 @@
           <a:p>
             <a:fld id="{2BECA929-49EE-B647-832F-567E3A3FDFBE}" type="datetimeFigureOut">
               <a:rPr lang="en-US" smtClean="0"/>
-              <a:t>3/24/19</a:t>
+              <a:t>3/27/19</a:t>
             </a:fld>
             <a:endParaRPr lang="en-US"/>
           </a:p>
@@ -2069,7 +2070,7 @@
           <a:p>
             <a:fld id="{2BECA929-49EE-B647-832F-567E3A3FDFBE}" type="datetimeFigureOut">
               <a:rPr lang="en-US" smtClean="0"/>
-              <a:t>3/24/19</a:t>
+              <a:t>3/27/19</a:t>
             </a:fld>
             <a:endParaRPr lang="en-US"/>
           </a:p>
@@ -2380,7 +2381,7 @@
           <a:p>
             <a:fld id="{2BECA929-49EE-B647-832F-567E3A3FDFBE}" type="datetimeFigureOut">
               <a:rPr lang="en-US" smtClean="0"/>
-              <a:t>3/24/19</a:t>
+              <a:t>3/27/19</a:t>
             </a:fld>
             <a:endParaRPr lang="en-US"/>
           </a:p>
@@ -2668,7 +2669,7 @@
           <a:p>
             <a:fld id="{2BECA929-49EE-B647-832F-567E3A3FDFBE}" type="datetimeFigureOut">
               <a:rPr lang="en-US" smtClean="0"/>
-              <a:t>3/24/19</a:t>
+              <a:t>3/27/19</a:t>
             </a:fld>
             <a:endParaRPr lang="en-US"/>
           </a:p>
@@ -2909,7 +2910,7 @@
           <a:p>
             <a:fld id="{2BECA929-49EE-B647-832F-567E3A3FDFBE}" type="datetimeFigureOut">
               <a:rPr lang="en-US" smtClean="0"/>
-              <a:t>3/24/19</a:t>
+              <a:t>3/27/19</a:t>
             </a:fld>
             <a:endParaRPr lang="en-US"/>
           </a:p>
@@ -3498,7 +3499,7 @@
         </p:blipFill>
         <p:spPr>
           <a:xfrm>
-            <a:off x="2568155" y="3809534"/>
+            <a:off x="2568155" y="1379665"/>
             <a:ext cx="719088" cy="1030693"/>
           </a:xfrm>
           <a:prstGeom prst="rect">
@@ -3570,7 +3571,7 @@
         </p:blipFill>
         <p:spPr>
           <a:xfrm>
-            <a:off x="2568155" y="786943"/>
+            <a:off x="2566956" y="3701048"/>
             <a:ext cx="762000" cy="952500"/>
           </a:xfrm>
           <a:prstGeom prst="rect">
@@ -3910,15 +3911,15 @@
           </p:cNvPr>
           <p:cNvCxnSpPr>
             <a:cxnSpLocks/>
-            <a:stCxn id="14" idx="2"/>
-            <a:endCxn id="11" idx="0"/>
+            <a:stCxn id="14" idx="0"/>
+            <a:endCxn id="11" idx="2"/>
           </p:cNvCxnSpPr>
           <p:nvPr/>
         </p:nvCxnSpPr>
         <p:spPr>
-          <a:xfrm>
-            <a:off x="2949155" y="1739443"/>
-            <a:ext cx="0" cy="659558"/>
+          <a:xfrm flipV="1">
+            <a:off x="2947956" y="3491201"/>
+            <a:ext cx="1199" cy="209847"/>
           </a:xfrm>
           <a:prstGeom prst="line">
             <a:avLst/>
@@ -3993,8 +3994,8 @@
         </p:nvSpPr>
         <p:spPr>
           <a:xfrm>
-            <a:off x="2413309" y="340242"/>
-            <a:ext cx="1071690" cy="3150959"/>
+            <a:off x="2425909" y="340242"/>
+            <a:ext cx="1059089" cy="4497230"/>
           </a:xfrm>
           <a:prstGeom prst="rect">
             <a:avLst/>
@@ -4056,14 +4057,14 @@
           <p:cNvCxnSpPr>
             <a:cxnSpLocks/>
             <a:stCxn id="12" idx="1"/>
-            <a:endCxn id="17" idx="2"/>
+            <a:endCxn id="17" idx="0"/>
           </p:cNvCxnSpPr>
           <p:nvPr/>
         </p:nvCxnSpPr>
         <p:spPr>
-          <a:xfrm rot="10800000">
-            <a:off x="1558445" y="3384961"/>
-            <a:ext cx="1009710" cy="939921"/>
+          <a:xfrm rot="10800000" flipV="1">
+            <a:off x="1558445" y="1895012"/>
+            <a:ext cx="1009710" cy="631438"/>
           </a:xfrm>
           <a:prstGeom prst="bentConnector2">
             <a:avLst/>
@@ -4338,10 +4339,2289 @@
           </a:p>
         </p:txBody>
       </p:sp>
+      <p:sp>
+        <p:nvSpPr>
+          <p:cNvPr id="2" name="TextBox 1">
+            <a:extLst>
+              <a:ext uri="{FF2B5EF4-FFF2-40B4-BE49-F238E27FC236}">
+                <a16:creationId xmlns:a16="http://schemas.microsoft.com/office/drawing/2014/main" id="{E7FBEA5F-E52F-A34D-8142-840A6750ED85}"/>
+              </a:ext>
+            </a:extLst>
+          </p:cNvPr>
+          <p:cNvSpPr txBox="1"/>
+          <p:nvPr/>
+        </p:nvSpPr>
+        <p:spPr>
+          <a:xfrm>
+            <a:off x="1340407" y="6225760"/>
+            <a:ext cx="1294585" cy="369332"/>
+          </a:xfrm>
+          <a:prstGeom prst="rect">
+            <a:avLst/>
+          </a:prstGeom>
+          <a:noFill/>
+        </p:spPr>
+        <p:txBody>
+          <a:bodyPr wrap="none" rtlCol="0">
+            <a:spAutoFit/>
+          </a:bodyPr>
+          <a:lstStyle/>
+          <a:p>
+            <a:r>
+              <a:rPr lang="en-US" dirty="0"/>
+              <a:t>Distribution</a:t>
+            </a:r>
+          </a:p>
+        </p:txBody>
+      </p:sp>
+      <p:sp>
+        <p:nvSpPr>
+          <p:cNvPr id="3" name="Oval 2">
+            <a:extLst>
+              <a:ext uri="{FF2B5EF4-FFF2-40B4-BE49-F238E27FC236}">
+                <a16:creationId xmlns:a16="http://schemas.microsoft.com/office/drawing/2014/main" id="{0B28F176-BFEB-D842-8545-6E9ECCF0FB2C}"/>
+              </a:ext>
+            </a:extLst>
+          </p:cNvPr>
+          <p:cNvSpPr/>
+          <p:nvPr/>
+        </p:nvSpPr>
+        <p:spPr>
+          <a:xfrm>
+            <a:off x="5005636" y="211951"/>
+            <a:ext cx="276693" cy="293560"/>
+          </a:xfrm>
+          <a:prstGeom prst="ellipse">
+            <a:avLst/>
+          </a:prstGeom>
+          <a:solidFill>
+            <a:srgbClr val="FFFF00"/>
+          </a:solidFill>
+          <a:ln>
+            <a:solidFill>
+              <a:schemeClr val="tx1"/>
+            </a:solidFill>
+          </a:ln>
+        </p:spPr>
+        <p:style>
+          <a:lnRef idx="2">
+            <a:schemeClr val="accent1">
+              <a:shade val="50000"/>
+            </a:schemeClr>
+          </a:lnRef>
+          <a:fillRef idx="1">
+            <a:schemeClr val="accent1"/>
+          </a:fillRef>
+          <a:effectRef idx="0">
+            <a:schemeClr val="accent1"/>
+          </a:effectRef>
+          <a:fontRef idx="minor">
+            <a:schemeClr val="lt1"/>
+          </a:fontRef>
+        </p:style>
+        <p:txBody>
+          <a:bodyPr rtlCol="0" anchor="ctr"/>
+          <a:lstStyle/>
+          <a:p>
+            <a:pPr algn="ctr"/>
+            <a:r>
+              <a:rPr lang="en-US" sz="1200" dirty="0">
+                <a:solidFill>
+                  <a:schemeClr val="tx1"/>
+                </a:solidFill>
+              </a:rPr>
+              <a:t>1</a:t>
+            </a:r>
+          </a:p>
+        </p:txBody>
+      </p:sp>
+      <p:sp>
+        <p:nvSpPr>
+          <p:cNvPr id="28" name="Oval 27">
+            <a:extLst>
+              <a:ext uri="{FF2B5EF4-FFF2-40B4-BE49-F238E27FC236}">
+                <a16:creationId xmlns:a16="http://schemas.microsoft.com/office/drawing/2014/main" id="{3664BCE1-7E23-D642-9C75-485305C18757}"/>
+              </a:ext>
+            </a:extLst>
+          </p:cNvPr>
+          <p:cNvSpPr/>
+          <p:nvPr/>
+        </p:nvSpPr>
+        <p:spPr>
+          <a:xfrm>
+            <a:off x="6698660" y="1965026"/>
+            <a:ext cx="276693" cy="293560"/>
+          </a:xfrm>
+          <a:prstGeom prst="ellipse">
+            <a:avLst/>
+          </a:prstGeom>
+          <a:solidFill>
+            <a:srgbClr val="FFFF00"/>
+          </a:solidFill>
+          <a:ln>
+            <a:solidFill>
+              <a:schemeClr val="tx1"/>
+            </a:solidFill>
+          </a:ln>
+        </p:spPr>
+        <p:style>
+          <a:lnRef idx="2">
+            <a:schemeClr val="accent1">
+              <a:shade val="50000"/>
+            </a:schemeClr>
+          </a:lnRef>
+          <a:fillRef idx="1">
+            <a:schemeClr val="accent1"/>
+          </a:fillRef>
+          <a:effectRef idx="0">
+            <a:schemeClr val="accent1"/>
+          </a:effectRef>
+          <a:fontRef idx="minor">
+            <a:schemeClr val="lt1"/>
+          </a:fontRef>
+        </p:style>
+        <p:txBody>
+          <a:bodyPr rtlCol="0" anchor="ctr"/>
+          <a:lstStyle/>
+          <a:p>
+            <a:pPr algn="ctr"/>
+            <a:r>
+              <a:rPr lang="en-US" sz="1200" dirty="0">
+                <a:solidFill>
+                  <a:schemeClr val="tx1"/>
+                </a:solidFill>
+              </a:rPr>
+              <a:t>2</a:t>
+            </a:r>
+          </a:p>
+        </p:txBody>
+      </p:sp>
+      <p:sp>
+        <p:nvSpPr>
+          <p:cNvPr id="31" name="Oval 30">
+            <a:extLst>
+              <a:ext uri="{FF2B5EF4-FFF2-40B4-BE49-F238E27FC236}">
+                <a16:creationId xmlns:a16="http://schemas.microsoft.com/office/drawing/2014/main" id="{04A0F5D1-F0DD-1541-B18B-789A6CD06419}"/>
+              </a:ext>
+            </a:extLst>
+          </p:cNvPr>
+          <p:cNvSpPr/>
+          <p:nvPr/>
+        </p:nvSpPr>
+        <p:spPr>
+          <a:xfrm>
+            <a:off x="3328956" y="211951"/>
+            <a:ext cx="276693" cy="293560"/>
+          </a:xfrm>
+          <a:prstGeom prst="ellipse">
+            <a:avLst/>
+          </a:prstGeom>
+          <a:solidFill>
+            <a:srgbClr val="FFFF00"/>
+          </a:solidFill>
+          <a:ln>
+            <a:solidFill>
+              <a:schemeClr val="tx1"/>
+            </a:solidFill>
+          </a:ln>
+        </p:spPr>
+        <p:style>
+          <a:lnRef idx="2">
+            <a:schemeClr val="accent1">
+              <a:shade val="50000"/>
+            </a:schemeClr>
+          </a:lnRef>
+          <a:fillRef idx="1">
+            <a:schemeClr val="accent1"/>
+          </a:fillRef>
+          <a:effectRef idx="0">
+            <a:schemeClr val="accent1"/>
+          </a:effectRef>
+          <a:fontRef idx="minor">
+            <a:schemeClr val="lt1"/>
+          </a:fontRef>
+        </p:style>
+        <p:txBody>
+          <a:bodyPr rtlCol="0" anchor="ctr"/>
+          <a:lstStyle/>
+          <a:p>
+            <a:pPr algn="ctr"/>
+            <a:r>
+              <a:rPr lang="en-US" sz="1200" dirty="0">
+                <a:solidFill>
+                  <a:schemeClr val="tx1"/>
+                </a:solidFill>
+              </a:rPr>
+              <a:t>3</a:t>
+            </a:r>
+          </a:p>
+        </p:txBody>
+      </p:sp>
+      <p:sp>
+        <p:nvSpPr>
+          <p:cNvPr id="34" name="Rectangle 33">
+            <a:extLst>
+              <a:ext uri="{FF2B5EF4-FFF2-40B4-BE49-F238E27FC236}">
+                <a16:creationId xmlns:a16="http://schemas.microsoft.com/office/drawing/2014/main" id="{A285D32F-E7A1-9E45-8BC1-6B7557EFAC75}"/>
+              </a:ext>
+            </a:extLst>
+          </p:cNvPr>
+          <p:cNvSpPr/>
+          <p:nvPr/>
+        </p:nvSpPr>
+        <p:spPr>
+          <a:xfrm>
+            <a:off x="2425909" y="5241712"/>
+            <a:ext cx="4397516" cy="842249"/>
+          </a:xfrm>
+          <a:prstGeom prst="rect">
+            <a:avLst/>
+          </a:prstGeom>
+          <a:noFill/>
+          <a:ln w="12700">
+            <a:solidFill>
+              <a:srgbClr val="879196"/>
+            </a:solidFill>
+            <a:prstDash val="dash"/>
+          </a:ln>
+        </p:spPr>
+        <p:style>
+          <a:lnRef idx="2">
+            <a:schemeClr val="accent1">
+              <a:shade val="50000"/>
+            </a:schemeClr>
+          </a:lnRef>
+          <a:fillRef idx="1">
+            <a:schemeClr val="accent1"/>
+          </a:fillRef>
+          <a:effectRef idx="0">
+            <a:schemeClr val="accent1"/>
+          </a:effectRef>
+          <a:fontRef idx="minor">
+            <a:schemeClr val="lt1"/>
+          </a:fontRef>
+        </p:style>
+        <p:txBody>
+          <a:bodyPr rot="0" spcFirstLastPara="0" vertOverflow="overflow" horzOverflow="overflow" vert="horz" wrap="square" lIns="91440" tIns="45720" rIns="91440" bIns="45720" numCol="1" spcCol="0" rtlCol="0" fromWordArt="0" anchor="t" anchorCtr="0" forceAA="0" compatLnSpc="1">
+            <a:prstTxWarp prst="textNoShape">
+              <a:avLst/>
+            </a:prstTxWarp>
+            <a:noAutofit/>
+          </a:bodyPr>
+          <a:lstStyle/>
+          <a:p>
+            <a:pPr algn="ctr"/>
+            <a:r>
+              <a:rPr lang="en-US" sz="1000" dirty="0">
+                <a:solidFill>
+                  <a:schemeClr val="tx1"/>
+                </a:solidFill>
+              </a:rPr>
+              <a:t>Pipeline Stack</a:t>
+            </a:r>
+          </a:p>
+        </p:txBody>
+      </p:sp>
     </p:spTree>
     <p:extLst>
       <p:ext uri="{BB962C8B-B14F-4D97-AF65-F5344CB8AC3E}">
         <p14:creationId xmlns:p14="http://schemas.microsoft.com/office/powerpoint/2010/main" val="697916922"/>
+      </p:ext>
+    </p:extLst>
+  </p:cSld>
+  <p:clrMapOvr>
+    <a:masterClrMapping/>
+  </p:clrMapOvr>
+</p:sld>
+</file>
+
+<file path=ppt/slides/slide2.xml><?xml version="1.0" encoding="utf-8"?>
+<p:sld xmlns:a="http://schemas.openxmlformats.org/drawingml/2006/main" xmlns:r="http://schemas.openxmlformats.org/officeDocument/2006/relationships" xmlns:p="http://schemas.openxmlformats.org/presentationml/2006/main">
+  <p:cSld>
+    <p:spTree>
+      <p:nvGrpSpPr>
+        <p:cNvPr id="1" name=""/>
+        <p:cNvGrpSpPr/>
+        <p:nvPr/>
+      </p:nvGrpSpPr>
+      <p:grpSpPr>
+        <a:xfrm>
+          <a:off x="0" y="0"/>
+          <a:ext cx="0" cy="0"/>
+          <a:chOff x="0" y="0"/>
+          <a:chExt cx="0" cy="0"/>
+        </a:xfrm>
+      </p:grpSpPr>
+      <p:sp>
+        <p:nvSpPr>
+          <p:cNvPr id="16" name="Rectangle 15">
+            <a:extLst>
+              <a:ext uri="{FF2B5EF4-FFF2-40B4-BE49-F238E27FC236}">
+                <a16:creationId xmlns:a16="http://schemas.microsoft.com/office/drawing/2014/main" id="{939FDB78-F157-C64C-9C67-3B82039A02E9}"/>
+              </a:ext>
+            </a:extLst>
+          </p:cNvPr>
+          <p:cNvSpPr/>
+          <p:nvPr/>
+        </p:nvSpPr>
+        <p:spPr>
+          <a:xfrm>
+            <a:off x="5185993" y="2068054"/>
+            <a:ext cx="3142350" cy="1180476"/>
+          </a:xfrm>
+          <a:prstGeom prst="rect">
+            <a:avLst/>
+          </a:prstGeom>
+          <a:noFill/>
+          <a:ln w="12700">
+            <a:solidFill>
+              <a:srgbClr val="879196"/>
+            </a:solidFill>
+            <a:prstDash val="dash"/>
+          </a:ln>
+        </p:spPr>
+        <p:style>
+          <a:lnRef idx="2">
+            <a:schemeClr val="accent1">
+              <a:shade val="50000"/>
+            </a:schemeClr>
+          </a:lnRef>
+          <a:fillRef idx="1">
+            <a:schemeClr val="accent1"/>
+          </a:fillRef>
+          <a:effectRef idx="0">
+            <a:schemeClr val="accent1"/>
+          </a:effectRef>
+          <a:fontRef idx="minor">
+            <a:schemeClr val="lt1"/>
+          </a:fontRef>
+        </p:style>
+        <p:txBody>
+          <a:bodyPr rot="0" spcFirstLastPara="0" vertOverflow="overflow" horzOverflow="overflow" vert="horz" wrap="square" lIns="91440" tIns="45720" rIns="91440" bIns="45720" numCol="1" spcCol="0" rtlCol="0" fromWordArt="0" anchor="t" anchorCtr="0" forceAA="0" compatLnSpc="1">
+            <a:prstTxWarp prst="textNoShape">
+              <a:avLst/>
+            </a:prstTxWarp>
+            <a:noAutofit/>
+          </a:bodyPr>
+          <a:lstStyle/>
+          <a:p>
+            <a:pPr algn="ctr"/>
+            <a:r>
+              <a:rPr lang="en-US" sz="1000" dirty="0">
+                <a:solidFill>
+                  <a:schemeClr val="tx1"/>
+                </a:solidFill>
+              </a:rPr>
+              <a:t>Multilanguage Bot Stack</a:t>
+            </a:r>
+          </a:p>
+        </p:txBody>
+      </p:sp>
+      <p:cxnSp>
+        <p:nvCxnSpPr>
+          <p:cNvPr id="20" name="Straight Connector 19">
+            <a:extLst>
+              <a:ext uri="{FF2B5EF4-FFF2-40B4-BE49-F238E27FC236}">
+                <a16:creationId xmlns:a16="http://schemas.microsoft.com/office/drawing/2014/main" id="{0D80BD15-1DA5-6B4D-898C-CB7D1944303B}"/>
+              </a:ext>
+            </a:extLst>
+          </p:cNvPr>
+          <p:cNvCxnSpPr>
+            <a:cxnSpLocks/>
+            <a:stCxn id="85" idx="3"/>
+            <a:endCxn id="84" idx="1"/>
+          </p:cNvCxnSpPr>
+          <p:nvPr/>
+        </p:nvCxnSpPr>
+        <p:spPr>
+          <a:xfrm flipV="1">
+            <a:off x="6272200" y="2666581"/>
+            <a:ext cx="931129" cy="8582"/>
+          </a:xfrm>
+          <a:prstGeom prst="line">
+            <a:avLst/>
+          </a:prstGeom>
+        </p:spPr>
+        <p:style>
+          <a:lnRef idx="1">
+            <a:schemeClr val="accent1"/>
+          </a:lnRef>
+          <a:fillRef idx="0">
+            <a:schemeClr val="accent1"/>
+          </a:fillRef>
+          <a:effectRef idx="0">
+            <a:schemeClr val="accent1"/>
+          </a:effectRef>
+          <a:fontRef idx="minor">
+            <a:schemeClr val="tx1"/>
+          </a:fontRef>
+        </p:style>
+      </p:cxnSp>
+      <p:cxnSp>
+        <p:nvCxnSpPr>
+          <p:cNvPr id="23" name="Straight Connector 22">
+            <a:extLst>
+              <a:ext uri="{FF2B5EF4-FFF2-40B4-BE49-F238E27FC236}">
+                <a16:creationId xmlns:a16="http://schemas.microsoft.com/office/drawing/2014/main" id="{1EE80D5C-FFA5-C244-B56C-E12127B557B1}"/>
+              </a:ext>
+            </a:extLst>
+          </p:cNvPr>
+          <p:cNvCxnSpPr>
+            <a:cxnSpLocks/>
+            <a:stCxn id="78" idx="2"/>
+            <a:endCxn id="85" idx="0"/>
+          </p:cNvCxnSpPr>
+          <p:nvPr/>
+        </p:nvCxnSpPr>
+        <p:spPr>
+          <a:xfrm>
+            <a:off x="5914127" y="1878166"/>
+            <a:ext cx="2473" cy="441397"/>
+          </a:xfrm>
+          <a:prstGeom prst="line">
+            <a:avLst/>
+          </a:prstGeom>
+        </p:spPr>
+        <p:style>
+          <a:lnRef idx="1">
+            <a:schemeClr val="accent1"/>
+          </a:lnRef>
+          <a:fillRef idx="0">
+            <a:schemeClr val="accent1"/>
+          </a:fillRef>
+          <a:effectRef idx="0">
+            <a:schemeClr val="accent1"/>
+          </a:effectRef>
+          <a:fontRef idx="minor">
+            <a:schemeClr val="tx1"/>
+          </a:fontRef>
+        </p:style>
+      </p:cxnSp>
+      <p:cxnSp>
+        <p:nvCxnSpPr>
+          <p:cNvPr id="30" name="Straight Connector 29">
+            <a:extLst>
+              <a:ext uri="{FF2B5EF4-FFF2-40B4-BE49-F238E27FC236}">
+                <a16:creationId xmlns:a16="http://schemas.microsoft.com/office/drawing/2014/main" id="{2D2E7735-3CB8-B244-8A5A-3F5E4CA4F57A}"/>
+              </a:ext>
+            </a:extLst>
+          </p:cNvPr>
+          <p:cNvCxnSpPr>
+            <a:cxnSpLocks/>
+            <a:stCxn id="65" idx="0"/>
+            <a:endCxn id="66" idx="2"/>
+          </p:cNvCxnSpPr>
+          <p:nvPr/>
+        </p:nvCxnSpPr>
+        <p:spPr>
+          <a:xfrm flipH="1" flipV="1">
+            <a:off x="4405100" y="3024136"/>
+            <a:ext cx="7995" cy="262422"/>
+          </a:xfrm>
+          <a:prstGeom prst="line">
+            <a:avLst/>
+          </a:prstGeom>
+        </p:spPr>
+        <p:style>
+          <a:lnRef idx="1">
+            <a:schemeClr val="accent1"/>
+          </a:lnRef>
+          <a:fillRef idx="0">
+            <a:schemeClr val="accent1"/>
+          </a:fillRef>
+          <a:effectRef idx="0">
+            <a:schemeClr val="accent1"/>
+          </a:effectRef>
+          <a:fontRef idx="minor">
+            <a:schemeClr val="tx1"/>
+          </a:fontRef>
+        </p:style>
+      </p:cxnSp>
+      <p:cxnSp>
+        <p:nvCxnSpPr>
+          <p:cNvPr id="33" name="Straight Connector 32">
+            <a:extLst>
+              <a:ext uri="{FF2B5EF4-FFF2-40B4-BE49-F238E27FC236}">
+                <a16:creationId xmlns:a16="http://schemas.microsoft.com/office/drawing/2014/main" id="{C9DA066C-CBEF-7F4B-B980-9E6AB48A9FD1}"/>
+              </a:ext>
+            </a:extLst>
+          </p:cNvPr>
+          <p:cNvCxnSpPr>
+            <a:cxnSpLocks/>
+            <a:stCxn id="128" idx="1"/>
+            <a:endCxn id="66" idx="1"/>
+          </p:cNvCxnSpPr>
+          <p:nvPr/>
+        </p:nvCxnSpPr>
+        <p:spPr>
+          <a:xfrm flipV="1">
+            <a:off x="3336825" y="2668536"/>
+            <a:ext cx="712675" cy="6627"/>
+          </a:xfrm>
+          <a:prstGeom prst="line">
+            <a:avLst/>
+          </a:prstGeom>
+        </p:spPr>
+        <p:style>
+          <a:lnRef idx="1">
+            <a:schemeClr val="accent1"/>
+          </a:lnRef>
+          <a:fillRef idx="0">
+            <a:schemeClr val="accent1"/>
+          </a:fillRef>
+          <a:effectRef idx="0">
+            <a:schemeClr val="accent1"/>
+          </a:effectRef>
+          <a:fontRef idx="minor">
+            <a:schemeClr val="tx1"/>
+          </a:fontRef>
+        </p:style>
+      </p:cxnSp>
+      <p:sp>
+        <p:nvSpPr>
+          <p:cNvPr id="39" name="Rectangle 38">
+            <a:extLst>
+              <a:ext uri="{FF2B5EF4-FFF2-40B4-BE49-F238E27FC236}">
+                <a16:creationId xmlns:a16="http://schemas.microsoft.com/office/drawing/2014/main" id="{A221E010-1155-1240-B4BB-758AFB9AD819}"/>
+              </a:ext>
+            </a:extLst>
+          </p:cNvPr>
+          <p:cNvSpPr/>
+          <p:nvPr/>
+        </p:nvSpPr>
+        <p:spPr>
+          <a:xfrm>
+            <a:off x="3900748" y="812190"/>
+            <a:ext cx="1059089" cy="3288765"/>
+          </a:xfrm>
+          <a:prstGeom prst="rect">
+            <a:avLst/>
+          </a:prstGeom>
+          <a:noFill/>
+          <a:ln w="12700">
+            <a:solidFill>
+              <a:srgbClr val="879196"/>
+            </a:solidFill>
+            <a:prstDash val="dash"/>
+          </a:ln>
+        </p:spPr>
+        <p:style>
+          <a:lnRef idx="2">
+            <a:schemeClr val="accent1">
+              <a:shade val="50000"/>
+            </a:schemeClr>
+          </a:lnRef>
+          <a:fillRef idx="1">
+            <a:schemeClr val="accent1"/>
+          </a:fillRef>
+          <a:effectRef idx="0">
+            <a:schemeClr val="accent1"/>
+          </a:effectRef>
+          <a:fontRef idx="minor">
+            <a:schemeClr val="lt1"/>
+          </a:fontRef>
+        </p:style>
+        <p:txBody>
+          <a:bodyPr rot="0" spcFirstLastPara="0" vertOverflow="overflow" horzOverflow="overflow" vert="horz" wrap="square" lIns="91440" tIns="45720" rIns="91440" bIns="45720" numCol="1" spcCol="0" rtlCol="0" fromWordArt="0" anchor="t" anchorCtr="0" forceAA="0" compatLnSpc="1">
+            <a:prstTxWarp prst="textNoShape">
+              <a:avLst/>
+            </a:prstTxWarp>
+            <a:noAutofit/>
+          </a:bodyPr>
+          <a:lstStyle/>
+          <a:p>
+            <a:pPr algn="ctr"/>
+            <a:r>
+              <a:rPr lang="en-US" sz="1000" dirty="0">
+                <a:solidFill>
+                  <a:schemeClr val="tx1"/>
+                </a:solidFill>
+              </a:rPr>
+              <a:t>Edge Stack</a:t>
+            </a:r>
+          </a:p>
+        </p:txBody>
+      </p:sp>
+      <p:cxnSp>
+        <p:nvCxnSpPr>
+          <p:cNvPr id="49" name="Elbow Connector 48">
+            <a:extLst>
+              <a:ext uri="{FF2B5EF4-FFF2-40B4-BE49-F238E27FC236}">
+                <a16:creationId xmlns:a16="http://schemas.microsoft.com/office/drawing/2014/main" id="{D348109D-0466-F24B-8230-5F86DFAF84E7}"/>
+              </a:ext>
+            </a:extLst>
+          </p:cNvPr>
+          <p:cNvCxnSpPr>
+            <a:cxnSpLocks/>
+            <a:stCxn id="76" idx="1"/>
+            <a:endCxn id="128" idx="0"/>
+          </p:cNvCxnSpPr>
+          <p:nvPr/>
+        </p:nvCxnSpPr>
+        <p:spPr>
+          <a:xfrm rot="10800000" flipV="1">
+            <a:off x="3095032" y="1586241"/>
+            <a:ext cx="964584" cy="853971"/>
+          </a:xfrm>
+          <a:prstGeom prst="bentConnector2">
+            <a:avLst/>
+          </a:prstGeom>
+        </p:spPr>
+        <p:style>
+          <a:lnRef idx="1">
+            <a:schemeClr val="accent1"/>
+          </a:lnRef>
+          <a:fillRef idx="0">
+            <a:schemeClr val="accent1"/>
+          </a:fillRef>
+          <a:effectRef idx="0">
+            <a:schemeClr val="accent1"/>
+          </a:effectRef>
+          <a:fontRef idx="minor">
+            <a:schemeClr val="tx1"/>
+          </a:fontRef>
+        </p:style>
+      </p:cxnSp>
+      <p:sp>
+        <p:nvSpPr>
+          <p:cNvPr id="29" name="Rectangle 28">
+            <a:extLst>
+              <a:ext uri="{FF2B5EF4-FFF2-40B4-BE49-F238E27FC236}">
+                <a16:creationId xmlns:a16="http://schemas.microsoft.com/office/drawing/2014/main" id="{E064EA00-794F-AF4B-90E3-47998A1E35ED}"/>
+              </a:ext>
+            </a:extLst>
+          </p:cNvPr>
+          <p:cNvSpPr/>
+          <p:nvPr/>
+        </p:nvSpPr>
+        <p:spPr>
+          <a:xfrm>
+            <a:off x="5185993" y="812191"/>
+            <a:ext cx="1456269" cy="1136847"/>
+          </a:xfrm>
+          <a:prstGeom prst="rect">
+            <a:avLst/>
+          </a:prstGeom>
+          <a:noFill/>
+          <a:ln w="12700">
+            <a:solidFill>
+              <a:srgbClr val="879196"/>
+            </a:solidFill>
+            <a:prstDash val="dash"/>
+          </a:ln>
+        </p:spPr>
+        <p:style>
+          <a:lnRef idx="2">
+            <a:schemeClr val="accent1">
+              <a:shade val="50000"/>
+            </a:schemeClr>
+          </a:lnRef>
+          <a:fillRef idx="1">
+            <a:schemeClr val="accent1"/>
+          </a:fillRef>
+          <a:effectRef idx="0">
+            <a:schemeClr val="accent1"/>
+          </a:effectRef>
+          <a:fontRef idx="minor">
+            <a:schemeClr val="lt1"/>
+          </a:fontRef>
+        </p:style>
+        <p:txBody>
+          <a:bodyPr rot="0" spcFirstLastPara="0" vertOverflow="overflow" horzOverflow="overflow" vert="horz" wrap="square" lIns="91440" tIns="45720" rIns="91440" bIns="45720" numCol="1" spcCol="0" rtlCol="0" fromWordArt="0" anchor="t" anchorCtr="0" forceAA="0" compatLnSpc="1">
+            <a:prstTxWarp prst="textNoShape">
+              <a:avLst/>
+            </a:prstTxWarp>
+            <a:noAutofit/>
+          </a:bodyPr>
+          <a:lstStyle/>
+          <a:p>
+            <a:pPr algn="ctr"/>
+            <a:r>
+              <a:rPr lang="en-US" sz="1000" dirty="0">
+                <a:solidFill>
+                  <a:schemeClr val="tx1"/>
+                </a:solidFill>
+              </a:rPr>
+              <a:t>Identity Stack</a:t>
+            </a:r>
+          </a:p>
+        </p:txBody>
+      </p:sp>
+      <p:cxnSp>
+        <p:nvCxnSpPr>
+          <p:cNvPr id="32" name="Elbow Connector 31">
+            <a:extLst>
+              <a:ext uri="{FF2B5EF4-FFF2-40B4-BE49-F238E27FC236}">
+                <a16:creationId xmlns:a16="http://schemas.microsoft.com/office/drawing/2014/main" id="{14E9A652-295A-C742-A112-91106FAAFD65}"/>
+              </a:ext>
+            </a:extLst>
+          </p:cNvPr>
+          <p:cNvCxnSpPr>
+            <a:cxnSpLocks/>
+            <a:stCxn id="40" idx="2"/>
+            <a:endCxn id="84" idx="0"/>
+          </p:cNvCxnSpPr>
+          <p:nvPr/>
+        </p:nvCxnSpPr>
+        <p:spPr>
+          <a:xfrm rot="5400000">
+            <a:off x="7308905" y="2060957"/>
+            <a:ext cx="500048" cy="12700"/>
+          </a:xfrm>
+          <a:prstGeom prst="bentConnector3">
+            <a:avLst>
+              <a:gd name="adj1" fmla="val 50000"/>
+            </a:avLst>
+          </a:prstGeom>
+        </p:spPr>
+        <p:style>
+          <a:lnRef idx="1">
+            <a:schemeClr val="accent1"/>
+          </a:lnRef>
+          <a:fillRef idx="0">
+            <a:schemeClr val="accent1"/>
+          </a:fillRef>
+          <a:effectRef idx="0">
+            <a:schemeClr val="accent1"/>
+          </a:effectRef>
+          <a:fontRef idx="minor">
+            <a:schemeClr val="tx1"/>
+          </a:fontRef>
+        </p:style>
+      </p:cxnSp>
+      <p:cxnSp>
+        <p:nvCxnSpPr>
+          <p:cNvPr id="36" name="Elbow Connector 35">
+            <a:extLst>
+              <a:ext uri="{FF2B5EF4-FFF2-40B4-BE49-F238E27FC236}">
+                <a16:creationId xmlns:a16="http://schemas.microsoft.com/office/drawing/2014/main" id="{791BF6B9-5FF8-594A-BD2A-3A1E440CCD09}"/>
+              </a:ext>
+            </a:extLst>
+          </p:cNvPr>
+          <p:cNvCxnSpPr>
+            <a:cxnSpLocks/>
+            <a:stCxn id="37" idx="1"/>
+            <a:endCxn id="84" idx="3"/>
+          </p:cNvCxnSpPr>
+          <p:nvPr/>
+        </p:nvCxnSpPr>
+        <p:spPr>
+          <a:xfrm rot="10800000">
+            <a:off x="7914530" y="2666581"/>
+            <a:ext cx="795929" cy="3934"/>
+          </a:xfrm>
+          <a:prstGeom prst="bentConnector3">
+            <a:avLst>
+              <a:gd name="adj1" fmla="val 50000"/>
+            </a:avLst>
+          </a:prstGeom>
+        </p:spPr>
+        <p:style>
+          <a:lnRef idx="1">
+            <a:schemeClr val="accent1"/>
+          </a:lnRef>
+          <a:fillRef idx="0">
+            <a:schemeClr val="accent1"/>
+          </a:fillRef>
+          <a:effectRef idx="0">
+            <a:schemeClr val="accent1"/>
+          </a:effectRef>
+          <a:fontRef idx="minor">
+            <a:schemeClr val="tx1"/>
+          </a:fontRef>
+        </p:style>
+      </p:cxnSp>
+      <p:sp>
+        <p:nvSpPr>
+          <p:cNvPr id="2" name="TextBox 1">
+            <a:extLst>
+              <a:ext uri="{FF2B5EF4-FFF2-40B4-BE49-F238E27FC236}">
+                <a16:creationId xmlns:a16="http://schemas.microsoft.com/office/drawing/2014/main" id="{E7FBEA5F-E52F-A34D-8142-840A6750ED85}"/>
+              </a:ext>
+            </a:extLst>
+          </p:cNvPr>
+          <p:cNvSpPr txBox="1"/>
+          <p:nvPr/>
+        </p:nvSpPr>
+        <p:spPr>
+          <a:xfrm>
+            <a:off x="3134932" y="4509698"/>
+            <a:ext cx="977062" cy="461665"/>
+          </a:xfrm>
+          <a:prstGeom prst="rect">
+            <a:avLst/>
+          </a:prstGeom>
+          <a:noFill/>
+        </p:spPr>
+        <p:txBody>
+          <a:bodyPr wrap="none" rtlCol="0">
+            <a:spAutoFit/>
+          </a:bodyPr>
+          <a:lstStyle/>
+          <a:p>
+            <a:r>
+              <a:rPr lang="en-US" sz="1200" dirty="0"/>
+              <a:t>Source repo:</a:t>
+            </a:r>
+          </a:p>
+          <a:p>
+            <a:r>
+              <a:rPr lang="en-US" sz="1200" dirty="0"/>
+              <a:t>Github</a:t>
+            </a:r>
+          </a:p>
+        </p:txBody>
+      </p:sp>
+      <p:sp>
+        <p:nvSpPr>
+          <p:cNvPr id="3" name="Oval 2">
+            <a:extLst>
+              <a:ext uri="{FF2B5EF4-FFF2-40B4-BE49-F238E27FC236}">
+                <a16:creationId xmlns:a16="http://schemas.microsoft.com/office/drawing/2014/main" id="{0B28F176-BFEB-D842-8545-6E9ECCF0FB2C}"/>
+              </a:ext>
+            </a:extLst>
+          </p:cNvPr>
+          <p:cNvSpPr/>
+          <p:nvPr/>
+        </p:nvSpPr>
+        <p:spPr>
+          <a:xfrm>
+            <a:off x="6480475" y="683899"/>
+            <a:ext cx="276693" cy="293560"/>
+          </a:xfrm>
+          <a:prstGeom prst="ellipse">
+            <a:avLst/>
+          </a:prstGeom>
+          <a:solidFill>
+            <a:srgbClr val="FFFF00"/>
+          </a:solidFill>
+          <a:ln>
+            <a:solidFill>
+              <a:schemeClr val="tx1"/>
+            </a:solidFill>
+          </a:ln>
+        </p:spPr>
+        <p:style>
+          <a:lnRef idx="2">
+            <a:schemeClr val="accent1">
+              <a:shade val="50000"/>
+            </a:schemeClr>
+          </a:lnRef>
+          <a:fillRef idx="1">
+            <a:schemeClr val="accent1"/>
+          </a:fillRef>
+          <a:effectRef idx="0">
+            <a:schemeClr val="accent1"/>
+          </a:effectRef>
+          <a:fontRef idx="minor">
+            <a:schemeClr val="lt1"/>
+          </a:fontRef>
+        </p:style>
+        <p:txBody>
+          <a:bodyPr rtlCol="0" anchor="ctr"/>
+          <a:lstStyle/>
+          <a:p>
+            <a:pPr algn="ctr"/>
+            <a:r>
+              <a:rPr lang="en-US" sz="1200" dirty="0">
+                <a:solidFill>
+                  <a:schemeClr val="tx1"/>
+                </a:solidFill>
+              </a:rPr>
+              <a:t>1</a:t>
+            </a:r>
+          </a:p>
+        </p:txBody>
+      </p:sp>
+      <p:sp>
+        <p:nvSpPr>
+          <p:cNvPr id="28" name="Oval 27">
+            <a:extLst>
+              <a:ext uri="{FF2B5EF4-FFF2-40B4-BE49-F238E27FC236}">
+                <a16:creationId xmlns:a16="http://schemas.microsoft.com/office/drawing/2014/main" id="{3664BCE1-7E23-D642-9C75-485305C18757}"/>
+              </a:ext>
+            </a:extLst>
+          </p:cNvPr>
+          <p:cNvSpPr/>
+          <p:nvPr/>
+        </p:nvSpPr>
+        <p:spPr>
+          <a:xfrm>
+            <a:off x="8173499" y="1921363"/>
+            <a:ext cx="276693" cy="293560"/>
+          </a:xfrm>
+          <a:prstGeom prst="ellipse">
+            <a:avLst/>
+          </a:prstGeom>
+          <a:solidFill>
+            <a:srgbClr val="FFFF00"/>
+          </a:solidFill>
+          <a:ln>
+            <a:solidFill>
+              <a:schemeClr val="tx1"/>
+            </a:solidFill>
+          </a:ln>
+        </p:spPr>
+        <p:style>
+          <a:lnRef idx="2">
+            <a:schemeClr val="accent1">
+              <a:shade val="50000"/>
+            </a:schemeClr>
+          </a:lnRef>
+          <a:fillRef idx="1">
+            <a:schemeClr val="accent1"/>
+          </a:fillRef>
+          <a:effectRef idx="0">
+            <a:schemeClr val="accent1"/>
+          </a:effectRef>
+          <a:fontRef idx="minor">
+            <a:schemeClr val="lt1"/>
+          </a:fontRef>
+        </p:style>
+        <p:txBody>
+          <a:bodyPr rtlCol="0" anchor="ctr"/>
+          <a:lstStyle/>
+          <a:p>
+            <a:pPr algn="ctr"/>
+            <a:r>
+              <a:rPr lang="en-US" sz="1200" dirty="0">
+                <a:solidFill>
+                  <a:schemeClr val="tx1"/>
+                </a:solidFill>
+              </a:rPr>
+              <a:t>2</a:t>
+            </a:r>
+          </a:p>
+        </p:txBody>
+      </p:sp>
+      <p:sp>
+        <p:nvSpPr>
+          <p:cNvPr id="31" name="Oval 30">
+            <a:extLst>
+              <a:ext uri="{FF2B5EF4-FFF2-40B4-BE49-F238E27FC236}">
+                <a16:creationId xmlns:a16="http://schemas.microsoft.com/office/drawing/2014/main" id="{04A0F5D1-F0DD-1541-B18B-789A6CD06419}"/>
+              </a:ext>
+            </a:extLst>
+          </p:cNvPr>
+          <p:cNvSpPr/>
+          <p:nvPr/>
+        </p:nvSpPr>
+        <p:spPr>
+          <a:xfrm>
+            <a:off x="4803795" y="683899"/>
+            <a:ext cx="276693" cy="293560"/>
+          </a:xfrm>
+          <a:prstGeom prst="ellipse">
+            <a:avLst/>
+          </a:prstGeom>
+          <a:solidFill>
+            <a:srgbClr val="FFFF00"/>
+          </a:solidFill>
+          <a:ln>
+            <a:solidFill>
+              <a:schemeClr val="tx1"/>
+            </a:solidFill>
+          </a:ln>
+        </p:spPr>
+        <p:style>
+          <a:lnRef idx="2">
+            <a:schemeClr val="accent1">
+              <a:shade val="50000"/>
+            </a:schemeClr>
+          </a:lnRef>
+          <a:fillRef idx="1">
+            <a:schemeClr val="accent1"/>
+          </a:fillRef>
+          <a:effectRef idx="0">
+            <a:schemeClr val="accent1"/>
+          </a:effectRef>
+          <a:fontRef idx="minor">
+            <a:schemeClr val="lt1"/>
+          </a:fontRef>
+        </p:style>
+        <p:txBody>
+          <a:bodyPr rtlCol="0" anchor="ctr"/>
+          <a:lstStyle/>
+          <a:p>
+            <a:pPr algn="ctr"/>
+            <a:r>
+              <a:rPr lang="en-US" sz="1200" dirty="0">
+                <a:solidFill>
+                  <a:schemeClr val="tx1"/>
+                </a:solidFill>
+              </a:rPr>
+              <a:t>3</a:t>
+            </a:r>
+          </a:p>
+        </p:txBody>
+      </p:sp>
+      <p:sp>
+        <p:nvSpPr>
+          <p:cNvPr id="34" name="Rectangle 33">
+            <a:extLst>
+              <a:ext uri="{FF2B5EF4-FFF2-40B4-BE49-F238E27FC236}">
+                <a16:creationId xmlns:a16="http://schemas.microsoft.com/office/drawing/2014/main" id="{A285D32F-E7A1-9E45-8BC1-6B7557EFAC75}"/>
+              </a:ext>
+            </a:extLst>
+          </p:cNvPr>
+          <p:cNvSpPr/>
+          <p:nvPr/>
+        </p:nvSpPr>
+        <p:spPr>
+          <a:xfrm>
+            <a:off x="5185993" y="4216634"/>
+            <a:ext cx="2194890" cy="901015"/>
+          </a:xfrm>
+          <a:prstGeom prst="rect">
+            <a:avLst/>
+          </a:prstGeom>
+          <a:noFill/>
+          <a:ln w="12700">
+            <a:solidFill>
+              <a:srgbClr val="879196"/>
+            </a:solidFill>
+            <a:prstDash val="dash"/>
+          </a:ln>
+        </p:spPr>
+        <p:style>
+          <a:lnRef idx="2">
+            <a:schemeClr val="accent1">
+              <a:shade val="50000"/>
+            </a:schemeClr>
+          </a:lnRef>
+          <a:fillRef idx="1">
+            <a:schemeClr val="accent1"/>
+          </a:fillRef>
+          <a:effectRef idx="0">
+            <a:schemeClr val="accent1"/>
+          </a:effectRef>
+          <a:fontRef idx="minor">
+            <a:schemeClr val="lt1"/>
+          </a:fontRef>
+        </p:style>
+        <p:txBody>
+          <a:bodyPr rot="0" spcFirstLastPara="0" vertOverflow="overflow" horzOverflow="overflow" vert="horz" wrap="square" lIns="91440" tIns="45720" rIns="91440" bIns="45720" numCol="1" spcCol="0" rtlCol="0" fromWordArt="0" anchor="t" anchorCtr="0" forceAA="0" compatLnSpc="1">
+            <a:prstTxWarp prst="textNoShape">
+              <a:avLst/>
+            </a:prstTxWarp>
+            <a:noAutofit/>
+          </a:bodyPr>
+          <a:lstStyle/>
+          <a:p>
+            <a:pPr algn="r"/>
+            <a:r>
+              <a:rPr lang="en-US" sz="1000" dirty="0">
+                <a:solidFill>
+                  <a:schemeClr val="tx1"/>
+                </a:solidFill>
+              </a:rPr>
+              <a:t>Pipeline </a:t>
+            </a:r>
+          </a:p>
+          <a:p>
+            <a:pPr algn="r"/>
+            <a:r>
+              <a:rPr lang="en-US" sz="1000" dirty="0">
+                <a:solidFill>
+                  <a:schemeClr val="tx1"/>
+                </a:solidFill>
+              </a:rPr>
+              <a:t>Stack</a:t>
+            </a:r>
+          </a:p>
+        </p:txBody>
+      </p:sp>
+      <p:sp>
+        <p:nvSpPr>
+          <p:cNvPr id="35" name="TextBox 34">
+            <a:extLst>
+              <a:ext uri="{FF2B5EF4-FFF2-40B4-BE49-F238E27FC236}">
+                <a16:creationId xmlns:a16="http://schemas.microsoft.com/office/drawing/2014/main" id="{7E0730CC-58C4-8548-9786-0CB86674CA0E}"/>
+              </a:ext>
+            </a:extLst>
+          </p:cNvPr>
+          <p:cNvSpPr txBox="1"/>
+          <p:nvPr/>
+        </p:nvSpPr>
+        <p:spPr>
+          <a:xfrm>
+            <a:off x="9414929" y="2444330"/>
+            <a:ext cx="1372887" cy="461665"/>
+          </a:xfrm>
+          <a:prstGeom prst="rect">
+            <a:avLst/>
+          </a:prstGeom>
+          <a:noFill/>
+        </p:spPr>
+        <p:txBody>
+          <a:bodyPr wrap="square" rtlCol="0">
+            <a:spAutoFit/>
+          </a:bodyPr>
+          <a:lstStyle/>
+          <a:p>
+            <a:pPr algn="ctr"/>
+            <a:r>
+              <a:rPr lang="en-US" sz="1200" dirty="0"/>
+              <a:t>Order Flowers Bot:</a:t>
+            </a:r>
+          </a:p>
+          <a:p>
+            <a:pPr algn="ctr"/>
+            <a:r>
+              <a:rPr lang="en-US" sz="1200" dirty="0"/>
+              <a:t> Amazon Lex</a:t>
+            </a:r>
+          </a:p>
+        </p:txBody>
+      </p:sp>
+      <p:pic>
+        <p:nvPicPr>
+          <p:cNvPr id="37" name="Graphic 36">
+            <a:extLst>
+              <a:ext uri="{FF2B5EF4-FFF2-40B4-BE49-F238E27FC236}">
+                <a16:creationId xmlns:a16="http://schemas.microsoft.com/office/drawing/2014/main" id="{34D14EE3-2832-7E4F-A6B0-A29542724564}"/>
+              </a:ext>
+            </a:extLst>
+          </p:cNvPr>
+          <p:cNvPicPr>
+            <a:picLocks noChangeAspect="1"/>
+          </p:cNvPicPr>
+          <p:nvPr/>
+        </p:nvPicPr>
+        <p:blipFill>
+          <a:blip r:embed="rId2">
+            <a:extLst>
+              <a:ext uri="{96DAC541-7B7A-43D3-8B79-37D633B846F1}">
+                <asvg:svgBlip xmlns:asvg="http://schemas.microsoft.com/office/drawing/2016/SVG/main" r:embed="rId3"/>
+              </a:ext>
+            </a:extLst>
+          </a:blip>
+          <a:stretch>
+            <a:fillRect/>
+          </a:stretch>
+        </p:blipFill>
+        <p:spPr>
+          <a:xfrm>
+            <a:off x="8710458" y="2314915"/>
+            <a:ext cx="711200" cy="711200"/>
+          </a:xfrm>
+          <a:prstGeom prst="rect">
+            <a:avLst/>
+          </a:prstGeom>
+        </p:spPr>
+      </p:pic>
+      <p:sp>
+        <p:nvSpPr>
+          <p:cNvPr id="38" name="TextBox 37">
+            <a:extLst>
+              <a:ext uri="{FF2B5EF4-FFF2-40B4-BE49-F238E27FC236}">
+                <a16:creationId xmlns:a16="http://schemas.microsoft.com/office/drawing/2014/main" id="{4A1D4F8C-CE3E-094C-9E35-4296DFB299B0}"/>
+              </a:ext>
+            </a:extLst>
+          </p:cNvPr>
+          <p:cNvSpPr txBox="1"/>
+          <p:nvPr/>
+        </p:nvSpPr>
+        <p:spPr>
+          <a:xfrm>
+            <a:off x="7867604" y="1189606"/>
+            <a:ext cx="1547325" cy="461665"/>
+          </a:xfrm>
+          <a:prstGeom prst="rect">
+            <a:avLst/>
+          </a:prstGeom>
+          <a:noFill/>
+        </p:spPr>
+        <p:txBody>
+          <a:bodyPr wrap="square" rtlCol="0">
+            <a:spAutoFit/>
+          </a:bodyPr>
+          <a:lstStyle/>
+          <a:p>
+            <a:pPr algn="ctr"/>
+            <a:r>
+              <a:rPr lang="en-US" sz="1200" dirty="0"/>
+              <a:t>Side-Processor: </a:t>
+            </a:r>
+          </a:p>
+          <a:p>
+            <a:pPr algn="ctr"/>
+            <a:r>
+              <a:rPr lang="en-US" sz="1200" dirty="0"/>
+              <a:t>Amazon Translate</a:t>
+            </a:r>
+          </a:p>
+        </p:txBody>
+      </p:sp>
+      <p:pic>
+        <p:nvPicPr>
+          <p:cNvPr id="40" name="Graphic 39">
+            <a:extLst>
+              <a:ext uri="{FF2B5EF4-FFF2-40B4-BE49-F238E27FC236}">
+                <a16:creationId xmlns:a16="http://schemas.microsoft.com/office/drawing/2014/main" id="{3AD7C85A-3BF3-E444-88CD-45217787FA24}"/>
+              </a:ext>
+            </a:extLst>
+          </p:cNvPr>
+          <p:cNvPicPr>
+            <a:picLocks noChangeAspect="1"/>
+          </p:cNvPicPr>
+          <p:nvPr/>
+        </p:nvPicPr>
+        <p:blipFill>
+          <a:blip r:embed="rId4">
+            <a:extLst>
+              <a:ext uri="{96DAC541-7B7A-43D3-8B79-37D633B846F1}">
+                <asvg:svgBlip xmlns:asvg="http://schemas.microsoft.com/office/drawing/2016/SVG/main" r:embed="rId5"/>
+              </a:ext>
+            </a:extLst>
+          </a:blip>
+          <a:stretch>
+            <a:fillRect/>
+          </a:stretch>
+        </p:blipFill>
+        <p:spPr>
+          <a:xfrm>
+            <a:off x="7203329" y="1099733"/>
+            <a:ext cx="711200" cy="711200"/>
+          </a:xfrm>
+          <a:prstGeom prst="rect">
+            <a:avLst/>
+          </a:prstGeom>
+        </p:spPr>
+      </p:pic>
+      <p:pic>
+        <p:nvPicPr>
+          <p:cNvPr id="41" name="Graphic 40">
+            <a:extLst>
+              <a:ext uri="{FF2B5EF4-FFF2-40B4-BE49-F238E27FC236}">
+                <a16:creationId xmlns:a16="http://schemas.microsoft.com/office/drawing/2014/main" id="{185AE6FB-7B95-5041-BE83-C83D983919BC}"/>
+              </a:ext>
+            </a:extLst>
+          </p:cNvPr>
+          <p:cNvPicPr>
+            <a:picLocks noChangeAspect="1"/>
+          </p:cNvPicPr>
+          <p:nvPr/>
+        </p:nvPicPr>
+        <p:blipFill>
+          <a:blip r:embed="rId6">
+            <a:extLst>
+              <a:ext uri="{96DAC541-7B7A-43D3-8B79-37D633B846F1}">
+                <asvg:svgBlip xmlns:asvg="http://schemas.microsoft.com/office/drawing/2016/SVG/main" r:embed="rId7"/>
+              </a:ext>
+            </a:extLst>
+          </a:blip>
+          <a:stretch>
+            <a:fillRect/>
+          </a:stretch>
+        </p:blipFill>
+        <p:spPr>
+          <a:xfrm>
+            <a:off x="5550794" y="4317310"/>
+            <a:ext cx="712979" cy="712979"/>
+          </a:xfrm>
+          <a:prstGeom prst="rect">
+            <a:avLst/>
+          </a:prstGeom>
+        </p:spPr>
+      </p:pic>
+      <p:sp>
+        <p:nvSpPr>
+          <p:cNvPr id="42" name="TextBox 41">
+            <a:extLst>
+              <a:ext uri="{FF2B5EF4-FFF2-40B4-BE49-F238E27FC236}">
+                <a16:creationId xmlns:a16="http://schemas.microsoft.com/office/drawing/2014/main" id="{83C78666-88C5-CB4E-A0AF-3C8E87B9AA56}"/>
+              </a:ext>
+            </a:extLst>
+          </p:cNvPr>
+          <p:cNvSpPr txBox="1"/>
+          <p:nvPr/>
+        </p:nvSpPr>
+        <p:spPr>
+          <a:xfrm>
+            <a:off x="6128755" y="4792765"/>
+            <a:ext cx="1372887" cy="276999"/>
+          </a:xfrm>
+          <a:prstGeom prst="rect">
+            <a:avLst/>
+          </a:prstGeom>
+          <a:noFill/>
+        </p:spPr>
+        <p:txBody>
+          <a:bodyPr wrap="square" rtlCol="0">
+            <a:spAutoFit/>
+          </a:bodyPr>
+          <a:lstStyle/>
+          <a:p>
+            <a:pPr algn="ctr"/>
+            <a:r>
+              <a:rPr lang="en-US" sz="1200" dirty="0"/>
+              <a:t>CodePipeline</a:t>
+            </a:r>
+          </a:p>
+        </p:txBody>
+      </p:sp>
+      <p:pic>
+        <p:nvPicPr>
+          <p:cNvPr id="8" name="Picture 7">
+            <a:extLst>
+              <a:ext uri="{FF2B5EF4-FFF2-40B4-BE49-F238E27FC236}">
+                <a16:creationId xmlns:a16="http://schemas.microsoft.com/office/drawing/2014/main" id="{93CFE4D0-9800-334C-ADE0-BD8B715122BC}"/>
+              </a:ext>
+            </a:extLst>
+          </p:cNvPr>
+          <p:cNvPicPr>
+            <a:picLocks noChangeAspect="1"/>
+          </p:cNvPicPr>
+          <p:nvPr/>
+        </p:nvPicPr>
+        <p:blipFill>
+          <a:blip r:embed="rId8"/>
+          <a:stretch>
+            <a:fillRect/>
+          </a:stretch>
+        </p:blipFill>
+        <p:spPr>
+          <a:xfrm>
+            <a:off x="4049125" y="4250358"/>
+            <a:ext cx="833565" cy="833565"/>
+          </a:xfrm>
+          <a:prstGeom prst="rect">
+            <a:avLst/>
+          </a:prstGeom>
+        </p:spPr>
+      </p:pic>
+      <p:cxnSp>
+        <p:nvCxnSpPr>
+          <p:cNvPr id="44" name="Elbow Connector 43">
+            <a:extLst>
+              <a:ext uri="{FF2B5EF4-FFF2-40B4-BE49-F238E27FC236}">
+                <a16:creationId xmlns:a16="http://schemas.microsoft.com/office/drawing/2014/main" id="{92FFCEB7-9510-5145-97F6-09FBD780021F}"/>
+              </a:ext>
+            </a:extLst>
+          </p:cNvPr>
+          <p:cNvCxnSpPr>
+            <a:cxnSpLocks/>
+            <a:stCxn id="66" idx="3"/>
+            <a:endCxn id="85" idx="1"/>
+          </p:cNvCxnSpPr>
+          <p:nvPr/>
+        </p:nvCxnSpPr>
+        <p:spPr>
+          <a:xfrm>
+            <a:off x="4760700" y="2668536"/>
+            <a:ext cx="800300" cy="6627"/>
+          </a:xfrm>
+          <a:prstGeom prst="bentConnector3">
+            <a:avLst>
+              <a:gd name="adj1" fmla="val 50000"/>
+            </a:avLst>
+          </a:prstGeom>
+        </p:spPr>
+        <p:style>
+          <a:lnRef idx="1">
+            <a:schemeClr val="accent1"/>
+          </a:lnRef>
+          <a:fillRef idx="0">
+            <a:schemeClr val="accent1"/>
+          </a:fillRef>
+          <a:effectRef idx="0">
+            <a:schemeClr val="accent1"/>
+          </a:effectRef>
+          <a:fontRef idx="minor">
+            <a:schemeClr val="tx1"/>
+          </a:fontRef>
+        </p:style>
+      </p:cxnSp>
+      <p:cxnSp>
+        <p:nvCxnSpPr>
+          <p:cNvPr id="51" name="Elbow Connector 50">
+            <a:extLst>
+              <a:ext uri="{FF2B5EF4-FFF2-40B4-BE49-F238E27FC236}">
+                <a16:creationId xmlns:a16="http://schemas.microsoft.com/office/drawing/2014/main" id="{5600E802-A826-3D4C-B181-CAF77B25EA8F}"/>
+              </a:ext>
+            </a:extLst>
+          </p:cNvPr>
+          <p:cNvCxnSpPr>
+            <a:cxnSpLocks/>
+            <a:stCxn id="41" idx="0"/>
+            <a:endCxn id="65" idx="3"/>
+          </p:cNvCxnSpPr>
+          <p:nvPr/>
+        </p:nvCxnSpPr>
+        <p:spPr>
+          <a:xfrm rot="16200000" flipV="1">
+            <a:off x="4992419" y="3402445"/>
+            <a:ext cx="683147" cy="1146584"/>
+          </a:xfrm>
+          <a:prstGeom prst="bentConnector2">
+            <a:avLst/>
+          </a:prstGeom>
+          <a:ln>
+            <a:solidFill>
+              <a:srgbClr val="7030A0"/>
+            </a:solidFill>
+            <a:tailEnd type="triangle"/>
+          </a:ln>
+        </p:spPr>
+        <p:style>
+          <a:lnRef idx="1">
+            <a:schemeClr val="accent1"/>
+          </a:lnRef>
+          <a:fillRef idx="0">
+            <a:schemeClr val="accent1"/>
+          </a:fillRef>
+          <a:effectRef idx="0">
+            <a:schemeClr val="accent1"/>
+          </a:effectRef>
+          <a:fontRef idx="minor">
+            <a:schemeClr val="tx1"/>
+          </a:fontRef>
+        </p:style>
+      </p:cxnSp>
+      <p:cxnSp>
+        <p:nvCxnSpPr>
+          <p:cNvPr id="55" name="Elbow Connector 54">
+            <a:extLst>
+              <a:ext uri="{FF2B5EF4-FFF2-40B4-BE49-F238E27FC236}">
+                <a16:creationId xmlns:a16="http://schemas.microsoft.com/office/drawing/2014/main" id="{25B90644-52E5-3A43-AAC9-DB811F5158FC}"/>
+              </a:ext>
+            </a:extLst>
+          </p:cNvPr>
+          <p:cNvCxnSpPr>
+            <a:cxnSpLocks/>
+            <a:stCxn id="41" idx="3"/>
+            <a:endCxn id="16" idx="2"/>
+          </p:cNvCxnSpPr>
+          <p:nvPr/>
+        </p:nvCxnSpPr>
+        <p:spPr>
+          <a:xfrm flipV="1">
+            <a:off x="6263773" y="3248530"/>
+            <a:ext cx="493395" cy="1425270"/>
+          </a:xfrm>
+          <a:prstGeom prst="bentConnector2">
+            <a:avLst/>
+          </a:prstGeom>
+          <a:ln>
+            <a:solidFill>
+              <a:srgbClr val="7030A0"/>
+            </a:solidFill>
+            <a:tailEnd type="triangle"/>
+          </a:ln>
+        </p:spPr>
+        <p:style>
+          <a:lnRef idx="1">
+            <a:schemeClr val="accent1"/>
+          </a:lnRef>
+          <a:fillRef idx="0">
+            <a:schemeClr val="accent1"/>
+          </a:fillRef>
+          <a:effectRef idx="0">
+            <a:schemeClr val="accent1"/>
+          </a:effectRef>
+          <a:fontRef idx="minor">
+            <a:schemeClr val="tx1"/>
+          </a:fontRef>
+        </p:style>
+      </p:cxnSp>
+      <p:cxnSp>
+        <p:nvCxnSpPr>
+          <p:cNvPr id="61" name="Elbow Connector 60">
+            <a:extLst>
+              <a:ext uri="{FF2B5EF4-FFF2-40B4-BE49-F238E27FC236}">
+                <a16:creationId xmlns:a16="http://schemas.microsoft.com/office/drawing/2014/main" id="{7650FA1A-AF8F-9646-8F17-E2189C81EC07}"/>
+              </a:ext>
+            </a:extLst>
+          </p:cNvPr>
+          <p:cNvCxnSpPr>
+            <a:cxnSpLocks/>
+            <a:stCxn id="8" idx="3"/>
+            <a:endCxn id="41" idx="1"/>
+          </p:cNvCxnSpPr>
+          <p:nvPr/>
+        </p:nvCxnSpPr>
+        <p:spPr>
+          <a:xfrm>
+            <a:off x="4882690" y="4667141"/>
+            <a:ext cx="668104" cy="6659"/>
+          </a:xfrm>
+          <a:prstGeom prst="bentConnector3">
+            <a:avLst>
+              <a:gd name="adj1" fmla="val 50000"/>
+            </a:avLst>
+          </a:prstGeom>
+          <a:ln>
+            <a:solidFill>
+              <a:srgbClr val="7030A0"/>
+            </a:solidFill>
+            <a:tailEnd type="triangle"/>
+          </a:ln>
+        </p:spPr>
+        <p:style>
+          <a:lnRef idx="1">
+            <a:schemeClr val="accent1"/>
+          </a:lnRef>
+          <a:fillRef idx="0">
+            <a:schemeClr val="accent1"/>
+          </a:fillRef>
+          <a:effectRef idx="0">
+            <a:schemeClr val="accent1"/>
+          </a:effectRef>
+          <a:fontRef idx="minor">
+            <a:schemeClr val="tx1"/>
+          </a:fontRef>
+        </p:style>
+      </p:cxnSp>
+      <p:pic>
+        <p:nvPicPr>
+          <p:cNvPr id="65" name="Graphic 64">
+            <a:extLst>
+              <a:ext uri="{FF2B5EF4-FFF2-40B4-BE49-F238E27FC236}">
+                <a16:creationId xmlns:a16="http://schemas.microsoft.com/office/drawing/2014/main" id="{95A04EFC-6495-634C-9578-149AE7A2627F}"/>
+              </a:ext>
+            </a:extLst>
+          </p:cNvPr>
+          <p:cNvPicPr>
+            <a:picLocks noChangeAspect="1"/>
+          </p:cNvPicPr>
+          <p:nvPr/>
+        </p:nvPicPr>
+        <p:blipFill>
+          <a:blip r:embed="rId9">
+            <a:extLst>
+              <a:ext uri="{96DAC541-7B7A-43D3-8B79-37D633B846F1}">
+                <asvg:svgBlip xmlns:asvg="http://schemas.microsoft.com/office/drawing/2016/SVG/main" r:embed="rId10"/>
+              </a:ext>
+            </a:extLst>
+          </a:blip>
+          <a:stretch>
+            <a:fillRect/>
+          </a:stretch>
+        </p:blipFill>
+        <p:spPr>
+          <a:xfrm>
+            <a:off x="4065490" y="3286558"/>
+            <a:ext cx="695210" cy="695210"/>
+          </a:xfrm>
+          <a:prstGeom prst="rect">
+            <a:avLst/>
+          </a:prstGeom>
+        </p:spPr>
+      </p:pic>
+      <p:pic>
+        <p:nvPicPr>
+          <p:cNvPr id="66" name="Graphic 65">
+            <a:extLst>
+              <a:ext uri="{FF2B5EF4-FFF2-40B4-BE49-F238E27FC236}">
+                <a16:creationId xmlns:a16="http://schemas.microsoft.com/office/drawing/2014/main" id="{63B5BE2E-EE8F-4C4B-8E37-52508DA45F01}"/>
+              </a:ext>
+            </a:extLst>
+          </p:cNvPr>
+          <p:cNvPicPr>
+            <a:picLocks noChangeAspect="1"/>
+          </p:cNvPicPr>
+          <p:nvPr/>
+        </p:nvPicPr>
+        <p:blipFill>
+          <a:blip r:embed="rId11">
+            <a:extLst>
+              <a:ext uri="{96DAC541-7B7A-43D3-8B79-37D633B846F1}">
+                <asvg:svgBlip xmlns:asvg="http://schemas.microsoft.com/office/drawing/2016/SVG/main" r:embed="rId12"/>
+              </a:ext>
+            </a:extLst>
+          </a:blip>
+          <a:stretch>
+            <a:fillRect/>
+          </a:stretch>
+        </p:blipFill>
+        <p:spPr>
+          <a:xfrm>
+            <a:off x="4049500" y="2312936"/>
+            <a:ext cx="711200" cy="711200"/>
+          </a:xfrm>
+          <a:prstGeom prst="rect">
+            <a:avLst/>
+          </a:prstGeom>
+        </p:spPr>
+      </p:pic>
+      <p:pic>
+        <p:nvPicPr>
+          <p:cNvPr id="76" name="Graphic 75">
+            <a:extLst>
+              <a:ext uri="{FF2B5EF4-FFF2-40B4-BE49-F238E27FC236}">
+                <a16:creationId xmlns:a16="http://schemas.microsoft.com/office/drawing/2014/main" id="{33622E83-3954-204B-A0E6-276D981E1428}"/>
+              </a:ext>
+            </a:extLst>
+          </p:cNvPr>
+          <p:cNvPicPr>
+            <a:picLocks noChangeAspect="1"/>
+          </p:cNvPicPr>
+          <p:nvPr/>
+        </p:nvPicPr>
+        <p:blipFill>
+          <a:blip r:embed="rId13">
+            <a:extLst>
+              <a:ext uri="{96DAC541-7B7A-43D3-8B79-37D633B846F1}">
+                <asvg:svgBlip xmlns:asvg="http://schemas.microsoft.com/office/drawing/2016/SVG/main" r:embed="rId14"/>
+              </a:ext>
+            </a:extLst>
+          </a:blip>
+          <a:stretch>
+            <a:fillRect/>
+          </a:stretch>
+        </p:blipFill>
+        <p:spPr>
+          <a:xfrm>
+            <a:off x="4059616" y="1230642"/>
+            <a:ext cx="711200" cy="711200"/>
+          </a:xfrm>
+          <a:prstGeom prst="rect">
+            <a:avLst/>
+          </a:prstGeom>
+        </p:spPr>
+      </p:pic>
+      <p:pic>
+        <p:nvPicPr>
+          <p:cNvPr id="78" name="Graphic 77">
+            <a:extLst>
+              <a:ext uri="{FF2B5EF4-FFF2-40B4-BE49-F238E27FC236}">
+                <a16:creationId xmlns:a16="http://schemas.microsoft.com/office/drawing/2014/main" id="{6606E9C3-91AB-2340-BAD3-350A4BE01804}"/>
+              </a:ext>
+            </a:extLst>
+          </p:cNvPr>
+          <p:cNvPicPr>
+            <a:picLocks noChangeAspect="1"/>
+          </p:cNvPicPr>
+          <p:nvPr/>
+        </p:nvPicPr>
+        <p:blipFill>
+          <a:blip r:embed="rId15">
+            <a:extLst>
+              <a:ext uri="{96DAC541-7B7A-43D3-8B79-37D633B846F1}">
+                <asvg:svgBlip xmlns:asvg="http://schemas.microsoft.com/office/drawing/2016/SVG/main" r:embed="rId16"/>
+              </a:ext>
+            </a:extLst>
+          </a:blip>
+          <a:stretch>
+            <a:fillRect/>
+          </a:stretch>
+        </p:blipFill>
+        <p:spPr>
+          <a:xfrm>
+            <a:off x="5558527" y="1166966"/>
+            <a:ext cx="711200" cy="711200"/>
+          </a:xfrm>
+          <a:prstGeom prst="rect">
+            <a:avLst/>
+          </a:prstGeom>
+        </p:spPr>
+      </p:pic>
+      <p:pic>
+        <p:nvPicPr>
+          <p:cNvPr id="84" name="Graphic 83">
+            <a:extLst>
+              <a:ext uri="{FF2B5EF4-FFF2-40B4-BE49-F238E27FC236}">
+                <a16:creationId xmlns:a16="http://schemas.microsoft.com/office/drawing/2014/main" id="{C5F73DB6-5F7C-3F44-881D-2FB522345563}"/>
+              </a:ext>
+            </a:extLst>
+          </p:cNvPr>
+          <p:cNvPicPr>
+            <a:picLocks noChangeAspect="1"/>
+          </p:cNvPicPr>
+          <p:nvPr/>
+        </p:nvPicPr>
+        <p:blipFill>
+          <a:blip r:embed="rId17">
+            <a:extLst>
+              <a:ext uri="{96DAC541-7B7A-43D3-8B79-37D633B846F1}">
+                <asvg:svgBlip xmlns:asvg="http://schemas.microsoft.com/office/drawing/2016/SVG/main" r:embed="rId18"/>
+              </a:ext>
+            </a:extLst>
+          </a:blip>
+          <a:stretch>
+            <a:fillRect/>
+          </a:stretch>
+        </p:blipFill>
+        <p:spPr>
+          <a:xfrm>
+            <a:off x="7203329" y="2310981"/>
+            <a:ext cx="711200" cy="711200"/>
+          </a:xfrm>
+          <a:prstGeom prst="rect">
+            <a:avLst/>
+          </a:prstGeom>
+        </p:spPr>
+      </p:pic>
+      <p:pic>
+        <p:nvPicPr>
+          <p:cNvPr id="85" name="Graphic 84">
+            <a:extLst>
+              <a:ext uri="{FF2B5EF4-FFF2-40B4-BE49-F238E27FC236}">
+                <a16:creationId xmlns:a16="http://schemas.microsoft.com/office/drawing/2014/main" id="{4F9845CA-975F-2045-B437-2283F9D9C337}"/>
+              </a:ext>
+            </a:extLst>
+          </p:cNvPr>
+          <p:cNvPicPr>
+            <a:picLocks noChangeAspect="1"/>
+          </p:cNvPicPr>
+          <p:nvPr/>
+        </p:nvPicPr>
+        <p:blipFill>
+          <a:blip r:embed="rId19">
+            <a:extLst>
+              <a:ext uri="{96DAC541-7B7A-43D3-8B79-37D633B846F1}">
+                <asvg:svgBlip xmlns:asvg="http://schemas.microsoft.com/office/drawing/2016/SVG/main" r:embed="rId20"/>
+              </a:ext>
+            </a:extLst>
+          </a:blip>
+          <a:stretch>
+            <a:fillRect/>
+          </a:stretch>
+        </p:blipFill>
+        <p:spPr>
+          <a:xfrm>
+            <a:off x="5561000" y="2319563"/>
+            <a:ext cx="711200" cy="711200"/>
+          </a:xfrm>
+          <a:prstGeom prst="rect">
+            <a:avLst/>
+          </a:prstGeom>
+        </p:spPr>
+      </p:pic>
+      <p:sp>
+        <p:nvSpPr>
+          <p:cNvPr id="100" name="Oval 99">
+            <a:extLst>
+              <a:ext uri="{FF2B5EF4-FFF2-40B4-BE49-F238E27FC236}">
+                <a16:creationId xmlns:a16="http://schemas.microsoft.com/office/drawing/2014/main" id="{CD0923B5-2719-8344-98FD-746F08FD1383}"/>
+              </a:ext>
+            </a:extLst>
+          </p:cNvPr>
+          <p:cNvSpPr/>
+          <p:nvPr/>
+        </p:nvSpPr>
+        <p:spPr>
+          <a:xfrm>
+            <a:off x="7248608" y="3997923"/>
+            <a:ext cx="276693" cy="293560"/>
+          </a:xfrm>
+          <a:prstGeom prst="ellipse">
+            <a:avLst/>
+          </a:prstGeom>
+          <a:solidFill>
+            <a:srgbClr val="FFFF00"/>
+          </a:solidFill>
+          <a:ln>
+            <a:solidFill>
+              <a:schemeClr val="tx1"/>
+            </a:solidFill>
+          </a:ln>
+        </p:spPr>
+        <p:style>
+          <a:lnRef idx="2">
+            <a:schemeClr val="accent1">
+              <a:shade val="50000"/>
+            </a:schemeClr>
+          </a:lnRef>
+          <a:fillRef idx="1">
+            <a:schemeClr val="accent1"/>
+          </a:fillRef>
+          <a:effectRef idx="0">
+            <a:schemeClr val="accent1"/>
+          </a:effectRef>
+          <a:fontRef idx="minor">
+            <a:schemeClr val="lt1"/>
+          </a:fontRef>
+        </p:style>
+        <p:txBody>
+          <a:bodyPr rtlCol="0" anchor="ctr"/>
+          <a:lstStyle/>
+          <a:p>
+            <a:pPr algn="ctr"/>
+            <a:r>
+              <a:rPr lang="en-US" sz="1200" dirty="0">
+                <a:solidFill>
+                  <a:schemeClr val="tx1"/>
+                </a:solidFill>
+              </a:rPr>
+              <a:t>4</a:t>
+            </a:r>
+          </a:p>
+        </p:txBody>
+      </p:sp>
+      <p:sp>
+        <p:nvSpPr>
+          <p:cNvPr id="107" name="TextBox 106">
+            <a:extLst>
+              <a:ext uri="{FF2B5EF4-FFF2-40B4-BE49-F238E27FC236}">
+                <a16:creationId xmlns:a16="http://schemas.microsoft.com/office/drawing/2014/main" id="{09AB3470-69DB-2741-BFAF-6D61F0396607}"/>
+              </a:ext>
+            </a:extLst>
+          </p:cNvPr>
+          <p:cNvSpPr txBox="1"/>
+          <p:nvPr/>
+        </p:nvSpPr>
+        <p:spPr>
+          <a:xfrm>
+            <a:off x="5053513" y="3670068"/>
+            <a:ext cx="860430" cy="430887"/>
+          </a:xfrm>
+          <a:prstGeom prst="rect">
+            <a:avLst/>
+          </a:prstGeom>
+          <a:noFill/>
+        </p:spPr>
+        <p:txBody>
+          <a:bodyPr wrap="square" rtlCol="0">
+            <a:spAutoFit/>
+          </a:bodyPr>
+          <a:lstStyle/>
+          <a:p>
+            <a:pPr algn="ctr"/>
+            <a:r>
+              <a:rPr lang="en-US" sz="1100" dirty="0"/>
+              <a:t>Deploy website</a:t>
+            </a:r>
+          </a:p>
+        </p:txBody>
+      </p:sp>
+      <p:sp>
+        <p:nvSpPr>
+          <p:cNvPr id="108" name="TextBox 107">
+            <a:extLst>
+              <a:ext uri="{FF2B5EF4-FFF2-40B4-BE49-F238E27FC236}">
+                <a16:creationId xmlns:a16="http://schemas.microsoft.com/office/drawing/2014/main" id="{AF687F40-9C12-6049-86AC-6ECFCB84D7A9}"/>
+              </a:ext>
+            </a:extLst>
+          </p:cNvPr>
+          <p:cNvSpPr txBox="1"/>
+          <p:nvPr/>
+        </p:nvSpPr>
+        <p:spPr>
+          <a:xfrm>
+            <a:off x="5898550" y="3911409"/>
+            <a:ext cx="860430" cy="261610"/>
+          </a:xfrm>
+          <a:prstGeom prst="rect">
+            <a:avLst/>
+          </a:prstGeom>
+          <a:noFill/>
+        </p:spPr>
+        <p:txBody>
+          <a:bodyPr wrap="square" rtlCol="0">
+            <a:spAutoFit/>
+          </a:bodyPr>
+          <a:lstStyle/>
+          <a:p>
+            <a:pPr algn="ctr"/>
+            <a:r>
+              <a:rPr lang="en-US" sz="1100" dirty="0"/>
+              <a:t>Deploy API</a:t>
+            </a:r>
+          </a:p>
+        </p:txBody>
+      </p:sp>
+      <p:sp>
+        <p:nvSpPr>
+          <p:cNvPr id="109" name="TextBox 108">
+            <a:extLst>
+              <a:ext uri="{FF2B5EF4-FFF2-40B4-BE49-F238E27FC236}">
+                <a16:creationId xmlns:a16="http://schemas.microsoft.com/office/drawing/2014/main" id="{1C228791-AD71-9742-BFE1-C9D639D28DFD}"/>
+              </a:ext>
+            </a:extLst>
+          </p:cNvPr>
+          <p:cNvSpPr txBox="1"/>
+          <p:nvPr/>
+        </p:nvSpPr>
+        <p:spPr>
+          <a:xfrm>
+            <a:off x="2634594" y="3029985"/>
+            <a:ext cx="1081065" cy="461665"/>
+          </a:xfrm>
+          <a:prstGeom prst="rect">
+            <a:avLst/>
+          </a:prstGeom>
+          <a:noFill/>
+        </p:spPr>
+        <p:txBody>
+          <a:bodyPr wrap="none" rtlCol="0">
+            <a:spAutoFit/>
+          </a:bodyPr>
+          <a:lstStyle/>
+          <a:p>
+            <a:r>
+              <a:rPr lang="en-US" sz="1200" dirty="0"/>
+              <a:t>Multilanguage</a:t>
+            </a:r>
+          </a:p>
+          <a:p>
+            <a:r>
+              <a:rPr lang="en-US" sz="1200" dirty="0"/>
+              <a:t>Users</a:t>
+            </a:r>
+          </a:p>
+        </p:txBody>
+      </p:sp>
+      <p:pic>
+        <p:nvPicPr>
+          <p:cNvPr id="126" name="Graphic 125">
+            <a:extLst>
+              <a:ext uri="{FF2B5EF4-FFF2-40B4-BE49-F238E27FC236}">
+                <a16:creationId xmlns:a16="http://schemas.microsoft.com/office/drawing/2014/main" id="{F0F4E78F-9B5C-044D-8F8B-24233E51007D}"/>
+              </a:ext>
+            </a:extLst>
+          </p:cNvPr>
+          <p:cNvPicPr>
+            <a:picLocks noChangeAspect="1"/>
+          </p:cNvPicPr>
+          <p:nvPr/>
+        </p:nvPicPr>
+        <p:blipFill>
+          <a:blip r:embed="rId21">
+            <a:extLst>
+              <a:ext uri="{96DAC541-7B7A-43D3-8B79-37D633B846F1}">
+                <asvg:svgBlip xmlns:asvg="http://schemas.microsoft.com/office/drawing/2016/SVG/main" r:embed="rId22"/>
+              </a:ext>
+            </a:extLst>
+          </a:blip>
+          <a:stretch>
+            <a:fillRect/>
+          </a:stretch>
+        </p:blipFill>
+        <p:spPr>
+          <a:xfrm flipH="1">
+            <a:off x="5645169" y="5366802"/>
+            <a:ext cx="483586" cy="469900"/>
+          </a:xfrm>
+          <a:prstGeom prst="rect">
+            <a:avLst/>
+          </a:prstGeom>
+        </p:spPr>
+      </p:pic>
+      <p:sp>
+        <p:nvSpPr>
+          <p:cNvPr id="127" name="TextBox 126">
+            <a:extLst>
+              <a:ext uri="{FF2B5EF4-FFF2-40B4-BE49-F238E27FC236}">
+                <a16:creationId xmlns:a16="http://schemas.microsoft.com/office/drawing/2014/main" id="{DAC9E563-A2EC-B240-A022-A40592CC32C3}"/>
+              </a:ext>
+            </a:extLst>
+          </p:cNvPr>
+          <p:cNvSpPr txBox="1"/>
+          <p:nvPr/>
+        </p:nvSpPr>
+        <p:spPr>
+          <a:xfrm>
+            <a:off x="5140944" y="5890336"/>
+            <a:ext cx="1506552" cy="307777"/>
+          </a:xfrm>
+          <a:prstGeom prst="rect">
+            <a:avLst/>
+          </a:prstGeom>
+          <a:noFill/>
+        </p:spPr>
+        <p:txBody>
+          <a:bodyPr wrap="square" rtlCol="0">
+            <a:spAutoFit/>
+          </a:bodyPr>
+          <a:lstStyle/>
+          <a:p>
+            <a:pPr algn="ctr"/>
+            <a:r>
+              <a:rPr lang="en-US" sz="1400" dirty="0"/>
+              <a:t>Engineering</a:t>
+            </a:r>
+          </a:p>
+        </p:txBody>
+      </p:sp>
+      <p:pic>
+        <p:nvPicPr>
+          <p:cNvPr id="128" name="Graphic 127">
+            <a:extLst>
+              <a:ext uri="{FF2B5EF4-FFF2-40B4-BE49-F238E27FC236}">
+                <a16:creationId xmlns:a16="http://schemas.microsoft.com/office/drawing/2014/main" id="{EEAC0093-32DC-7746-B320-D2EBB684DCDF}"/>
+              </a:ext>
+            </a:extLst>
+          </p:cNvPr>
+          <p:cNvPicPr>
+            <a:picLocks noChangeAspect="1"/>
+          </p:cNvPicPr>
+          <p:nvPr/>
+        </p:nvPicPr>
+        <p:blipFill>
+          <a:blip r:embed="rId21">
+            <a:extLst>
+              <a:ext uri="{96DAC541-7B7A-43D3-8B79-37D633B846F1}">
+                <asvg:svgBlip xmlns:asvg="http://schemas.microsoft.com/office/drawing/2016/SVG/main" r:embed="rId22"/>
+              </a:ext>
+            </a:extLst>
+          </a:blip>
+          <a:stretch>
+            <a:fillRect/>
+          </a:stretch>
+        </p:blipFill>
+        <p:spPr>
+          <a:xfrm flipH="1">
+            <a:off x="2853239" y="2440213"/>
+            <a:ext cx="483586" cy="469900"/>
+          </a:xfrm>
+          <a:prstGeom prst="rect">
+            <a:avLst/>
+          </a:prstGeom>
+        </p:spPr>
+      </p:pic>
+      <p:cxnSp>
+        <p:nvCxnSpPr>
+          <p:cNvPr id="131" name="Elbow Connector 130">
+            <a:extLst>
+              <a:ext uri="{FF2B5EF4-FFF2-40B4-BE49-F238E27FC236}">
+                <a16:creationId xmlns:a16="http://schemas.microsoft.com/office/drawing/2014/main" id="{40AD9675-FF34-7844-97D6-0CD0DD2EED53}"/>
+              </a:ext>
+            </a:extLst>
+          </p:cNvPr>
+          <p:cNvCxnSpPr>
+            <a:cxnSpLocks/>
+            <a:stCxn id="126" idx="3"/>
+            <a:endCxn id="8" idx="2"/>
+          </p:cNvCxnSpPr>
+          <p:nvPr/>
+        </p:nvCxnSpPr>
+        <p:spPr>
+          <a:xfrm rot="10800000">
+            <a:off x="4465909" y="5083924"/>
+            <a:ext cx="1179261" cy="517829"/>
+          </a:xfrm>
+          <a:prstGeom prst="bentConnector2">
+            <a:avLst/>
+          </a:prstGeom>
+          <a:ln>
+            <a:solidFill>
+              <a:srgbClr val="7030A0"/>
+            </a:solidFill>
+            <a:tailEnd type="triangle"/>
+          </a:ln>
+        </p:spPr>
+        <p:style>
+          <a:lnRef idx="1">
+            <a:schemeClr val="accent1"/>
+          </a:lnRef>
+          <a:fillRef idx="0">
+            <a:schemeClr val="accent1"/>
+          </a:fillRef>
+          <a:effectRef idx="0">
+            <a:schemeClr val="accent1"/>
+          </a:effectRef>
+          <a:fontRef idx="minor">
+            <a:schemeClr val="tx1"/>
+          </a:fontRef>
+        </p:style>
+      </p:cxnSp>
+      <p:sp>
+        <p:nvSpPr>
+          <p:cNvPr id="135" name="TextBox 134">
+            <a:extLst>
+              <a:ext uri="{FF2B5EF4-FFF2-40B4-BE49-F238E27FC236}">
+                <a16:creationId xmlns:a16="http://schemas.microsoft.com/office/drawing/2014/main" id="{65CBA172-77DE-C143-A46B-EA88A22C1EE1}"/>
+              </a:ext>
+            </a:extLst>
+          </p:cNvPr>
+          <p:cNvSpPr txBox="1"/>
+          <p:nvPr/>
+        </p:nvSpPr>
+        <p:spPr>
+          <a:xfrm>
+            <a:off x="4433074" y="5653532"/>
+            <a:ext cx="526763" cy="276999"/>
+          </a:xfrm>
+          <a:prstGeom prst="rect">
+            <a:avLst/>
+          </a:prstGeom>
+          <a:noFill/>
+        </p:spPr>
+        <p:txBody>
+          <a:bodyPr wrap="square" rtlCol="0">
+            <a:spAutoFit/>
+          </a:bodyPr>
+          <a:lstStyle/>
+          <a:p>
+            <a:pPr algn="ctr"/>
+            <a:r>
+              <a:rPr lang="en-US" sz="1200" dirty="0"/>
+              <a:t>code</a:t>
+            </a:r>
+          </a:p>
+        </p:txBody>
+      </p:sp>
+      <p:pic>
+        <p:nvPicPr>
+          <p:cNvPr id="136" name="Graphic 135">
+            <a:extLst>
+              <a:ext uri="{FF2B5EF4-FFF2-40B4-BE49-F238E27FC236}">
+                <a16:creationId xmlns:a16="http://schemas.microsoft.com/office/drawing/2014/main" id="{A6DF87B7-C9BB-FC49-8C2F-8A4F6FFCFFAC}"/>
+              </a:ext>
+            </a:extLst>
+          </p:cNvPr>
+          <p:cNvPicPr>
+            <a:picLocks noChangeAspect="1"/>
+          </p:cNvPicPr>
+          <p:nvPr/>
+        </p:nvPicPr>
+        <p:blipFill>
+          <a:blip r:embed="rId23">
+            <a:extLst>
+              <a:ext uri="{96DAC541-7B7A-43D3-8B79-37D633B846F1}">
+                <asvg:svgBlip xmlns:asvg="http://schemas.microsoft.com/office/drawing/2016/SVG/main" r:embed="rId24"/>
+              </a:ext>
+            </a:extLst>
+          </a:blip>
+          <a:stretch>
+            <a:fillRect/>
+          </a:stretch>
+        </p:blipFill>
+        <p:spPr>
+          <a:xfrm>
+            <a:off x="7822521" y="4359671"/>
+            <a:ext cx="614940" cy="614940"/>
+          </a:xfrm>
+          <a:prstGeom prst="rect">
+            <a:avLst/>
+          </a:prstGeom>
+        </p:spPr>
+      </p:pic>
+      <p:cxnSp>
+        <p:nvCxnSpPr>
+          <p:cNvPr id="138" name="Elbow Connector 137">
+            <a:extLst>
+              <a:ext uri="{FF2B5EF4-FFF2-40B4-BE49-F238E27FC236}">
+                <a16:creationId xmlns:a16="http://schemas.microsoft.com/office/drawing/2014/main" id="{A3F731DD-0E19-F54B-B98C-32BF4D2A3419}"/>
+              </a:ext>
+            </a:extLst>
+          </p:cNvPr>
+          <p:cNvCxnSpPr>
+            <a:cxnSpLocks/>
+            <a:endCxn id="136" idx="0"/>
+          </p:cNvCxnSpPr>
+          <p:nvPr/>
+        </p:nvCxnSpPr>
+        <p:spPr>
+          <a:xfrm rot="16200000" flipH="1">
+            <a:off x="7555435" y="3785115"/>
+            <a:ext cx="1029184" cy="119927"/>
+          </a:xfrm>
+          <a:prstGeom prst="bentConnector3">
+            <a:avLst>
+              <a:gd name="adj1" fmla="val 50000"/>
+            </a:avLst>
+          </a:prstGeom>
+          <a:ln>
+            <a:solidFill>
+              <a:srgbClr val="7030A0"/>
+            </a:solidFill>
+            <a:tailEnd type="triangle"/>
+          </a:ln>
+        </p:spPr>
+        <p:style>
+          <a:lnRef idx="1">
+            <a:schemeClr val="accent1"/>
+          </a:lnRef>
+          <a:fillRef idx="0">
+            <a:schemeClr val="accent1"/>
+          </a:fillRef>
+          <a:effectRef idx="0">
+            <a:schemeClr val="accent1"/>
+          </a:effectRef>
+          <a:fontRef idx="minor">
+            <a:schemeClr val="tx1"/>
+          </a:fontRef>
+        </p:style>
+      </p:cxnSp>
+      <p:cxnSp>
+        <p:nvCxnSpPr>
+          <p:cNvPr id="151" name="Elbow Connector 150">
+            <a:extLst>
+              <a:ext uri="{FF2B5EF4-FFF2-40B4-BE49-F238E27FC236}">
+                <a16:creationId xmlns:a16="http://schemas.microsoft.com/office/drawing/2014/main" id="{D5A23ACA-D820-7C48-B791-859297762815}"/>
+              </a:ext>
+            </a:extLst>
+          </p:cNvPr>
+          <p:cNvCxnSpPr>
+            <a:cxnSpLocks/>
+            <a:stCxn id="136" idx="2"/>
+            <a:endCxn id="126" idx="1"/>
+          </p:cNvCxnSpPr>
+          <p:nvPr/>
+        </p:nvCxnSpPr>
+        <p:spPr>
+          <a:xfrm rot="5400000">
+            <a:off x="6815803" y="4287563"/>
+            <a:ext cx="627141" cy="2001236"/>
+          </a:xfrm>
+          <a:prstGeom prst="bentConnector2">
+            <a:avLst/>
+          </a:prstGeom>
+          <a:ln>
+            <a:solidFill>
+              <a:srgbClr val="7030A0"/>
+            </a:solidFill>
+            <a:tailEnd type="triangle"/>
+          </a:ln>
+        </p:spPr>
+        <p:style>
+          <a:lnRef idx="1">
+            <a:schemeClr val="accent1"/>
+          </a:lnRef>
+          <a:fillRef idx="0">
+            <a:schemeClr val="accent1"/>
+          </a:fillRef>
+          <a:effectRef idx="0">
+            <a:schemeClr val="accent1"/>
+          </a:effectRef>
+          <a:fontRef idx="minor">
+            <a:schemeClr val="tx1"/>
+          </a:fontRef>
+        </p:style>
+      </p:cxnSp>
+      <p:sp>
+        <p:nvSpPr>
+          <p:cNvPr id="154" name="TextBox 153">
+            <a:extLst>
+              <a:ext uri="{FF2B5EF4-FFF2-40B4-BE49-F238E27FC236}">
+                <a16:creationId xmlns:a16="http://schemas.microsoft.com/office/drawing/2014/main" id="{5E608ECE-5A17-AA4D-AF61-7333DB6C0DD3}"/>
+              </a:ext>
+            </a:extLst>
+          </p:cNvPr>
+          <p:cNvSpPr txBox="1"/>
+          <p:nvPr/>
+        </p:nvSpPr>
+        <p:spPr>
+          <a:xfrm>
+            <a:off x="7203329" y="5634581"/>
+            <a:ext cx="970170" cy="276999"/>
+          </a:xfrm>
+          <a:prstGeom prst="rect">
+            <a:avLst/>
+          </a:prstGeom>
+          <a:noFill/>
+        </p:spPr>
+        <p:txBody>
+          <a:bodyPr wrap="square" rtlCol="0">
+            <a:spAutoFit/>
+          </a:bodyPr>
+          <a:lstStyle/>
+          <a:p>
+            <a:pPr algn="ctr"/>
+            <a:r>
+              <a:rPr lang="en-US" sz="1200" dirty="0"/>
+              <a:t>metrics</a:t>
+            </a:r>
+          </a:p>
+        </p:txBody>
+      </p:sp>
+    </p:spTree>
+    <p:extLst>
+      <p:ext uri="{BB962C8B-B14F-4D97-AF65-F5344CB8AC3E}">
+        <p14:creationId xmlns:p14="http://schemas.microsoft.com/office/powerpoint/2010/main" val="2992787076"/>
       </p:ext>
     </p:extLst>
   </p:cSld>

</xml_diff>

<commit_message>
fix IAM role perms for Cognito CodeBuild
</commit_message>
<xml_diff>
--- a/doc/diagram.pptx
+++ b/doc/diagram.pptx
@@ -260,7 +260,7 @@
           <a:p>
             <a:fld id="{2BECA929-49EE-B647-832F-567E3A3FDFBE}" type="datetimeFigureOut">
               <a:rPr lang="en-US" smtClean="0"/>
-              <a:t>3/27/19</a:t>
+              <a:t>4/9/19</a:t>
             </a:fld>
             <a:endParaRPr lang="en-US"/>
           </a:p>
@@ -458,7 +458,7 @@
           <a:p>
             <a:fld id="{2BECA929-49EE-B647-832F-567E3A3FDFBE}" type="datetimeFigureOut">
               <a:rPr lang="en-US" smtClean="0"/>
-              <a:t>3/27/19</a:t>
+              <a:t>4/9/19</a:t>
             </a:fld>
             <a:endParaRPr lang="en-US"/>
           </a:p>
@@ -666,7 +666,7 @@
           <a:p>
             <a:fld id="{2BECA929-49EE-B647-832F-567E3A3FDFBE}" type="datetimeFigureOut">
               <a:rPr lang="en-US" smtClean="0"/>
-              <a:t>3/27/19</a:t>
+              <a:t>4/9/19</a:t>
             </a:fld>
             <a:endParaRPr lang="en-US"/>
           </a:p>
@@ -864,7 +864,7 @@
           <a:p>
             <a:fld id="{2BECA929-49EE-B647-832F-567E3A3FDFBE}" type="datetimeFigureOut">
               <a:rPr lang="en-US" smtClean="0"/>
-              <a:t>3/27/19</a:t>
+              <a:t>4/9/19</a:t>
             </a:fld>
             <a:endParaRPr lang="en-US"/>
           </a:p>
@@ -1139,7 +1139,7 @@
           <a:p>
             <a:fld id="{2BECA929-49EE-B647-832F-567E3A3FDFBE}" type="datetimeFigureOut">
               <a:rPr lang="en-US" smtClean="0"/>
-              <a:t>3/27/19</a:t>
+              <a:t>4/9/19</a:t>
             </a:fld>
             <a:endParaRPr lang="en-US"/>
           </a:p>
@@ -1404,7 +1404,7 @@
           <a:p>
             <a:fld id="{2BECA929-49EE-B647-832F-567E3A3FDFBE}" type="datetimeFigureOut">
               <a:rPr lang="en-US" smtClean="0"/>
-              <a:t>3/27/19</a:t>
+              <a:t>4/9/19</a:t>
             </a:fld>
             <a:endParaRPr lang="en-US"/>
           </a:p>
@@ -1816,7 +1816,7 @@
           <a:p>
             <a:fld id="{2BECA929-49EE-B647-832F-567E3A3FDFBE}" type="datetimeFigureOut">
               <a:rPr lang="en-US" smtClean="0"/>
-              <a:t>3/27/19</a:t>
+              <a:t>4/9/19</a:t>
             </a:fld>
             <a:endParaRPr lang="en-US"/>
           </a:p>
@@ -1957,7 +1957,7 @@
           <a:p>
             <a:fld id="{2BECA929-49EE-B647-832F-567E3A3FDFBE}" type="datetimeFigureOut">
               <a:rPr lang="en-US" smtClean="0"/>
-              <a:t>3/27/19</a:t>
+              <a:t>4/9/19</a:t>
             </a:fld>
             <a:endParaRPr lang="en-US"/>
           </a:p>
@@ -2070,7 +2070,7 @@
           <a:p>
             <a:fld id="{2BECA929-49EE-B647-832F-567E3A3FDFBE}" type="datetimeFigureOut">
               <a:rPr lang="en-US" smtClean="0"/>
-              <a:t>3/27/19</a:t>
+              <a:t>4/9/19</a:t>
             </a:fld>
             <a:endParaRPr lang="en-US"/>
           </a:p>
@@ -2381,7 +2381,7 @@
           <a:p>
             <a:fld id="{2BECA929-49EE-B647-832F-567E3A3FDFBE}" type="datetimeFigureOut">
               <a:rPr lang="en-US" smtClean="0"/>
-              <a:t>3/27/19</a:t>
+              <a:t>4/9/19</a:t>
             </a:fld>
             <a:endParaRPr lang="en-US"/>
           </a:p>
@@ -2669,7 +2669,7 @@
           <a:p>
             <a:fld id="{2BECA929-49EE-B647-832F-567E3A3FDFBE}" type="datetimeFigureOut">
               <a:rPr lang="en-US" smtClean="0"/>
-              <a:t>3/27/19</a:t>
+              <a:t>4/9/19</a:t>
             </a:fld>
             <a:endParaRPr lang="en-US"/>
           </a:p>
@@ -2910,7 +2910,7 @@
           <a:p>
             <a:fld id="{2BECA929-49EE-B647-832F-567E3A3FDFBE}" type="datetimeFigureOut">
               <a:rPr lang="en-US" smtClean="0"/>
-              <a:t>3/27/19</a:t>
+              <a:t>4/9/19</a:t>
             </a:fld>
             <a:endParaRPr lang="en-US"/>
           </a:p>
@@ -4712,7 +4712,7 @@
                   <a:schemeClr val="tx1"/>
                 </a:solidFill>
               </a:rPr>
-              <a:t>Multilanguage Bot Stack</a:t>
+              <a:t>Multilanguage API Stack</a:t>
             </a:r>
           </a:p>
         </p:txBody>
@@ -4741,6 +4741,11 @@
           <a:prstGeom prst="line">
             <a:avLst/>
           </a:prstGeom>
+          <a:ln w="19050">
+            <a:solidFill>
+              <a:srgbClr val="7030A0"/>
+            </a:solidFill>
+          </a:ln>
         </p:spPr>
         <p:style>
           <a:lnRef idx="1">
@@ -4781,6 +4786,11 @@
           <a:prstGeom prst="line">
             <a:avLst/>
           </a:prstGeom>
+          <a:ln w="19050">
+            <a:solidFill>
+              <a:srgbClr val="7030A0"/>
+            </a:solidFill>
+          </a:ln>
         </p:spPr>
         <p:style>
           <a:lnRef idx="1">
@@ -4814,13 +4824,14 @@
           <p:nvPr/>
         </p:nvCxnSpPr>
         <p:spPr>
-          <a:xfrm flipH="1" flipV="1">
+          <a:xfrm flipV="1">
             <a:off x="4405100" y="3024136"/>
-            <a:ext cx="7995" cy="262422"/>
+            <a:ext cx="0" cy="348973"/>
           </a:xfrm>
           <a:prstGeom prst="line">
             <a:avLst/>
           </a:prstGeom>
+          <a:ln w="12700"/>
         </p:spPr>
         <p:style>
           <a:lnRef idx="1">
@@ -4861,6 +4872,13 @@
           <a:prstGeom prst="line">
             <a:avLst/>
           </a:prstGeom>
+          <a:ln w="19050">
+            <a:solidFill>
+              <a:srgbClr val="7030A0"/>
+            </a:solidFill>
+            <a:headEnd type="none" w="med" len="med"/>
+            <a:tailEnd type="triangle" w="med" len="med"/>
+          </a:ln>
         </p:spPr>
         <p:style>
           <a:lnRef idx="1">
@@ -4892,7 +4910,7 @@
         <p:spPr>
           <a:xfrm>
             <a:off x="3900748" y="812190"/>
-            <a:ext cx="1059089" cy="3288765"/>
+            <a:ext cx="1059089" cy="3475974"/>
           </a:xfrm>
           <a:prstGeom prst="rect">
             <a:avLst/>
@@ -4940,6 +4958,17 @@
               <a:t>Edge Stack</a:t>
             </a:r>
           </a:p>
+          <a:p>
+            <a:pPr algn="ctr"/>
+            <a:r>
+              <a:rPr lang="en-US" sz="800" dirty="0">
+                <a:solidFill>
+                  <a:schemeClr val="tx1"/>
+                </a:solidFill>
+              </a:rPr>
+              <a:t>(CDN, Website)</a:t>
+            </a:r>
+          </a:p>
         </p:txBody>
       </p:sp>
       <p:cxnSp>
@@ -4966,6 +4995,11 @@
           <a:prstGeom prst="bentConnector2">
             <a:avLst/>
           </a:prstGeom>
+          <a:ln w="9525">
+            <a:solidFill>
+              <a:srgbClr val="7030A0"/>
+            </a:solidFill>
+          </a:ln>
         </p:spPr>
         <p:style>
           <a:lnRef idx="1">
@@ -5045,6 +5079,17 @@
               <a:t>Identity Stack</a:t>
             </a:r>
           </a:p>
+          <a:p>
+            <a:pPr algn="ctr"/>
+            <a:r>
+              <a:rPr lang="en-US" sz="800" dirty="0">
+                <a:solidFill>
+                  <a:schemeClr val="tx1"/>
+                </a:solidFill>
+              </a:rPr>
+              <a:t>(Cognito)</a:t>
+            </a:r>
+          </a:p>
         </p:txBody>
       </p:sp>
       <p:cxnSp>
@@ -5073,6 +5118,11 @@
               <a:gd name="adj1" fmla="val 50000"/>
             </a:avLst>
           </a:prstGeom>
+          <a:ln w="19050">
+            <a:solidFill>
+              <a:srgbClr val="7030A0"/>
+            </a:solidFill>
+          </a:ln>
         </p:spPr>
         <p:style>
           <a:lnRef idx="1">
@@ -5115,6 +5165,11 @@
               <a:gd name="adj1" fmla="val 50000"/>
             </a:avLst>
           </a:prstGeom>
+          <a:ln w="19050">
+            <a:solidFill>
+              <a:srgbClr val="7030A0"/>
+            </a:solidFill>
+          </a:ln>
         </p:spPr>
         <p:style>
           <a:lnRef idx="1">
@@ -5145,8 +5200,8 @@
         </p:nvSpPr>
         <p:spPr>
           <a:xfrm>
-            <a:off x="3134932" y="4509698"/>
-            <a:ext cx="977062" cy="461665"/>
+            <a:off x="3520526" y="4902304"/>
+            <a:ext cx="748923" cy="384721"/>
           </a:xfrm>
           <a:prstGeom prst="rect">
             <a:avLst/>
@@ -5160,14 +5215,14 @@
           <a:lstStyle/>
           <a:p>
             <a:r>
-              <a:rPr lang="en-US" sz="1200" dirty="0"/>
-              <a:t>Source repo:</a:t>
-            </a:r>
-          </a:p>
-          <a:p>
-            <a:r>
-              <a:rPr lang="en-US" sz="1200" dirty="0"/>
-              <a:t>Github</a:t>
+              <a:rPr lang="en-US" sz="1000" dirty="0"/>
+              <a:t>Code Repo</a:t>
+            </a:r>
+          </a:p>
+          <a:p>
+            <a:r>
+              <a:rPr lang="en-US" sz="900" dirty="0"/>
+              <a:t>(Github)</a:t>
             </a:r>
           </a:p>
         </p:txBody>
@@ -5186,7 +5241,7 @@
         </p:nvSpPr>
         <p:spPr>
           <a:xfrm>
-            <a:off x="6480475" y="683899"/>
+            <a:off x="6737764" y="48414"/>
             <a:ext cx="276693" cy="293560"/>
           </a:xfrm>
           <a:prstGeom prst="ellipse">
@@ -5247,7 +5302,7 @@
         </p:nvSpPr>
         <p:spPr>
           <a:xfrm>
-            <a:off x="8173499" y="1921363"/>
+            <a:off x="7531027" y="84090"/>
             <a:ext cx="276693" cy="293560"/>
           </a:xfrm>
           <a:prstGeom prst="ellipse">
@@ -5296,10 +5351,10 @@
       </p:sp>
       <p:sp>
         <p:nvSpPr>
-          <p:cNvPr id="31" name="Oval 30">
-            <a:extLst>
-              <a:ext uri="{FF2B5EF4-FFF2-40B4-BE49-F238E27FC236}">
-                <a16:creationId xmlns:a16="http://schemas.microsoft.com/office/drawing/2014/main" id="{04A0F5D1-F0DD-1541-B18B-789A6CD06419}"/>
+          <p:cNvPr id="34" name="Rectangle 33">
+            <a:extLst>
+              <a:ext uri="{FF2B5EF4-FFF2-40B4-BE49-F238E27FC236}">
+                <a16:creationId xmlns:a16="http://schemas.microsoft.com/office/drawing/2014/main" id="{A285D32F-E7A1-9E45-8BC1-6B7557EFAC75}"/>
               </a:ext>
             </a:extLst>
           </p:cNvPr>
@@ -5308,19 +5363,18 @@
         </p:nvSpPr>
         <p:spPr>
           <a:xfrm>
-            <a:off x="4803795" y="683899"/>
-            <a:ext cx="276693" cy="293560"/>
-          </a:xfrm>
-          <a:prstGeom prst="ellipse">
-            <a:avLst/>
-          </a:prstGeom>
-          <a:solidFill>
-            <a:srgbClr val="FFFF00"/>
-          </a:solidFill>
-          <a:ln>
+            <a:off x="5185994" y="4144503"/>
+            <a:ext cx="1680964" cy="1046495"/>
+          </a:xfrm>
+          <a:prstGeom prst="rect">
+            <a:avLst/>
+          </a:prstGeom>
+          <a:noFill/>
+          <a:ln w="12700">
             <a:solidFill>
-              <a:schemeClr val="tx1"/>
+              <a:srgbClr val="879196"/>
             </a:solidFill>
+            <a:prstDash val="dash"/>
           </a:ln>
         </p:spPr>
         <p:style>
@@ -5340,66 +5394,6 @@
           </a:fontRef>
         </p:style>
         <p:txBody>
-          <a:bodyPr rtlCol="0" anchor="ctr"/>
-          <a:lstStyle/>
-          <a:p>
-            <a:pPr algn="ctr"/>
-            <a:r>
-              <a:rPr lang="en-US" sz="1200" dirty="0">
-                <a:solidFill>
-                  <a:schemeClr val="tx1"/>
-                </a:solidFill>
-              </a:rPr>
-              <a:t>3</a:t>
-            </a:r>
-          </a:p>
-        </p:txBody>
-      </p:sp>
-      <p:sp>
-        <p:nvSpPr>
-          <p:cNvPr id="34" name="Rectangle 33">
-            <a:extLst>
-              <a:ext uri="{FF2B5EF4-FFF2-40B4-BE49-F238E27FC236}">
-                <a16:creationId xmlns:a16="http://schemas.microsoft.com/office/drawing/2014/main" id="{A285D32F-E7A1-9E45-8BC1-6B7557EFAC75}"/>
-              </a:ext>
-            </a:extLst>
-          </p:cNvPr>
-          <p:cNvSpPr/>
-          <p:nvPr/>
-        </p:nvSpPr>
-        <p:spPr>
-          <a:xfrm>
-            <a:off x="5185993" y="4216634"/>
-            <a:ext cx="2194890" cy="901015"/>
-          </a:xfrm>
-          <a:prstGeom prst="rect">
-            <a:avLst/>
-          </a:prstGeom>
-          <a:noFill/>
-          <a:ln w="12700">
-            <a:solidFill>
-              <a:srgbClr val="879196"/>
-            </a:solidFill>
-            <a:prstDash val="dash"/>
-          </a:ln>
-        </p:spPr>
-        <p:style>
-          <a:lnRef idx="2">
-            <a:schemeClr val="accent1">
-              <a:shade val="50000"/>
-            </a:schemeClr>
-          </a:lnRef>
-          <a:fillRef idx="1">
-            <a:schemeClr val="accent1"/>
-          </a:fillRef>
-          <a:effectRef idx="0">
-            <a:schemeClr val="accent1"/>
-          </a:effectRef>
-          <a:fontRef idx="minor">
-            <a:schemeClr val="lt1"/>
-          </a:fontRef>
-        </p:style>
-        <p:txBody>
           <a:bodyPr rot="0" spcFirstLastPara="0" vertOverflow="overflow" horzOverflow="overflow" vert="horz" wrap="square" lIns="91440" tIns="45720" rIns="91440" bIns="45720" numCol="1" spcCol="0" rtlCol="0" fromWordArt="0" anchor="t" anchorCtr="0" forceAA="0" compatLnSpc="1">
             <a:prstTxWarp prst="textNoShape">
               <a:avLst/>
@@ -5445,8 +5439,8 @@
         </p:nvSpPr>
         <p:spPr>
           <a:xfrm>
-            <a:off x="9414929" y="2444330"/>
-            <a:ext cx="1372887" cy="461665"/>
+            <a:off x="8554499" y="3011657"/>
+            <a:ext cx="975980" cy="384721"/>
           </a:xfrm>
           <a:prstGeom prst="rect">
             <a:avLst/>
@@ -5461,15 +5455,15 @@
           <a:p>
             <a:pPr algn="ctr"/>
             <a:r>
-              <a:rPr lang="en-US" sz="1200" dirty="0"/>
-              <a:t>Order Flowers Bot:</a:t>
+              <a:rPr lang="en-US" sz="1000" dirty="0"/>
+              <a:t>Bot</a:t>
             </a:r>
           </a:p>
           <a:p>
             <a:pPr algn="ctr"/>
             <a:r>
-              <a:rPr lang="en-US" sz="1200" dirty="0"/>
-              <a:t> Amazon Lex</a:t>
+              <a:rPr lang="en-US" sz="900" dirty="0"/>
+              <a:t> (Amazon Lex)</a:t>
             </a:r>
           </a:p>
         </p:txBody>
@@ -5524,8 +5518,8 @@
         </p:nvSpPr>
         <p:spPr>
           <a:xfrm>
-            <a:off x="7867604" y="1189606"/>
-            <a:ext cx="1547325" cy="461665"/>
+            <a:off x="6757364" y="774126"/>
+            <a:ext cx="1547325" cy="369332"/>
           </a:xfrm>
           <a:prstGeom prst="rect">
             <a:avLst/>
@@ -5540,15 +5534,15 @@
           <a:p>
             <a:pPr algn="ctr"/>
             <a:r>
-              <a:rPr lang="en-US" sz="1200" dirty="0"/>
-              <a:t>Side-Processor: </a:t>
+              <a:rPr lang="en-US" sz="1000" dirty="0"/>
+              <a:t>Side-Processor</a:t>
             </a:r>
           </a:p>
           <a:p>
             <a:pPr algn="ctr"/>
             <a:r>
-              <a:rPr lang="en-US" sz="1200" dirty="0"/>
-              <a:t>Amazon Translate</a:t>
+              <a:rPr lang="en-US" sz="800" dirty="0"/>
+              <a:t>(Amazon Translate)</a:t>
             </a:r>
           </a:p>
         </p:txBody>
@@ -5591,10 +5585,10 @@
       </p:pic>
       <p:pic>
         <p:nvPicPr>
-          <p:cNvPr id="41" name="Graphic 40">
-            <a:extLst>
-              <a:ext uri="{FF2B5EF4-FFF2-40B4-BE49-F238E27FC236}">
-                <a16:creationId xmlns:a16="http://schemas.microsoft.com/office/drawing/2014/main" id="{185AE6FB-7B95-5041-BE83-C83D983919BC}"/>
+          <p:cNvPr id="8" name="Picture 7">
+            <a:extLst>
+              <a:ext uri="{FF2B5EF4-FFF2-40B4-BE49-F238E27FC236}">
+                <a16:creationId xmlns:a16="http://schemas.microsoft.com/office/drawing/2014/main" id="{93CFE4D0-9800-334C-ADE0-BD8B715122BC}"/>
               </a:ext>
             </a:extLst>
           </p:cNvPr>
@@ -5604,87 +5598,15 @@
           <p:nvPr/>
         </p:nvPicPr>
         <p:blipFill>
-          <a:blip r:embed="rId6">
-            <a:extLst>
-              <a:ext uri="{96DAC541-7B7A-43D3-8B79-37D633B846F1}">
-                <asvg:svgBlip xmlns:asvg="http://schemas.microsoft.com/office/drawing/2016/SVG/main" r:embed="rId7"/>
-              </a:ext>
-            </a:extLst>
-          </a:blip>
+          <a:blip r:embed="rId6"/>
           <a:stretch>
             <a:fillRect/>
           </a:stretch>
         </p:blipFill>
         <p:spPr>
           <a:xfrm>
-            <a:off x="5550794" y="4317310"/>
-            <a:ext cx="712979" cy="712979"/>
-          </a:xfrm>
-          <a:prstGeom prst="rect">
-            <a:avLst/>
-          </a:prstGeom>
-        </p:spPr>
-      </p:pic>
-      <p:sp>
-        <p:nvSpPr>
-          <p:cNvPr id="42" name="TextBox 41">
-            <a:extLst>
-              <a:ext uri="{FF2B5EF4-FFF2-40B4-BE49-F238E27FC236}">
-                <a16:creationId xmlns:a16="http://schemas.microsoft.com/office/drawing/2014/main" id="{83C78666-88C5-CB4E-A0AF-3C8E87B9AA56}"/>
-              </a:ext>
-            </a:extLst>
-          </p:cNvPr>
-          <p:cNvSpPr txBox="1"/>
-          <p:nvPr/>
-        </p:nvSpPr>
-        <p:spPr>
-          <a:xfrm>
-            <a:off x="6128755" y="4792765"/>
-            <a:ext cx="1372887" cy="276999"/>
-          </a:xfrm>
-          <a:prstGeom prst="rect">
-            <a:avLst/>
-          </a:prstGeom>
-          <a:noFill/>
-        </p:spPr>
-        <p:txBody>
-          <a:bodyPr wrap="square" rtlCol="0">
-            <a:spAutoFit/>
-          </a:bodyPr>
-          <a:lstStyle/>
-          <a:p>
-            <a:pPr algn="ctr"/>
-            <a:r>
-              <a:rPr lang="en-US" sz="1200" dirty="0"/>
-              <a:t>CodePipeline</a:t>
-            </a:r>
-          </a:p>
-        </p:txBody>
-      </p:sp>
-      <p:pic>
-        <p:nvPicPr>
-          <p:cNvPr id="8" name="Picture 7">
-            <a:extLst>
-              <a:ext uri="{FF2B5EF4-FFF2-40B4-BE49-F238E27FC236}">
-                <a16:creationId xmlns:a16="http://schemas.microsoft.com/office/drawing/2014/main" id="{93CFE4D0-9800-334C-ADE0-BD8B715122BC}"/>
-              </a:ext>
-            </a:extLst>
-          </p:cNvPr>
-          <p:cNvPicPr>
-            <a:picLocks noChangeAspect="1"/>
-          </p:cNvPicPr>
-          <p:nvPr/>
-        </p:nvPicPr>
-        <p:blipFill>
-          <a:blip r:embed="rId8"/>
-          <a:stretch>
-            <a:fillRect/>
-          </a:stretch>
-        </p:blipFill>
-        <p:spPr>
-          <a:xfrm>
-            <a:off x="4049125" y="4250358"/>
-            <a:ext cx="833565" cy="833565"/>
+            <a:off x="4224607" y="4760347"/>
+            <a:ext cx="698447" cy="698447"/>
           </a:xfrm>
           <a:prstGeom prst="rect">
             <a:avLst/>
@@ -5693,73 +5615,31 @@
       </p:pic>
       <p:cxnSp>
         <p:nvCxnSpPr>
-          <p:cNvPr id="44" name="Elbow Connector 43">
-            <a:extLst>
-              <a:ext uri="{FF2B5EF4-FFF2-40B4-BE49-F238E27FC236}">
-                <a16:creationId xmlns:a16="http://schemas.microsoft.com/office/drawing/2014/main" id="{92FFCEB7-9510-5145-97F6-09FBD780021F}"/>
+          <p:cNvPr id="51" name="Elbow Connector 50">
+            <a:extLst>
+              <a:ext uri="{FF2B5EF4-FFF2-40B4-BE49-F238E27FC236}">
+                <a16:creationId xmlns:a16="http://schemas.microsoft.com/office/drawing/2014/main" id="{5600E802-A826-3D4C-B181-CAF77B25EA8F}"/>
               </a:ext>
             </a:extLst>
           </p:cNvPr>
           <p:cNvCxnSpPr>
             <a:cxnSpLocks/>
-            <a:stCxn id="66" idx="3"/>
-            <a:endCxn id="85" idx="1"/>
-          </p:cNvCxnSpPr>
-          <p:nvPr/>
-        </p:nvCxnSpPr>
-        <p:spPr>
-          <a:xfrm>
-            <a:off x="4760700" y="2668536"/>
-            <a:ext cx="800300" cy="6627"/>
-          </a:xfrm>
-          <a:prstGeom prst="bentConnector3">
-            <a:avLst>
-              <a:gd name="adj1" fmla="val 50000"/>
-            </a:avLst>
-          </a:prstGeom>
-        </p:spPr>
-        <p:style>
-          <a:lnRef idx="1">
-            <a:schemeClr val="accent1"/>
-          </a:lnRef>
-          <a:fillRef idx="0">
-            <a:schemeClr val="accent1"/>
-          </a:fillRef>
-          <a:effectRef idx="0">
-            <a:schemeClr val="accent1"/>
-          </a:effectRef>
-          <a:fontRef idx="minor">
-            <a:schemeClr val="tx1"/>
-          </a:fontRef>
-        </p:style>
-      </p:cxnSp>
-      <p:cxnSp>
-        <p:nvCxnSpPr>
-          <p:cNvPr id="51" name="Elbow Connector 50">
-            <a:extLst>
-              <a:ext uri="{FF2B5EF4-FFF2-40B4-BE49-F238E27FC236}">
-                <a16:creationId xmlns:a16="http://schemas.microsoft.com/office/drawing/2014/main" id="{5600E802-A826-3D4C-B181-CAF77B25EA8F}"/>
-              </a:ext>
-            </a:extLst>
-          </p:cNvPr>
-          <p:cNvCxnSpPr>
-            <a:cxnSpLocks/>
-            <a:stCxn id="41" idx="0"/>
+            <a:stCxn id="5" idx="0"/>
             <a:endCxn id="65" idx="3"/>
           </p:cNvCxnSpPr>
           <p:nvPr/>
         </p:nvCxnSpPr>
         <p:spPr>
           <a:xfrm rot="16200000" flipV="1">
-            <a:off x="4992419" y="3402445"/>
-            <a:ext cx="683147" cy="1146584"/>
+            <a:off x="4925559" y="3547861"/>
+            <a:ext cx="588825" cy="934531"/>
           </a:xfrm>
           <a:prstGeom prst="bentConnector2">
             <a:avLst/>
           </a:prstGeom>
-          <a:ln>
+          <a:ln w="9525">
             <a:solidFill>
-              <a:srgbClr val="7030A0"/>
+              <a:schemeClr val="accent1"/>
             </a:solidFill>
             <a:tailEnd type="triangle"/>
           </a:ln>
@@ -5790,22 +5670,23 @@
           </p:cNvPr>
           <p:cNvCxnSpPr>
             <a:cxnSpLocks/>
-            <a:stCxn id="41" idx="3"/>
-            <a:endCxn id="16" idx="2"/>
+            <a:stCxn id="53" idx="0"/>
           </p:cNvCxnSpPr>
           <p:nvPr/>
         </p:nvCxnSpPr>
         <p:spPr>
-          <a:xfrm flipV="1">
-            <a:off x="6263773" y="3248530"/>
-            <a:ext cx="493395" cy="1425270"/>
-          </a:xfrm>
-          <a:prstGeom prst="bentConnector2">
-            <a:avLst/>
-          </a:prstGeom>
-          <a:ln>
+          <a:xfrm rot="5400000" flipH="1" flipV="1">
+            <a:off x="5394706" y="3788019"/>
+            <a:ext cx="1043040" cy="1"/>
+          </a:xfrm>
+          <a:prstGeom prst="bentConnector3">
+            <a:avLst>
+              <a:gd name="adj1" fmla="val 50000"/>
+            </a:avLst>
+          </a:prstGeom>
+          <a:ln w="9525">
             <a:solidFill>
-              <a:srgbClr val="7030A0"/>
+              <a:schemeClr val="accent1"/>
             </a:solidFill>
             <a:tailEnd type="triangle"/>
           </a:ln>
@@ -5836,24 +5717,22 @@
           </p:cNvPr>
           <p:cNvCxnSpPr>
             <a:cxnSpLocks/>
-            <a:stCxn id="8" idx="3"/>
-            <a:endCxn id="41" idx="1"/>
+            <a:stCxn id="8" idx="0"/>
+            <a:endCxn id="34" idx="1"/>
           </p:cNvCxnSpPr>
           <p:nvPr/>
         </p:nvCxnSpPr>
         <p:spPr>
-          <a:xfrm>
-            <a:off x="4882690" y="4667141"/>
-            <a:ext cx="668104" cy="6659"/>
-          </a:xfrm>
-          <a:prstGeom prst="bentConnector3">
-            <a:avLst>
-              <a:gd name="adj1" fmla="val 50000"/>
-            </a:avLst>
-          </a:prstGeom>
-          <a:ln>
+          <a:xfrm rot="5400000" flipH="1" flipV="1">
+            <a:off x="4833614" y="4407968"/>
+            <a:ext cx="92596" cy="612163"/>
+          </a:xfrm>
+          <a:prstGeom prst="bentConnector2">
+            <a:avLst/>
+          </a:prstGeom>
+          <a:ln w="9525">
             <a:solidFill>
-              <a:srgbClr val="7030A0"/>
+              <a:schemeClr val="accent1"/>
             </a:solidFill>
             <a:tailEnd type="triangle"/>
           </a:ln>
@@ -5888,10 +5767,10 @@
           <p:nvPr/>
         </p:nvPicPr>
         <p:blipFill>
-          <a:blip r:embed="rId9">
+          <a:blip r:embed="rId7">
             <a:extLst>
               <a:ext uri="{96DAC541-7B7A-43D3-8B79-37D633B846F1}">
-                <asvg:svgBlip xmlns:asvg="http://schemas.microsoft.com/office/drawing/2016/SVG/main" r:embed="rId10"/>
+                <asvg:svgBlip xmlns:asvg="http://schemas.microsoft.com/office/drawing/2016/SVG/main" r:embed="rId8"/>
               </a:ext>
             </a:extLst>
           </a:blip>
@@ -5901,7 +5780,7 @@
         </p:blipFill>
         <p:spPr>
           <a:xfrm>
-            <a:off x="4065490" y="3286558"/>
+            <a:off x="4057495" y="3373109"/>
             <a:ext cx="695210" cy="695210"/>
           </a:xfrm>
           <a:prstGeom prst="rect">
@@ -5911,10 +5790,10 @@
       </p:pic>
       <p:pic>
         <p:nvPicPr>
-          <p:cNvPr id="66" name="Graphic 65">
-            <a:extLst>
-              <a:ext uri="{FF2B5EF4-FFF2-40B4-BE49-F238E27FC236}">
-                <a16:creationId xmlns:a16="http://schemas.microsoft.com/office/drawing/2014/main" id="{63B5BE2E-EE8F-4C4B-8E37-52508DA45F01}"/>
+          <p:cNvPr id="76" name="Graphic 75">
+            <a:extLst>
+              <a:ext uri="{FF2B5EF4-FFF2-40B4-BE49-F238E27FC236}">
+                <a16:creationId xmlns:a16="http://schemas.microsoft.com/office/drawing/2014/main" id="{33622E83-3954-204B-A0E6-276D981E1428}"/>
               </a:ext>
             </a:extLst>
           </p:cNvPr>
@@ -5924,10 +5803,10 @@
           <p:nvPr/>
         </p:nvPicPr>
         <p:blipFill>
-          <a:blip r:embed="rId11">
+          <a:blip r:embed="rId9">
             <a:extLst>
               <a:ext uri="{96DAC541-7B7A-43D3-8B79-37D633B846F1}">
-                <asvg:svgBlip xmlns:asvg="http://schemas.microsoft.com/office/drawing/2016/SVG/main" r:embed="rId12"/>
+                <asvg:svgBlip xmlns:asvg="http://schemas.microsoft.com/office/drawing/2016/SVG/main" r:embed="rId10"/>
               </a:ext>
             </a:extLst>
           </a:blip>
@@ -5937,7 +5816,7 @@
         </p:blipFill>
         <p:spPr>
           <a:xfrm>
-            <a:off x="4049500" y="2312936"/>
+            <a:off x="4059616" y="1230642"/>
             <a:ext cx="711200" cy="711200"/>
           </a:xfrm>
           <a:prstGeom prst="rect">
@@ -5947,10 +5826,10 @@
       </p:pic>
       <p:pic>
         <p:nvPicPr>
-          <p:cNvPr id="76" name="Graphic 75">
-            <a:extLst>
-              <a:ext uri="{FF2B5EF4-FFF2-40B4-BE49-F238E27FC236}">
-                <a16:creationId xmlns:a16="http://schemas.microsoft.com/office/drawing/2014/main" id="{33622E83-3954-204B-A0E6-276D981E1428}"/>
+          <p:cNvPr id="78" name="Graphic 77">
+            <a:extLst>
+              <a:ext uri="{FF2B5EF4-FFF2-40B4-BE49-F238E27FC236}">
+                <a16:creationId xmlns:a16="http://schemas.microsoft.com/office/drawing/2014/main" id="{6606E9C3-91AB-2340-BAD3-350A4BE01804}"/>
               </a:ext>
             </a:extLst>
           </p:cNvPr>
@@ -5960,10 +5839,10 @@
           <p:nvPr/>
         </p:nvPicPr>
         <p:blipFill>
-          <a:blip r:embed="rId13">
+          <a:blip r:embed="rId11">
             <a:extLst>
               <a:ext uri="{96DAC541-7B7A-43D3-8B79-37D633B846F1}">
-                <asvg:svgBlip xmlns:asvg="http://schemas.microsoft.com/office/drawing/2016/SVG/main" r:embed="rId14"/>
+                <asvg:svgBlip xmlns:asvg="http://schemas.microsoft.com/office/drawing/2016/SVG/main" r:embed="rId12"/>
               </a:ext>
             </a:extLst>
           </a:blip>
@@ -5973,7 +5852,7 @@
         </p:blipFill>
         <p:spPr>
           <a:xfrm>
-            <a:off x="4059616" y="1230642"/>
+            <a:off x="5558527" y="1166966"/>
             <a:ext cx="711200" cy="711200"/>
           </a:xfrm>
           <a:prstGeom prst="rect">
@@ -5983,10 +5862,10 @@
       </p:pic>
       <p:pic>
         <p:nvPicPr>
-          <p:cNvPr id="78" name="Graphic 77">
-            <a:extLst>
-              <a:ext uri="{FF2B5EF4-FFF2-40B4-BE49-F238E27FC236}">
-                <a16:creationId xmlns:a16="http://schemas.microsoft.com/office/drawing/2014/main" id="{6606E9C3-91AB-2340-BAD3-350A4BE01804}"/>
+          <p:cNvPr id="84" name="Graphic 83">
+            <a:extLst>
+              <a:ext uri="{FF2B5EF4-FFF2-40B4-BE49-F238E27FC236}">
+                <a16:creationId xmlns:a16="http://schemas.microsoft.com/office/drawing/2014/main" id="{C5F73DB6-5F7C-3F44-881D-2FB522345563}"/>
               </a:ext>
             </a:extLst>
           </p:cNvPr>
@@ -5996,10 +5875,10 @@
           <p:nvPr/>
         </p:nvPicPr>
         <p:blipFill>
-          <a:blip r:embed="rId15">
+          <a:blip r:embed="rId13">
             <a:extLst>
               <a:ext uri="{96DAC541-7B7A-43D3-8B79-37D633B846F1}">
-                <asvg:svgBlip xmlns:asvg="http://schemas.microsoft.com/office/drawing/2016/SVG/main" r:embed="rId16"/>
+                <asvg:svgBlip xmlns:asvg="http://schemas.microsoft.com/office/drawing/2016/SVG/main" r:embed="rId14"/>
               </a:ext>
             </a:extLst>
           </a:blip>
@@ -6009,7 +5888,7 @@
         </p:blipFill>
         <p:spPr>
           <a:xfrm>
-            <a:off x="5558527" y="1166966"/>
+            <a:off x="7203329" y="2310981"/>
             <a:ext cx="711200" cy="711200"/>
           </a:xfrm>
           <a:prstGeom prst="rect">
@@ -6019,10 +5898,10 @@
       </p:pic>
       <p:pic>
         <p:nvPicPr>
-          <p:cNvPr id="84" name="Graphic 83">
-            <a:extLst>
-              <a:ext uri="{FF2B5EF4-FFF2-40B4-BE49-F238E27FC236}">
-                <a16:creationId xmlns:a16="http://schemas.microsoft.com/office/drawing/2014/main" id="{C5F73DB6-5F7C-3F44-881D-2FB522345563}"/>
+          <p:cNvPr id="85" name="Graphic 84">
+            <a:extLst>
+              <a:ext uri="{FF2B5EF4-FFF2-40B4-BE49-F238E27FC236}">
+                <a16:creationId xmlns:a16="http://schemas.microsoft.com/office/drawing/2014/main" id="{4F9845CA-975F-2045-B437-2283F9D9C337}"/>
               </a:ext>
             </a:extLst>
           </p:cNvPr>
@@ -6032,10 +5911,10 @@
           <p:nvPr/>
         </p:nvPicPr>
         <p:blipFill>
-          <a:blip r:embed="rId17">
+          <a:blip r:embed="rId15">
             <a:extLst>
               <a:ext uri="{96DAC541-7B7A-43D3-8B79-37D633B846F1}">
-                <asvg:svgBlip xmlns:asvg="http://schemas.microsoft.com/office/drawing/2016/SVG/main" r:embed="rId18"/>
+                <asvg:svgBlip xmlns:asvg="http://schemas.microsoft.com/office/drawing/2016/SVG/main" r:embed="rId16"/>
               </a:ext>
             </a:extLst>
           </a:blip>
@@ -6045,7 +5924,7 @@
         </p:blipFill>
         <p:spPr>
           <a:xfrm>
-            <a:off x="7203329" y="2310981"/>
+            <a:off x="5561000" y="2319563"/>
             <a:ext cx="711200" cy="711200"/>
           </a:xfrm>
           <a:prstGeom prst="rect">
@@ -6053,12 +5932,91 @@
           </a:prstGeom>
         </p:spPr>
       </p:pic>
+      <p:sp>
+        <p:nvSpPr>
+          <p:cNvPr id="108" name="TextBox 107">
+            <a:extLst>
+              <a:ext uri="{FF2B5EF4-FFF2-40B4-BE49-F238E27FC236}">
+                <a16:creationId xmlns:a16="http://schemas.microsoft.com/office/drawing/2014/main" id="{AF687F40-9C12-6049-86AC-6ECFCB84D7A9}"/>
+              </a:ext>
+            </a:extLst>
+          </p:cNvPr>
+          <p:cNvSpPr txBox="1"/>
+          <p:nvPr/>
+        </p:nvSpPr>
+        <p:spPr>
+          <a:xfrm>
+            <a:off x="5129811" y="3769651"/>
+            <a:ext cx="594719" cy="230832"/>
+          </a:xfrm>
+          <a:prstGeom prst="rect">
+            <a:avLst/>
+          </a:prstGeom>
+          <a:noFill/>
+        </p:spPr>
+        <p:txBody>
+          <a:bodyPr wrap="square" rtlCol="0">
+            <a:spAutoFit/>
+          </a:bodyPr>
+          <a:lstStyle/>
+          <a:p>
+            <a:pPr algn="ctr"/>
+            <a:r>
+              <a:rPr lang="en-US" sz="900" i="1" dirty="0"/>
+              <a:t>Deploy</a:t>
+            </a:r>
+          </a:p>
+        </p:txBody>
+      </p:sp>
+      <p:sp>
+        <p:nvSpPr>
+          <p:cNvPr id="109" name="TextBox 108">
+            <a:extLst>
+              <a:ext uri="{FF2B5EF4-FFF2-40B4-BE49-F238E27FC236}">
+                <a16:creationId xmlns:a16="http://schemas.microsoft.com/office/drawing/2014/main" id="{1C228791-AD71-9742-BFE1-C9D639D28DFD}"/>
+              </a:ext>
+            </a:extLst>
+          </p:cNvPr>
+          <p:cNvSpPr txBox="1"/>
+          <p:nvPr/>
+        </p:nvSpPr>
+        <p:spPr>
+          <a:xfrm>
+            <a:off x="2694605" y="2887409"/>
+            <a:ext cx="787395" cy="400110"/>
+          </a:xfrm>
+          <a:prstGeom prst="rect">
+            <a:avLst/>
+          </a:prstGeom>
+          <a:noFill/>
+        </p:spPr>
+        <p:txBody>
+          <a:bodyPr wrap="none" rtlCol="0">
+            <a:spAutoFit/>
+          </a:bodyPr>
+          <a:lstStyle/>
+          <a:p>
+            <a:pPr algn="ctr"/>
+            <a:r>
+              <a:rPr lang="en-US" sz="1000" dirty="0"/>
+              <a:t>Worldwide </a:t>
+            </a:r>
+          </a:p>
+          <a:p>
+            <a:pPr algn="ctr"/>
+            <a:r>
+              <a:rPr lang="en-US" sz="1000" dirty="0"/>
+              <a:t>Users</a:t>
+            </a:r>
+          </a:p>
+        </p:txBody>
+      </p:sp>
       <p:pic>
         <p:nvPicPr>
-          <p:cNvPr id="85" name="Graphic 84">
-            <a:extLst>
-              <a:ext uri="{FF2B5EF4-FFF2-40B4-BE49-F238E27FC236}">
-                <a16:creationId xmlns:a16="http://schemas.microsoft.com/office/drawing/2014/main" id="{4F9845CA-975F-2045-B437-2283F9D9C337}"/>
+          <p:cNvPr id="126" name="Graphic 125">
+            <a:extLst>
+              <a:ext uri="{FF2B5EF4-FFF2-40B4-BE49-F238E27FC236}">
+                <a16:creationId xmlns:a16="http://schemas.microsoft.com/office/drawing/2014/main" id="{F0F4E78F-9B5C-044D-8F8B-24233E51007D}"/>
               </a:ext>
             </a:extLst>
           </p:cNvPr>
@@ -6068,10 +6026,10 @@
           <p:nvPr/>
         </p:nvPicPr>
         <p:blipFill>
-          <a:blip r:embed="rId19">
+          <a:blip r:embed="rId17">
             <a:extLst>
               <a:ext uri="{96DAC541-7B7A-43D3-8B79-37D633B846F1}">
-                <asvg:svgBlip xmlns:asvg="http://schemas.microsoft.com/office/drawing/2016/SVG/main" r:embed="rId20"/>
+                <asvg:svgBlip xmlns:asvg="http://schemas.microsoft.com/office/drawing/2016/SVG/main" r:embed="rId18"/>
               </a:ext>
             </a:extLst>
           </a:blip>
@@ -6080,9 +6038,9 @@
           </a:stretch>
         </p:blipFill>
         <p:spPr>
-          <a:xfrm>
-            <a:off x="5561000" y="2319563"/>
-            <a:ext cx="711200" cy="711200"/>
+          <a:xfrm flipH="1">
+            <a:off x="5743044" y="5371141"/>
+            <a:ext cx="483586" cy="469900"/>
           </a:xfrm>
           <a:prstGeom prst="rect">
             <a:avLst/>
@@ -6091,71 +6049,10 @@
       </p:pic>
       <p:sp>
         <p:nvSpPr>
-          <p:cNvPr id="100" name="Oval 99">
-            <a:extLst>
-              <a:ext uri="{FF2B5EF4-FFF2-40B4-BE49-F238E27FC236}">
-                <a16:creationId xmlns:a16="http://schemas.microsoft.com/office/drawing/2014/main" id="{CD0923B5-2719-8344-98FD-746F08FD1383}"/>
-              </a:ext>
-            </a:extLst>
-          </p:cNvPr>
-          <p:cNvSpPr/>
-          <p:nvPr/>
-        </p:nvSpPr>
-        <p:spPr>
-          <a:xfrm>
-            <a:off x="7248608" y="3997923"/>
-            <a:ext cx="276693" cy="293560"/>
-          </a:xfrm>
-          <a:prstGeom prst="ellipse">
-            <a:avLst/>
-          </a:prstGeom>
-          <a:solidFill>
-            <a:srgbClr val="FFFF00"/>
-          </a:solidFill>
-          <a:ln>
-            <a:solidFill>
-              <a:schemeClr val="tx1"/>
-            </a:solidFill>
-          </a:ln>
-        </p:spPr>
-        <p:style>
-          <a:lnRef idx="2">
-            <a:schemeClr val="accent1">
-              <a:shade val="50000"/>
-            </a:schemeClr>
-          </a:lnRef>
-          <a:fillRef idx="1">
-            <a:schemeClr val="accent1"/>
-          </a:fillRef>
-          <a:effectRef idx="0">
-            <a:schemeClr val="accent1"/>
-          </a:effectRef>
-          <a:fontRef idx="minor">
-            <a:schemeClr val="lt1"/>
-          </a:fontRef>
-        </p:style>
-        <p:txBody>
-          <a:bodyPr rtlCol="0" anchor="ctr"/>
-          <a:lstStyle/>
-          <a:p>
-            <a:pPr algn="ctr"/>
-            <a:r>
-              <a:rPr lang="en-US" sz="1200" dirty="0">
-                <a:solidFill>
-                  <a:schemeClr val="tx1"/>
-                </a:solidFill>
-              </a:rPr>
-              <a:t>4</a:t>
-            </a:r>
-          </a:p>
-        </p:txBody>
-      </p:sp>
-      <p:sp>
-        <p:nvSpPr>
-          <p:cNvPr id="107" name="TextBox 106">
-            <a:extLst>
-              <a:ext uri="{FF2B5EF4-FFF2-40B4-BE49-F238E27FC236}">
-                <a16:creationId xmlns:a16="http://schemas.microsoft.com/office/drawing/2014/main" id="{09AB3470-69DB-2741-BFAF-6D61F0396607}"/>
+          <p:cNvPr id="127" name="TextBox 126">
+            <a:extLst>
+              <a:ext uri="{FF2B5EF4-FFF2-40B4-BE49-F238E27FC236}">
+                <a16:creationId xmlns:a16="http://schemas.microsoft.com/office/drawing/2014/main" id="{DAC9E563-A2EC-B240-A022-A40592CC32C3}"/>
               </a:ext>
             </a:extLst>
           </p:cNvPr>
@@ -6164,8 +6061,8 @@
         </p:nvSpPr>
         <p:spPr>
           <a:xfrm>
-            <a:off x="5053513" y="3670068"/>
-            <a:ext cx="860430" cy="430887"/>
+            <a:off x="5558527" y="5811088"/>
+            <a:ext cx="916062" cy="246221"/>
           </a:xfrm>
           <a:prstGeom prst="rect">
             <a:avLst/>
@@ -6180,95 +6077,18 @@
           <a:p>
             <a:pPr algn="ctr"/>
             <a:r>
-              <a:rPr lang="en-US" sz="1100" dirty="0"/>
-              <a:t>Deploy website</a:t>
-            </a:r>
-          </a:p>
-        </p:txBody>
-      </p:sp>
-      <p:sp>
-        <p:nvSpPr>
-          <p:cNvPr id="108" name="TextBox 107">
-            <a:extLst>
-              <a:ext uri="{FF2B5EF4-FFF2-40B4-BE49-F238E27FC236}">
-                <a16:creationId xmlns:a16="http://schemas.microsoft.com/office/drawing/2014/main" id="{AF687F40-9C12-6049-86AC-6ECFCB84D7A9}"/>
-              </a:ext>
-            </a:extLst>
-          </p:cNvPr>
-          <p:cNvSpPr txBox="1"/>
-          <p:nvPr/>
-        </p:nvSpPr>
-        <p:spPr>
-          <a:xfrm>
-            <a:off x="5898550" y="3911409"/>
-            <a:ext cx="860430" cy="261610"/>
-          </a:xfrm>
-          <a:prstGeom prst="rect">
-            <a:avLst/>
-          </a:prstGeom>
-          <a:noFill/>
-        </p:spPr>
-        <p:txBody>
-          <a:bodyPr wrap="square" rtlCol="0">
-            <a:spAutoFit/>
-          </a:bodyPr>
-          <a:lstStyle/>
-          <a:p>
-            <a:pPr algn="ctr"/>
-            <a:r>
-              <a:rPr lang="en-US" sz="1100" dirty="0"/>
-              <a:t>Deploy API</a:t>
-            </a:r>
-          </a:p>
-        </p:txBody>
-      </p:sp>
-      <p:sp>
-        <p:nvSpPr>
-          <p:cNvPr id="109" name="TextBox 108">
-            <a:extLst>
-              <a:ext uri="{FF2B5EF4-FFF2-40B4-BE49-F238E27FC236}">
-                <a16:creationId xmlns:a16="http://schemas.microsoft.com/office/drawing/2014/main" id="{1C228791-AD71-9742-BFE1-C9D639D28DFD}"/>
-              </a:ext>
-            </a:extLst>
-          </p:cNvPr>
-          <p:cNvSpPr txBox="1"/>
-          <p:nvPr/>
-        </p:nvSpPr>
-        <p:spPr>
-          <a:xfrm>
-            <a:off x="2634594" y="3029985"/>
-            <a:ext cx="1081065" cy="461665"/>
-          </a:xfrm>
-          <a:prstGeom prst="rect">
-            <a:avLst/>
-          </a:prstGeom>
-          <a:noFill/>
-        </p:spPr>
-        <p:txBody>
-          <a:bodyPr wrap="none" rtlCol="0">
-            <a:spAutoFit/>
-          </a:bodyPr>
-          <a:lstStyle/>
-          <a:p>
-            <a:r>
-              <a:rPr lang="en-US" sz="1200" dirty="0"/>
-              <a:t>Multilanguage</a:t>
-            </a:r>
-          </a:p>
-          <a:p>
-            <a:r>
-              <a:rPr lang="en-US" sz="1200" dirty="0"/>
-              <a:t>Users</a:t>
+              <a:rPr lang="en-US" sz="1000" dirty="0"/>
+              <a:t>Engineering</a:t>
             </a:r>
           </a:p>
         </p:txBody>
       </p:sp>
       <p:pic>
         <p:nvPicPr>
-          <p:cNvPr id="126" name="Graphic 125">
-            <a:extLst>
-              <a:ext uri="{FF2B5EF4-FFF2-40B4-BE49-F238E27FC236}">
-                <a16:creationId xmlns:a16="http://schemas.microsoft.com/office/drawing/2014/main" id="{F0F4E78F-9B5C-044D-8F8B-24233E51007D}"/>
+          <p:cNvPr id="128" name="Graphic 127">
+            <a:extLst>
+              <a:ext uri="{FF2B5EF4-FFF2-40B4-BE49-F238E27FC236}">
+                <a16:creationId xmlns:a16="http://schemas.microsoft.com/office/drawing/2014/main" id="{EEAC0093-32DC-7746-B320-D2EBB684DCDF}"/>
               </a:ext>
             </a:extLst>
           </p:cNvPr>
@@ -6278,10 +6098,10 @@
           <p:nvPr/>
         </p:nvPicPr>
         <p:blipFill>
-          <a:blip r:embed="rId21">
+          <a:blip r:embed="rId17">
             <a:extLst>
               <a:ext uri="{96DAC541-7B7A-43D3-8B79-37D633B846F1}">
-                <asvg:svgBlip xmlns:asvg="http://schemas.microsoft.com/office/drawing/2016/SVG/main" r:embed="rId22"/>
+                <asvg:svgBlip xmlns:asvg="http://schemas.microsoft.com/office/drawing/2016/SVG/main" r:embed="rId18"/>
               </a:ext>
             </a:extLst>
           </a:blip>
@@ -6291,78 +6111,6 @@
         </p:blipFill>
         <p:spPr>
           <a:xfrm flipH="1">
-            <a:off x="5645169" y="5366802"/>
-            <a:ext cx="483586" cy="469900"/>
-          </a:xfrm>
-          <a:prstGeom prst="rect">
-            <a:avLst/>
-          </a:prstGeom>
-        </p:spPr>
-      </p:pic>
-      <p:sp>
-        <p:nvSpPr>
-          <p:cNvPr id="127" name="TextBox 126">
-            <a:extLst>
-              <a:ext uri="{FF2B5EF4-FFF2-40B4-BE49-F238E27FC236}">
-                <a16:creationId xmlns:a16="http://schemas.microsoft.com/office/drawing/2014/main" id="{DAC9E563-A2EC-B240-A022-A40592CC32C3}"/>
-              </a:ext>
-            </a:extLst>
-          </p:cNvPr>
-          <p:cNvSpPr txBox="1"/>
-          <p:nvPr/>
-        </p:nvSpPr>
-        <p:spPr>
-          <a:xfrm>
-            <a:off x="5140944" y="5890336"/>
-            <a:ext cx="1506552" cy="307777"/>
-          </a:xfrm>
-          <a:prstGeom prst="rect">
-            <a:avLst/>
-          </a:prstGeom>
-          <a:noFill/>
-        </p:spPr>
-        <p:txBody>
-          <a:bodyPr wrap="square" rtlCol="0">
-            <a:spAutoFit/>
-          </a:bodyPr>
-          <a:lstStyle/>
-          <a:p>
-            <a:pPr algn="ctr"/>
-            <a:r>
-              <a:rPr lang="en-US" sz="1400" dirty="0"/>
-              <a:t>Engineering</a:t>
-            </a:r>
-          </a:p>
-        </p:txBody>
-      </p:sp>
-      <p:pic>
-        <p:nvPicPr>
-          <p:cNvPr id="128" name="Graphic 127">
-            <a:extLst>
-              <a:ext uri="{FF2B5EF4-FFF2-40B4-BE49-F238E27FC236}">
-                <a16:creationId xmlns:a16="http://schemas.microsoft.com/office/drawing/2014/main" id="{EEAC0093-32DC-7746-B320-D2EBB684DCDF}"/>
-              </a:ext>
-            </a:extLst>
-          </p:cNvPr>
-          <p:cNvPicPr>
-            <a:picLocks noChangeAspect="1"/>
-          </p:cNvPicPr>
-          <p:nvPr/>
-        </p:nvPicPr>
-        <p:blipFill>
-          <a:blip r:embed="rId21">
-            <a:extLst>
-              <a:ext uri="{96DAC541-7B7A-43D3-8B79-37D633B846F1}">
-                <asvg:svgBlip xmlns:asvg="http://schemas.microsoft.com/office/drawing/2016/SVG/main" r:embed="rId22"/>
-              </a:ext>
-            </a:extLst>
-          </a:blip>
-          <a:stretch>
-            <a:fillRect/>
-          </a:stretch>
-        </p:blipFill>
-        <p:spPr>
-          <a:xfrm flipH="1">
             <a:off x="2853239" y="2440213"/>
             <a:ext cx="483586" cy="469900"/>
           </a:xfrm>
@@ -6389,15 +6137,15 @@
         </p:nvCxnSpPr>
         <p:spPr>
           <a:xfrm rot="10800000">
-            <a:off x="4465909" y="5083924"/>
-            <a:ext cx="1179261" cy="517829"/>
+            <a:off x="4573832" y="5458795"/>
+            <a:ext cx="1169213" cy="147297"/>
           </a:xfrm>
           <a:prstGeom prst="bentConnector2">
             <a:avLst/>
           </a:prstGeom>
-          <a:ln>
+          <a:ln w="9525">
             <a:solidFill>
-              <a:srgbClr val="7030A0"/>
+              <a:schemeClr val="accent1"/>
             </a:solidFill>
             <a:tailEnd type="triangle"/>
           </a:ln>
@@ -6431,8 +6179,8 @@
         </p:nvSpPr>
         <p:spPr>
           <a:xfrm>
-            <a:off x="4433074" y="5653532"/>
-            <a:ext cx="526763" cy="276999"/>
+            <a:off x="3894988" y="5618422"/>
+            <a:ext cx="1506387" cy="246221"/>
           </a:xfrm>
           <a:prstGeom prst="rect">
             <a:avLst/>
@@ -6447,8 +6195,8 @@
           <a:p>
             <a:pPr algn="ctr"/>
             <a:r>
-              <a:rPr lang="en-US" sz="1200" dirty="0"/>
-              <a:t>code</a:t>
+              <a:rPr lang="en-US" sz="1000" i="1" dirty="0"/>
+              <a:t>Ship awesome features</a:t>
             </a:r>
           </a:p>
         </p:txBody>
@@ -6468,10 +6216,10 @@
           <p:nvPr/>
         </p:nvPicPr>
         <p:blipFill>
-          <a:blip r:embed="rId23">
+          <a:blip r:embed="rId19">
             <a:extLst>
               <a:ext uri="{96DAC541-7B7A-43D3-8B79-37D633B846F1}">
-                <asvg:svgBlip xmlns:asvg="http://schemas.microsoft.com/office/drawing/2016/SVG/main" r:embed="rId24"/>
+                <asvg:svgBlip xmlns:asvg="http://schemas.microsoft.com/office/drawing/2016/SVG/main" r:embed="rId20"/>
               </a:ext>
             </a:extLst>
           </a:blip>
@@ -6481,8 +6229,8 @@
         </p:blipFill>
         <p:spPr>
           <a:xfrm>
-            <a:off x="7822521" y="4359671"/>
-            <a:ext cx="614940" cy="614940"/>
+            <a:off x="7281499" y="4273028"/>
+            <a:ext cx="654629" cy="654629"/>
           </a:xfrm>
           <a:prstGeom prst="rect">
             <a:avLst/>
@@ -6500,24 +6248,25 @@
           </p:cNvPr>
           <p:cNvCxnSpPr>
             <a:cxnSpLocks/>
-            <a:endCxn id="136" idx="0"/>
+            <a:endCxn id="156" idx="0"/>
           </p:cNvCxnSpPr>
           <p:nvPr/>
         </p:nvCxnSpPr>
         <p:spPr>
           <a:xfrm rot="16200000" flipH="1">
-            <a:off x="7555435" y="3785115"/>
-            <a:ext cx="1029184" cy="119927"/>
+            <a:off x="7220420" y="3723861"/>
+            <a:ext cx="847023" cy="5533"/>
           </a:xfrm>
           <a:prstGeom prst="bentConnector3">
             <a:avLst>
               <a:gd name="adj1" fmla="val 50000"/>
             </a:avLst>
           </a:prstGeom>
-          <a:ln>
+          <a:ln w="9525">
             <a:solidFill>
-              <a:srgbClr val="7030A0"/>
+              <a:schemeClr val="accent1"/>
             </a:solidFill>
+            <a:prstDash val="solid"/>
             <a:tailEnd type="triangle"/>
           </a:ln>
         </p:spPr>
@@ -6547,23 +6296,24 @@
           </p:cNvPr>
           <p:cNvCxnSpPr>
             <a:cxnSpLocks/>
-            <a:stCxn id="136" idx="2"/>
+            <a:stCxn id="156" idx="2"/>
             <a:endCxn id="126" idx="1"/>
           </p:cNvCxnSpPr>
           <p:nvPr/>
         </p:nvCxnSpPr>
         <p:spPr>
           <a:xfrm rot="5400000">
-            <a:off x="6815803" y="4287563"/>
-            <a:ext cx="627141" cy="2001236"/>
+            <a:off x="6731936" y="4691329"/>
+            <a:ext cx="409456" cy="1420068"/>
           </a:xfrm>
           <a:prstGeom prst="bentConnector2">
             <a:avLst/>
           </a:prstGeom>
-          <a:ln>
+          <a:ln w="9525">
             <a:solidFill>
-              <a:srgbClr val="7030A0"/>
+              <a:schemeClr val="accent1"/>
             </a:solidFill>
+            <a:prstDash val="solid"/>
             <a:tailEnd type="triangle"/>
           </a:ln>
         </p:spPr>
@@ -6596,8 +6346,8 @@
         </p:nvSpPr>
         <p:spPr>
           <a:xfrm>
-            <a:off x="7203329" y="5634581"/>
-            <a:ext cx="970170" cy="276999"/>
+            <a:off x="6871265" y="5625417"/>
+            <a:ext cx="1539800" cy="230832"/>
           </a:xfrm>
           <a:prstGeom prst="rect">
             <a:avLst/>
@@ -6612,9 +6362,722 @@
           <a:p>
             <a:pPr algn="ctr"/>
             <a:r>
-              <a:rPr lang="en-US" sz="1200" dirty="0"/>
-              <a:t>metrics</a:t>
-            </a:r>
+              <a:rPr lang="en-US" sz="900" i="1" dirty="0"/>
+              <a:t>Monitoring &amp; Alerting</a:t>
+            </a:r>
+          </a:p>
+        </p:txBody>
+      </p:sp>
+      <p:sp>
+        <p:nvSpPr>
+          <p:cNvPr id="71" name="TextBox 70">
+            <a:extLst>
+              <a:ext uri="{FF2B5EF4-FFF2-40B4-BE49-F238E27FC236}">
+                <a16:creationId xmlns:a16="http://schemas.microsoft.com/office/drawing/2014/main" id="{B2A398DE-415F-5741-AACE-B3A1DB7074C4}"/>
+              </a:ext>
+            </a:extLst>
+          </p:cNvPr>
+          <p:cNvSpPr txBox="1"/>
+          <p:nvPr/>
+        </p:nvSpPr>
+        <p:spPr>
+          <a:xfrm>
+            <a:off x="7250435" y="4911216"/>
+            <a:ext cx="760144" cy="230832"/>
+          </a:xfrm>
+          <a:prstGeom prst="rect">
+            <a:avLst/>
+          </a:prstGeom>
+          <a:noFill/>
+        </p:spPr>
+        <p:txBody>
+          <a:bodyPr wrap="none" rtlCol="0">
+            <a:spAutoFit/>
+          </a:bodyPr>
+          <a:lstStyle/>
+          <a:p>
+            <a:r>
+              <a:rPr lang="en-US" sz="900" dirty="0"/>
+              <a:t>CloudWatch</a:t>
+            </a:r>
+          </a:p>
+        </p:txBody>
+      </p:sp>
+      <p:sp>
+        <p:nvSpPr>
+          <p:cNvPr id="77" name="TextBox 76">
+            <a:extLst>
+              <a:ext uri="{FF2B5EF4-FFF2-40B4-BE49-F238E27FC236}">
+                <a16:creationId xmlns:a16="http://schemas.microsoft.com/office/drawing/2014/main" id="{A394B86B-DCCC-4E4C-AAE8-F847F524A421}"/>
+              </a:ext>
+            </a:extLst>
+          </p:cNvPr>
+          <p:cNvSpPr txBox="1"/>
+          <p:nvPr/>
+        </p:nvSpPr>
+        <p:spPr>
+          <a:xfrm>
+            <a:off x="5160850" y="4556659"/>
+            <a:ext cx="481051" cy="230832"/>
+          </a:xfrm>
+          <a:prstGeom prst="rect">
+            <a:avLst/>
+          </a:prstGeom>
+          <a:noFill/>
+        </p:spPr>
+        <p:txBody>
+          <a:bodyPr wrap="square" rtlCol="0">
+            <a:spAutoFit/>
+          </a:bodyPr>
+          <a:lstStyle/>
+          <a:p>
+            <a:pPr algn="ctr"/>
+            <a:r>
+              <a:rPr lang="en-US" sz="900" i="1" dirty="0"/>
+              <a:t>Build </a:t>
+            </a:r>
+          </a:p>
+        </p:txBody>
+      </p:sp>
+      <p:grpSp>
+        <p:nvGrpSpPr>
+          <p:cNvPr id="113" name="Group 112">
+            <a:extLst>
+              <a:ext uri="{FF2B5EF4-FFF2-40B4-BE49-F238E27FC236}">
+                <a16:creationId xmlns:a16="http://schemas.microsoft.com/office/drawing/2014/main" id="{16A7CB3D-83D9-654E-84BE-B0B70AF27313}"/>
+              </a:ext>
+            </a:extLst>
+          </p:cNvPr>
+          <p:cNvGrpSpPr/>
+          <p:nvPr/>
+        </p:nvGrpSpPr>
+        <p:grpSpPr>
+          <a:xfrm>
+            <a:off x="5569527" y="4306133"/>
+            <a:ext cx="729132" cy="760693"/>
+            <a:chOff x="6046986" y="4262937"/>
+            <a:chExt cx="729132" cy="760693"/>
+          </a:xfrm>
+        </p:grpSpPr>
+        <p:pic>
+          <p:nvPicPr>
+            <p:cNvPr id="41" name="Graphic 40">
+              <a:extLst>
+                <a:ext uri="{FF2B5EF4-FFF2-40B4-BE49-F238E27FC236}">
+                  <a16:creationId xmlns:a16="http://schemas.microsoft.com/office/drawing/2014/main" id="{185AE6FB-7B95-5041-BE83-C83D983919BC}"/>
+                </a:ext>
+              </a:extLst>
+            </p:cNvPr>
+            <p:cNvPicPr>
+              <a:picLocks noChangeAspect="1"/>
+            </p:cNvPicPr>
+            <p:nvPr/>
+          </p:nvPicPr>
+          <p:blipFill>
+            <a:blip r:embed="rId21">
+              <a:extLst>
+                <a:ext uri="{96DAC541-7B7A-43D3-8B79-37D633B846F1}">
+                  <asvg:svgBlip xmlns:asvg="http://schemas.microsoft.com/office/drawing/2016/SVG/main" r:embed="rId22"/>
+                </a:ext>
+              </a:extLst>
+            </a:blip>
+            <a:stretch>
+              <a:fillRect/>
+            </a:stretch>
+          </p:blipFill>
+          <p:spPr>
+            <a:xfrm>
+              <a:off x="6046986" y="4310651"/>
+              <a:ext cx="729132" cy="712979"/>
+            </a:xfrm>
+            <a:prstGeom prst="rect">
+              <a:avLst/>
+            </a:prstGeom>
+          </p:spPr>
+        </p:pic>
+        <p:sp>
+          <p:nvSpPr>
+            <p:cNvPr id="5" name="Rectangle 4">
+              <a:extLst>
+                <a:ext uri="{FF2B5EF4-FFF2-40B4-BE49-F238E27FC236}">
+                  <a16:creationId xmlns:a16="http://schemas.microsoft.com/office/drawing/2014/main" id="{0C035570-E65A-344C-9C08-7372DB95BD5C}"/>
+                </a:ext>
+              </a:extLst>
+            </p:cNvPr>
+            <p:cNvSpPr/>
+            <p:nvPr/>
+          </p:nvSpPr>
+          <p:spPr>
+            <a:xfrm>
+              <a:off x="6099246" y="4266343"/>
+              <a:ext cx="130897" cy="103084"/>
+            </a:xfrm>
+            <a:prstGeom prst="rect">
+              <a:avLst/>
+            </a:prstGeom>
+            <a:solidFill>
+              <a:srgbClr val="00B050"/>
+            </a:solidFill>
+            <a:ln>
+              <a:solidFill>
+                <a:schemeClr val="bg1"/>
+              </a:solidFill>
+            </a:ln>
+          </p:spPr>
+          <p:style>
+            <a:lnRef idx="2">
+              <a:schemeClr val="accent1">
+                <a:shade val="50000"/>
+              </a:schemeClr>
+            </a:lnRef>
+            <a:fillRef idx="1">
+              <a:schemeClr val="accent1"/>
+            </a:fillRef>
+            <a:effectRef idx="0">
+              <a:schemeClr val="accent1"/>
+            </a:effectRef>
+            <a:fontRef idx="minor">
+              <a:schemeClr val="lt1"/>
+            </a:fontRef>
+          </p:style>
+          <p:txBody>
+            <a:bodyPr rtlCol="0" anchor="ctr"/>
+            <a:lstStyle/>
+            <a:p>
+              <a:pPr algn="ctr"/>
+              <a:endParaRPr lang="en-US"/>
+            </a:p>
+          </p:txBody>
+        </p:sp>
+        <p:sp>
+          <p:nvSpPr>
+            <p:cNvPr id="53" name="Rectangle 52">
+              <a:extLst>
+                <a:ext uri="{FF2B5EF4-FFF2-40B4-BE49-F238E27FC236}">
+                  <a16:creationId xmlns:a16="http://schemas.microsoft.com/office/drawing/2014/main" id="{EF229E33-B624-174A-9E9A-5DE008139862}"/>
+                </a:ext>
+              </a:extLst>
+            </p:cNvPr>
+            <p:cNvSpPr/>
+            <p:nvPr/>
+          </p:nvSpPr>
+          <p:spPr>
+            <a:xfrm>
+              <a:off x="6328236" y="4266343"/>
+              <a:ext cx="130897" cy="103084"/>
+            </a:xfrm>
+            <a:prstGeom prst="rect">
+              <a:avLst/>
+            </a:prstGeom>
+            <a:solidFill>
+              <a:srgbClr val="FFC000"/>
+            </a:solidFill>
+            <a:ln>
+              <a:solidFill>
+                <a:schemeClr val="bg1"/>
+              </a:solidFill>
+            </a:ln>
+          </p:spPr>
+          <p:style>
+            <a:lnRef idx="2">
+              <a:schemeClr val="accent1">
+                <a:shade val="50000"/>
+              </a:schemeClr>
+            </a:lnRef>
+            <a:fillRef idx="1">
+              <a:schemeClr val="accent1"/>
+            </a:fillRef>
+            <a:effectRef idx="0">
+              <a:schemeClr val="accent1"/>
+            </a:effectRef>
+            <a:fontRef idx="minor">
+              <a:schemeClr val="lt1"/>
+            </a:fontRef>
+          </p:style>
+          <p:txBody>
+            <a:bodyPr rtlCol="0" anchor="ctr"/>
+            <a:lstStyle/>
+            <a:p>
+              <a:pPr algn="ctr"/>
+              <a:endParaRPr lang="en-US"/>
+            </a:p>
+          </p:txBody>
+        </p:sp>
+        <p:sp>
+          <p:nvSpPr>
+            <p:cNvPr id="80" name="Rectangle 79">
+              <a:extLst>
+                <a:ext uri="{FF2B5EF4-FFF2-40B4-BE49-F238E27FC236}">
+                  <a16:creationId xmlns:a16="http://schemas.microsoft.com/office/drawing/2014/main" id="{80A0F44B-2707-6D49-B8BB-AB5F9DCC3274}"/>
+                </a:ext>
+              </a:extLst>
+            </p:cNvPr>
+            <p:cNvSpPr/>
+            <p:nvPr/>
+          </p:nvSpPr>
+          <p:spPr>
+            <a:xfrm>
+              <a:off x="6557226" y="4262937"/>
+              <a:ext cx="130897" cy="103084"/>
+            </a:xfrm>
+            <a:prstGeom prst="rect">
+              <a:avLst/>
+            </a:prstGeom>
+            <a:solidFill>
+              <a:schemeClr val="bg2">
+                <a:lumMod val="50000"/>
+              </a:schemeClr>
+            </a:solidFill>
+            <a:ln>
+              <a:solidFill>
+                <a:schemeClr val="bg1"/>
+              </a:solidFill>
+            </a:ln>
+          </p:spPr>
+          <p:style>
+            <a:lnRef idx="2">
+              <a:schemeClr val="accent1">
+                <a:shade val="50000"/>
+              </a:schemeClr>
+            </a:lnRef>
+            <a:fillRef idx="1">
+              <a:schemeClr val="accent1"/>
+            </a:fillRef>
+            <a:effectRef idx="0">
+              <a:schemeClr val="accent1"/>
+            </a:effectRef>
+            <a:fontRef idx="minor">
+              <a:schemeClr val="lt1"/>
+            </a:fontRef>
+          </p:style>
+          <p:txBody>
+            <a:bodyPr rtlCol="0" anchor="ctr"/>
+            <a:lstStyle/>
+            <a:p>
+              <a:pPr algn="ctr"/>
+              <a:endParaRPr lang="en-US"/>
+            </a:p>
+          </p:txBody>
+        </p:sp>
+      </p:grpSp>
+      <p:cxnSp>
+        <p:nvCxnSpPr>
+          <p:cNvPr id="82" name="Elbow Connector 81">
+            <a:extLst>
+              <a:ext uri="{FF2B5EF4-FFF2-40B4-BE49-F238E27FC236}">
+                <a16:creationId xmlns:a16="http://schemas.microsoft.com/office/drawing/2014/main" id="{1ED6949B-435C-F04E-BF42-C66E8CC7758C}"/>
+              </a:ext>
+            </a:extLst>
+          </p:cNvPr>
+          <p:cNvCxnSpPr>
+            <a:cxnSpLocks/>
+            <a:stCxn id="80" idx="0"/>
+          </p:cNvCxnSpPr>
+          <p:nvPr/>
+        </p:nvCxnSpPr>
+        <p:spPr>
+          <a:xfrm rot="16200000" flipV="1">
+            <a:off x="5505547" y="3666463"/>
+            <a:ext cx="1276507" cy="2833"/>
+          </a:xfrm>
+          <a:prstGeom prst="bentConnector3">
+            <a:avLst>
+              <a:gd name="adj1" fmla="val 50000"/>
+            </a:avLst>
+          </a:prstGeom>
+          <a:ln w="9525">
+            <a:solidFill>
+              <a:schemeClr val="accent1"/>
+            </a:solidFill>
+            <a:tailEnd type="triangle"/>
+          </a:ln>
+        </p:spPr>
+        <p:style>
+          <a:lnRef idx="1">
+            <a:schemeClr val="accent1"/>
+          </a:lnRef>
+          <a:fillRef idx="0">
+            <a:schemeClr val="accent1"/>
+          </a:fillRef>
+          <a:effectRef idx="0">
+            <a:schemeClr val="accent1"/>
+          </a:effectRef>
+          <a:fontRef idx="minor">
+            <a:schemeClr val="tx1"/>
+          </a:fontRef>
+        </p:style>
+      </p:cxnSp>
+      <p:sp>
+        <p:nvSpPr>
+          <p:cNvPr id="87" name="TextBox 86">
+            <a:extLst>
+              <a:ext uri="{FF2B5EF4-FFF2-40B4-BE49-F238E27FC236}">
+                <a16:creationId xmlns:a16="http://schemas.microsoft.com/office/drawing/2014/main" id="{C4D78565-634C-E64F-9687-A13F3A3D4CBD}"/>
+              </a:ext>
+            </a:extLst>
+          </p:cNvPr>
+          <p:cNvSpPr txBox="1"/>
+          <p:nvPr/>
+        </p:nvSpPr>
+        <p:spPr>
+          <a:xfrm>
+            <a:off x="7669373" y="3523158"/>
+            <a:ext cx="695925" cy="369332"/>
+          </a:xfrm>
+          <a:prstGeom prst="rect">
+            <a:avLst/>
+          </a:prstGeom>
+          <a:noFill/>
+        </p:spPr>
+        <p:txBody>
+          <a:bodyPr wrap="square" rtlCol="0">
+            <a:spAutoFit/>
+          </a:bodyPr>
+          <a:lstStyle/>
+          <a:p>
+            <a:r>
+              <a:rPr lang="en-US" sz="900" i="1" dirty="0"/>
+              <a:t>Metrics,</a:t>
+            </a:r>
+          </a:p>
+          <a:p>
+            <a:r>
+              <a:rPr lang="en-US" sz="900" i="1" dirty="0"/>
+              <a:t>Logs</a:t>
+            </a:r>
+          </a:p>
+        </p:txBody>
+      </p:sp>
+      <p:sp>
+        <p:nvSpPr>
+          <p:cNvPr id="129" name="TextBox 128">
+            <a:extLst>
+              <a:ext uri="{FF2B5EF4-FFF2-40B4-BE49-F238E27FC236}">
+                <a16:creationId xmlns:a16="http://schemas.microsoft.com/office/drawing/2014/main" id="{7E02E804-F727-914C-9E4B-495A15B52424}"/>
+              </a:ext>
+            </a:extLst>
+          </p:cNvPr>
+          <p:cNvSpPr txBox="1"/>
+          <p:nvPr/>
+        </p:nvSpPr>
+        <p:spPr>
+          <a:xfrm>
+            <a:off x="5219971" y="3378367"/>
+            <a:ext cx="707263" cy="230832"/>
+          </a:xfrm>
+          <a:prstGeom prst="rect">
+            <a:avLst/>
+          </a:prstGeom>
+          <a:noFill/>
+        </p:spPr>
+        <p:txBody>
+          <a:bodyPr wrap="square" rtlCol="0">
+            <a:spAutoFit/>
+          </a:bodyPr>
+          <a:lstStyle/>
+          <a:p>
+            <a:pPr algn="ctr"/>
+            <a:r>
+              <a:rPr lang="en-US" sz="900" i="1" dirty="0"/>
+              <a:t>Deploy</a:t>
+            </a:r>
+          </a:p>
+        </p:txBody>
+      </p:sp>
+      <p:sp>
+        <p:nvSpPr>
+          <p:cNvPr id="130" name="TextBox 129">
+            <a:extLst>
+              <a:ext uri="{FF2B5EF4-FFF2-40B4-BE49-F238E27FC236}">
+                <a16:creationId xmlns:a16="http://schemas.microsoft.com/office/drawing/2014/main" id="{054128F1-3323-E141-9D97-E148AA9C440C}"/>
+              </a:ext>
+            </a:extLst>
+          </p:cNvPr>
+          <p:cNvSpPr txBox="1"/>
+          <p:nvPr/>
+        </p:nvSpPr>
+        <p:spPr>
+          <a:xfrm>
+            <a:off x="6021845" y="3377781"/>
+            <a:ext cx="570331" cy="230832"/>
+          </a:xfrm>
+          <a:prstGeom prst="rect">
+            <a:avLst/>
+          </a:prstGeom>
+          <a:noFill/>
+        </p:spPr>
+        <p:txBody>
+          <a:bodyPr wrap="square" rtlCol="0">
+            <a:spAutoFit/>
+          </a:bodyPr>
+          <a:lstStyle/>
+          <a:p>
+            <a:pPr algn="ctr"/>
+            <a:r>
+              <a:rPr lang="en-US" sz="900" i="1" dirty="0"/>
+              <a:t>Test</a:t>
+            </a:r>
+          </a:p>
+        </p:txBody>
+      </p:sp>
+      <p:sp>
+        <p:nvSpPr>
+          <p:cNvPr id="120" name="TextBox 119">
+            <a:extLst>
+              <a:ext uri="{FF2B5EF4-FFF2-40B4-BE49-F238E27FC236}">
+                <a16:creationId xmlns:a16="http://schemas.microsoft.com/office/drawing/2014/main" id="{CB99A06F-DFC4-A74B-B300-013EA2173999}"/>
+              </a:ext>
+            </a:extLst>
+          </p:cNvPr>
+          <p:cNvSpPr txBox="1"/>
+          <p:nvPr/>
+        </p:nvSpPr>
+        <p:spPr>
+          <a:xfrm>
+            <a:off x="6337169" y="2249439"/>
+            <a:ext cx="792204" cy="338554"/>
+          </a:xfrm>
+          <a:prstGeom prst="rect">
+            <a:avLst/>
+          </a:prstGeom>
+          <a:noFill/>
+        </p:spPr>
+        <p:txBody>
+          <a:bodyPr wrap="none" rtlCol="0">
+            <a:spAutoFit/>
+          </a:bodyPr>
+          <a:lstStyle/>
+          <a:p>
+            <a:pPr algn="ctr"/>
+            <a:r>
+              <a:rPr lang="en-US" sz="800" dirty="0"/>
+              <a:t>(API Gateway, </a:t>
+            </a:r>
+          </a:p>
+          <a:p>
+            <a:pPr algn="ctr"/>
+            <a:r>
+              <a:rPr lang="en-US" sz="800" dirty="0"/>
+              <a:t>Lambda)</a:t>
+            </a:r>
+          </a:p>
+        </p:txBody>
+      </p:sp>
+      <p:sp>
+        <p:nvSpPr>
+          <p:cNvPr id="133" name="TextBox 132">
+            <a:extLst>
+              <a:ext uri="{FF2B5EF4-FFF2-40B4-BE49-F238E27FC236}">
+                <a16:creationId xmlns:a16="http://schemas.microsoft.com/office/drawing/2014/main" id="{CAC186EA-66F2-2043-9C19-E4B641AD7E7E}"/>
+              </a:ext>
+            </a:extLst>
+          </p:cNvPr>
+          <p:cNvSpPr txBox="1"/>
+          <p:nvPr/>
+        </p:nvSpPr>
+        <p:spPr>
+          <a:xfrm>
+            <a:off x="4333975" y="3006202"/>
+            <a:ext cx="654931" cy="230832"/>
+          </a:xfrm>
+          <a:prstGeom prst="rect">
+            <a:avLst/>
+          </a:prstGeom>
+          <a:noFill/>
+        </p:spPr>
+        <p:txBody>
+          <a:bodyPr wrap="square" rtlCol="0">
+            <a:spAutoFit/>
+          </a:bodyPr>
+          <a:lstStyle/>
+          <a:p>
+            <a:pPr algn="ctr"/>
+            <a:r>
+              <a:rPr lang="en-US" sz="900" i="1" dirty="0"/>
+              <a:t>S3 Origin</a:t>
+            </a:r>
+          </a:p>
+        </p:txBody>
+      </p:sp>
+      <p:sp>
+        <p:nvSpPr>
+          <p:cNvPr id="137" name="TextBox 136">
+            <a:extLst>
+              <a:ext uri="{FF2B5EF4-FFF2-40B4-BE49-F238E27FC236}">
+                <a16:creationId xmlns:a16="http://schemas.microsoft.com/office/drawing/2014/main" id="{8C2F2910-244F-9042-AE5F-59C08BFD1013}"/>
+              </a:ext>
+            </a:extLst>
+          </p:cNvPr>
+          <p:cNvSpPr txBox="1"/>
+          <p:nvPr/>
+        </p:nvSpPr>
+        <p:spPr>
+          <a:xfrm>
+            <a:off x="4709389" y="2421221"/>
+            <a:ext cx="648807" cy="230832"/>
+          </a:xfrm>
+          <a:prstGeom prst="rect">
+            <a:avLst/>
+          </a:prstGeom>
+          <a:solidFill>
+            <a:schemeClr val="bg1"/>
+          </a:solidFill>
+        </p:spPr>
+        <p:txBody>
+          <a:bodyPr wrap="square" rtlCol="0">
+            <a:spAutoFit/>
+          </a:bodyPr>
+          <a:lstStyle/>
+          <a:p>
+            <a:r>
+              <a:rPr lang="en-US" sz="900" i="1" dirty="0"/>
+              <a:t>API Origin</a:t>
+            </a:r>
+          </a:p>
+        </p:txBody>
+      </p:sp>
+      <p:pic>
+        <p:nvPicPr>
+          <p:cNvPr id="66" name="Graphic 65">
+            <a:extLst>
+              <a:ext uri="{FF2B5EF4-FFF2-40B4-BE49-F238E27FC236}">
+                <a16:creationId xmlns:a16="http://schemas.microsoft.com/office/drawing/2014/main" id="{63B5BE2E-EE8F-4C4B-8E37-52508DA45F01}"/>
+              </a:ext>
+            </a:extLst>
+          </p:cNvPr>
+          <p:cNvPicPr>
+            <a:picLocks noChangeAspect="1"/>
+          </p:cNvPicPr>
+          <p:nvPr/>
+        </p:nvPicPr>
+        <p:blipFill>
+          <a:blip r:embed="rId23">
+            <a:extLst>
+              <a:ext uri="{96DAC541-7B7A-43D3-8B79-37D633B846F1}">
+                <asvg:svgBlip xmlns:asvg="http://schemas.microsoft.com/office/drawing/2016/SVG/main" r:embed="rId24"/>
+              </a:ext>
+            </a:extLst>
+          </a:blip>
+          <a:stretch>
+            <a:fillRect/>
+          </a:stretch>
+        </p:blipFill>
+        <p:spPr>
+          <a:xfrm>
+            <a:off x="4049500" y="2312936"/>
+            <a:ext cx="711200" cy="711200"/>
+          </a:xfrm>
+          <a:prstGeom prst="rect">
+            <a:avLst/>
+          </a:prstGeom>
+        </p:spPr>
+      </p:pic>
+      <p:cxnSp>
+        <p:nvCxnSpPr>
+          <p:cNvPr id="44" name="Elbow Connector 43">
+            <a:extLst>
+              <a:ext uri="{FF2B5EF4-FFF2-40B4-BE49-F238E27FC236}">
+                <a16:creationId xmlns:a16="http://schemas.microsoft.com/office/drawing/2014/main" id="{92FFCEB7-9510-5145-97F6-09FBD780021F}"/>
+              </a:ext>
+            </a:extLst>
+          </p:cNvPr>
+          <p:cNvCxnSpPr>
+            <a:cxnSpLocks/>
+            <a:stCxn id="66" idx="3"/>
+            <a:endCxn id="85" idx="1"/>
+          </p:cNvCxnSpPr>
+          <p:nvPr/>
+        </p:nvCxnSpPr>
+        <p:spPr>
+          <a:xfrm>
+            <a:off x="4760700" y="2668536"/>
+            <a:ext cx="800300" cy="6627"/>
+          </a:xfrm>
+          <a:prstGeom prst="bentConnector3">
+            <a:avLst>
+              <a:gd name="adj1" fmla="val 50000"/>
+            </a:avLst>
+          </a:prstGeom>
+          <a:ln w="19050">
+            <a:solidFill>
+              <a:srgbClr val="7030A0"/>
+            </a:solidFill>
+          </a:ln>
+        </p:spPr>
+        <p:style>
+          <a:lnRef idx="1">
+            <a:schemeClr val="accent1"/>
+          </a:lnRef>
+          <a:fillRef idx="0">
+            <a:schemeClr val="accent1"/>
+          </a:fillRef>
+          <a:effectRef idx="0">
+            <a:schemeClr val="accent1"/>
+          </a:effectRef>
+          <a:fontRef idx="minor">
+            <a:schemeClr val="tx1"/>
+          </a:fontRef>
+        </p:style>
+      </p:cxnSp>
+      <p:sp>
+        <p:nvSpPr>
+          <p:cNvPr id="156" name="Rectangle 155">
+            <a:extLst>
+              <a:ext uri="{FF2B5EF4-FFF2-40B4-BE49-F238E27FC236}">
+                <a16:creationId xmlns:a16="http://schemas.microsoft.com/office/drawing/2014/main" id="{55116DAE-16AE-0148-B01E-D932BF18D29C}"/>
+              </a:ext>
+            </a:extLst>
+          </p:cNvPr>
+          <p:cNvSpPr/>
+          <p:nvPr/>
+        </p:nvSpPr>
+        <p:spPr>
+          <a:xfrm>
+            <a:off x="6965052" y="4150140"/>
+            <a:ext cx="1363292" cy="1046495"/>
+          </a:xfrm>
+          <a:prstGeom prst="rect">
+            <a:avLst/>
+          </a:prstGeom>
+          <a:noFill/>
+          <a:ln w="12700">
+            <a:solidFill>
+              <a:srgbClr val="879196"/>
+            </a:solidFill>
+            <a:prstDash val="dash"/>
+          </a:ln>
+        </p:spPr>
+        <p:style>
+          <a:lnRef idx="2">
+            <a:schemeClr val="accent1">
+              <a:shade val="50000"/>
+            </a:schemeClr>
+          </a:lnRef>
+          <a:fillRef idx="1">
+            <a:schemeClr val="accent1"/>
+          </a:fillRef>
+          <a:effectRef idx="0">
+            <a:schemeClr val="accent1"/>
+          </a:effectRef>
+          <a:fontRef idx="minor">
+            <a:schemeClr val="lt1"/>
+          </a:fontRef>
+        </p:style>
+        <p:txBody>
+          <a:bodyPr rot="0" spcFirstLastPara="0" vertOverflow="overflow" horzOverflow="overflow" vert="horz" wrap="square" lIns="91440" tIns="45720" rIns="91440" bIns="45720" numCol="1" spcCol="0" rtlCol="0" fromWordArt="0" anchor="t" anchorCtr="0" forceAA="0" compatLnSpc="1">
+            <a:prstTxWarp prst="textNoShape">
+              <a:avLst/>
+            </a:prstTxWarp>
+            <a:noAutofit/>
+          </a:bodyPr>
+          <a:lstStyle/>
+          <a:p>
+            <a:pPr algn="r"/>
+            <a:endParaRPr lang="en-US" sz="1000" dirty="0">
+              <a:solidFill>
+                <a:schemeClr val="tx1"/>
+              </a:solidFill>
+            </a:endParaRPr>
           </a:p>
         </p:txBody>
       </p:sp>

</xml_diff>